<commit_message>
updated presentation apr 29
</commit_message>
<xml_diff>
--- a/doc/BCB_Intro_Advanced_Analysis_2_2021.pptx
+++ b/doc/BCB_Intro_Advanced_Analysis_2_2021.pptx
@@ -6,22 +6,23 @@
     <p:sldMasterId id="2147483654" r:id="rId2"/>
   </p:sldMasterIdLst>
   <p:notesMasterIdLst>
-    <p:notesMasterId r:id="rId16"/>
+    <p:notesMasterId r:id="rId17"/>
   </p:notesMasterIdLst>
   <p:sldIdLst>
     <p:sldId id="335" r:id="rId3"/>
     <p:sldId id="415" r:id="rId4"/>
-    <p:sldId id="456" r:id="rId5"/>
-    <p:sldId id="453" r:id="rId6"/>
-    <p:sldId id="454" r:id="rId7"/>
-    <p:sldId id="457" r:id="rId8"/>
-    <p:sldId id="459" r:id="rId9"/>
-    <p:sldId id="460" r:id="rId10"/>
-    <p:sldId id="455" r:id="rId11"/>
-    <p:sldId id="462" r:id="rId12"/>
-    <p:sldId id="461" r:id="rId13"/>
-    <p:sldId id="451" r:id="rId14"/>
-    <p:sldId id="452" r:id="rId15"/>
+    <p:sldId id="463" r:id="rId5"/>
+    <p:sldId id="456" r:id="rId6"/>
+    <p:sldId id="453" r:id="rId7"/>
+    <p:sldId id="454" r:id="rId8"/>
+    <p:sldId id="457" r:id="rId9"/>
+    <p:sldId id="459" r:id="rId10"/>
+    <p:sldId id="460" r:id="rId11"/>
+    <p:sldId id="455" r:id="rId12"/>
+    <p:sldId id="462" r:id="rId13"/>
+    <p:sldId id="461" r:id="rId14"/>
+    <p:sldId id="451" r:id="rId15"/>
+    <p:sldId id="452" r:id="rId16"/>
   </p:sldIdLst>
   <p:sldSz cx="9144000" cy="5143500" type="screen16x9"/>
   <p:notesSz cx="6858000" cy="9144000"/>
@@ -147,6 +148,2971 @@
     </p:ext>
   </p:extLst>
 </p:presentation>
+</file>
+
+<file path=ppt/diagrams/colors1.xml><?xml version="1.0" encoding="utf-8"?>
+<dgm:colorsDef xmlns:dgm="http://schemas.openxmlformats.org/drawingml/2006/diagram" xmlns:a="http://schemas.openxmlformats.org/drawingml/2006/main" uniqueId="urn:microsoft.com/office/officeart/2005/8/colors/accent1_2">
+  <dgm:title val=""/>
+  <dgm:desc val=""/>
+  <dgm:catLst>
+    <dgm:cat type="accent1" pri="11200"/>
+  </dgm:catLst>
+  <dgm:styleLbl name="node0">
+    <dgm:fillClrLst meth="repeat">
+      <a:schemeClr val="accent1"/>
+    </dgm:fillClrLst>
+    <dgm:linClrLst meth="repeat">
+      <a:schemeClr val="lt1"/>
+    </dgm:linClrLst>
+    <dgm:effectClrLst/>
+    <dgm:txLinClrLst/>
+    <dgm:txFillClrLst/>
+    <dgm:txEffectClrLst/>
+  </dgm:styleLbl>
+  <dgm:styleLbl name="alignNode1">
+    <dgm:fillClrLst meth="repeat">
+      <a:schemeClr val="accent1"/>
+    </dgm:fillClrLst>
+    <dgm:linClrLst meth="repeat">
+      <a:schemeClr val="accent1"/>
+    </dgm:linClrLst>
+    <dgm:effectClrLst/>
+    <dgm:txLinClrLst/>
+    <dgm:txFillClrLst/>
+    <dgm:txEffectClrLst/>
+  </dgm:styleLbl>
+  <dgm:styleLbl name="node1">
+    <dgm:fillClrLst meth="repeat">
+      <a:schemeClr val="accent1"/>
+    </dgm:fillClrLst>
+    <dgm:linClrLst meth="repeat">
+      <a:schemeClr val="lt1"/>
+    </dgm:linClrLst>
+    <dgm:effectClrLst/>
+    <dgm:txLinClrLst/>
+    <dgm:txFillClrLst/>
+    <dgm:txEffectClrLst/>
+  </dgm:styleLbl>
+  <dgm:styleLbl name="lnNode1">
+    <dgm:fillClrLst meth="repeat">
+      <a:schemeClr val="accent1"/>
+    </dgm:fillClrLst>
+    <dgm:linClrLst meth="repeat">
+      <a:schemeClr val="lt1"/>
+    </dgm:linClrLst>
+    <dgm:effectClrLst/>
+    <dgm:txLinClrLst/>
+    <dgm:txFillClrLst/>
+    <dgm:txEffectClrLst/>
+  </dgm:styleLbl>
+  <dgm:styleLbl name="vennNode1">
+    <dgm:fillClrLst meth="repeat">
+      <a:schemeClr val="accent1">
+        <a:alpha val="50000"/>
+      </a:schemeClr>
+    </dgm:fillClrLst>
+    <dgm:linClrLst meth="repeat">
+      <a:schemeClr val="lt1"/>
+    </dgm:linClrLst>
+    <dgm:effectClrLst/>
+    <dgm:txLinClrLst/>
+    <dgm:txFillClrLst/>
+    <dgm:txEffectClrLst/>
+  </dgm:styleLbl>
+  <dgm:styleLbl name="node2">
+    <dgm:fillClrLst meth="repeat">
+      <a:schemeClr val="accent1"/>
+    </dgm:fillClrLst>
+    <dgm:linClrLst meth="repeat">
+      <a:schemeClr val="lt1"/>
+    </dgm:linClrLst>
+    <dgm:effectClrLst/>
+    <dgm:txLinClrLst/>
+    <dgm:txFillClrLst/>
+    <dgm:txEffectClrLst/>
+  </dgm:styleLbl>
+  <dgm:styleLbl name="node3">
+    <dgm:fillClrLst meth="repeat">
+      <a:schemeClr val="accent1"/>
+    </dgm:fillClrLst>
+    <dgm:linClrLst meth="repeat">
+      <a:schemeClr val="lt1"/>
+    </dgm:linClrLst>
+    <dgm:effectClrLst/>
+    <dgm:txLinClrLst/>
+    <dgm:txFillClrLst/>
+    <dgm:txEffectClrLst/>
+  </dgm:styleLbl>
+  <dgm:styleLbl name="node4">
+    <dgm:fillClrLst meth="repeat">
+      <a:schemeClr val="accent1"/>
+    </dgm:fillClrLst>
+    <dgm:linClrLst meth="repeat">
+      <a:schemeClr val="lt1"/>
+    </dgm:linClrLst>
+    <dgm:effectClrLst/>
+    <dgm:txLinClrLst/>
+    <dgm:txFillClrLst/>
+    <dgm:txEffectClrLst/>
+  </dgm:styleLbl>
+  <dgm:styleLbl name="fgImgPlace1">
+    <dgm:fillClrLst meth="repeat">
+      <a:schemeClr val="accent1">
+        <a:tint val="50000"/>
+      </a:schemeClr>
+    </dgm:fillClrLst>
+    <dgm:linClrLst meth="repeat">
+      <a:schemeClr val="lt1"/>
+    </dgm:linClrLst>
+    <dgm:effectClrLst/>
+    <dgm:txLinClrLst/>
+    <dgm:txFillClrLst meth="repeat">
+      <a:schemeClr val="lt1"/>
+    </dgm:txFillClrLst>
+    <dgm:txEffectClrLst/>
+  </dgm:styleLbl>
+  <dgm:styleLbl name="alignImgPlace1">
+    <dgm:fillClrLst meth="repeat">
+      <a:schemeClr val="accent1">
+        <a:tint val="50000"/>
+      </a:schemeClr>
+    </dgm:fillClrLst>
+    <dgm:linClrLst meth="repeat">
+      <a:schemeClr val="lt1"/>
+    </dgm:linClrLst>
+    <dgm:effectClrLst/>
+    <dgm:txLinClrLst/>
+    <dgm:txFillClrLst meth="repeat">
+      <a:schemeClr val="lt1"/>
+    </dgm:txFillClrLst>
+    <dgm:txEffectClrLst/>
+  </dgm:styleLbl>
+  <dgm:styleLbl name="bgImgPlace1">
+    <dgm:fillClrLst meth="repeat">
+      <a:schemeClr val="accent1">
+        <a:tint val="50000"/>
+      </a:schemeClr>
+    </dgm:fillClrLst>
+    <dgm:linClrLst meth="repeat">
+      <a:schemeClr val="lt1"/>
+    </dgm:linClrLst>
+    <dgm:effectClrLst/>
+    <dgm:txLinClrLst/>
+    <dgm:txFillClrLst meth="repeat">
+      <a:schemeClr val="lt1"/>
+    </dgm:txFillClrLst>
+    <dgm:txEffectClrLst/>
+  </dgm:styleLbl>
+  <dgm:styleLbl name="sibTrans2D1">
+    <dgm:fillClrLst meth="repeat">
+      <a:schemeClr val="accent1">
+        <a:tint val="60000"/>
+      </a:schemeClr>
+    </dgm:fillClrLst>
+    <dgm:linClrLst meth="repeat">
+      <a:schemeClr val="accent1">
+        <a:tint val="60000"/>
+      </a:schemeClr>
+    </dgm:linClrLst>
+    <dgm:effectClrLst/>
+    <dgm:txLinClrLst/>
+    <dgm:txFillClrLst/>
+    <dgm:txEffectClrLst/>
+  </dgm:styleLbl>
+  <dgm:styleLbl name="fgSibTrans2D1">
+    <dgm:fillClrLst meth="repeat">
+      <a:schemeClr val="accent1">
+        <a:tint val="60000"/>
+      </a:schemeClr>
+    </dgm:fillClrLst>
+    <dgm:linClrLst meth="repeat">
+      <a:schemeClr val="accent1">
+        <a:tint val="60000"/>
+      </a:schemeClr>
+    </dgm:linClrLst>
+    <dgm:effectClrLst/>
+    <dgm:txLinClrLst/>
+    <dgm:txFillClrLst/>
+    <dgm:txEffectClrLst/>
+  </dgm:styleLbl>
+  <dgm:styleLbl name="bgSibTrans2D1">
+    <dgm:fillClrLst meth="repeat">
+      <a:schemeClr val="accent1">
+        <a:tint val="60000"/>
+      </a:schemeClr>
+    </dgm:fillClrLst>
+    <dgm:linClrLst meth="repeat">
+      <a:schemeClr val="accent1">
+        <a:tint val="60000"/>
+      </a:schemeClr>
+    </dgm:linClrLst>
+    <dgm:effectClrLst/>
+    <dgm:txLinClrLst/>
+    <dgm:txFillClrLst/>
+    <dgm:txEffectClrLst/>
+  </dgm:styleLbl>
+  <dgm:styleLbl name="sibTrans1D1">
+    <dgm:fillClrLst meth="repeat">
+      <a:schemeClr val="accent1"/>
+    </dgm:fillClrLst>
+    <dgm:linClrLst meth="repeat">
+      <a:schemeClr val="accent1"/>
+    </dgm:linClrLst>
+    <dgm:effectClrLst/>
+    <dgm:txLinClrLst/>
+    <dgm:txFillClrLst meth="repeat">
+      <a:schemeClr val="tx1"/>
+    </dgm:txFillClrLst>
+    <dgm:txEffectClrLst/>
+  </dgm:styleLbl>
+  <dgm:styleLbl name="callout">
+    <dgm:fillClrLst meth="repeat">
+      <a:schemeClr val="accent1"/>
+    </dgm:fillClrLst>
+    <dgm:linClrLst meth="repeat">
+      <a:schemeClr val="accent1">
+        <a:tint val="50000"/>
+      </a:schemeClr>
+    </dgm:linClrLst>
+    <dgm:effectClrLst/>
+    <dgm:txLinClrLst/>
+    <dgm:txFillClrLst meth="repeat">
+      <a:schemeClr val="tx1"/>
+    </dgm:txFillClrLst>
+    <dgm:txEffectClrLst/>
+  </dgm:styleLbl>
+  <dgm:styleLbl name="asst0">
+    <dgm:fillClrLst meth="repeat">
+      <a:schemeClr val="accent1"/>
+    </dgm:fillClrLst>
+    <dgm:linClrLst meth="repeat">
+      <a:schemeClr val="lt1"/>
+    </dgm:linClrLst>
+    <dgm:effectClrLst/>
+    <dgm:txLinClrLst/>
+    <dgm:txFillClrLst/>
+    <dgm:txEffectClrLst/>
+  </dgm:styleLbl>
+  <dgm:styleLbl name="asst1">
+    <dgm:fillClrLst meth="repeat">
+      <a:schemeClr val="accent1"/>
+    </dgm:fillClrLst>
+    <dgm:linClrLst meth="repeat">
+      <a:schemeClr val="lt1"/>
+    </dgm:linClrLst>
+    <dgm:effectClrLst/>
+    <dgm:txLinClrLst/>
+    <dgm:txFillClrLst/>
+    <dgm:txEffectClrLst/>
+  </dgm:styleLbl>
+  <dgm:styleLbl name="asst2">
+    <dgm:fillClrLst meth="repeat">
+      <a:schemeClr val="accent1"/>
+    </dgm:fillClrLst>
+    <dgm:linClrLst meth="repeat">
+      <a:schemeClr val="lt1"/>
+    </dgm:linClrLst>
+    <dgm:effectClrLst/>
+    <dgm:txLinClrLst/>
+    <dgm:txFillClrLst/>
+    <dgm:txEffectClrLst/>
+  </dgm:styleLbl>
+  <dgm:styleLbl name="asst3">
+    <dgm:fillClrLst meth="repeat">
+      <a:schemeClr val="accent1"/>
+    </dgm:fillClrLst>
+    <dgm:linClrLst meth="repeat">
+      <a:schemeClr val="lt1"/>
+    </dgm:linClrLst>
+    <dgm:effectClrLst/>
+    <dgm:txLinClrLst/>
+    <dgm:txFillClrLst/>
+    <dgm:txEffectClrLst/>
+  </dgm:styleLbl>
+  <dgm:styleLbl name="asst4">
+    <dgm:fillClrLst meth="repeat">
+      <a:schemeClr val="accent1"/>
+    </dgm:fillClrLst>
+    <dgm:linClrLst meth="repeat">
+      <a:schemeClr val="lt1"/>
+    </dgm:linClrLst>
+    <dgm:effectClrLst/>
+    <dgm:txLinClrLst/>
+    <dgm:txFillClrLst/>
+    <dgm:txEffectClrLst/>
+  </dgm:styleLbl>
+  <dgm:styleLbl name="parChTrans2D1">
+    <dgm:fillClrLst meth="repeat">
+      <a:schemeClr val="accent1">
+        <a:tint val="60000"/>
+      </a:schemeClr>
+    </dgm:fillClrLst>
+    <dgm:linClrLst meth="repeat">
+      <a:schemeClr val="accent1">
+        <a:tint val="60000"/>
+      </a:schemeClr>
+    </dgm:linClrLst>
+    <dgm:effectClrLst/>
+    <dgm:txLinClrLst/>
+    <dgm:txFillClrLst meth="repeat">
+      <a:schemeClr val="lt1"/>
+    </dgm:txFillClrLst>
+    <dgm:txEffectClrLst/>
+  </dgm:styleLbl>
+  <dgm:styleLbl name="parChTrans2D2">
+    <dgm:fillClrLst meth="repeat">
+      <a:schemeClr val="accent1"/>
+    </dgm:fillClrLst>
+    <dgm:linClrLst meth="repeat">
+      <a:schemeClr val="accent1"/>
+    </dgm:linClrLst>
+    <dgm:effectClrLst/>
+    <dgm:txLinClrLst/>
+    <dgm:txFillClrLst meth="repeat">
+      <a:schemeClr val="lt1"/>
+    </dgm:txFillClrLst>
+    <dgm:txEffectClrLst/>
+  </dgm:styleLbl>
+  <dgm:styleLbl name="parChTrans2D3">
+    <dgm:fillClrLst meth="repeat">
+      <a:schemeClr val="accent1"/>
+    </dgm:fillClrLst>
+    <dgm:linClrLst meth="repeat">
+      <a:schemeClr val="accent1"/>
+    </dgm:linClrLst>
+    <dgm:effectClrLst/>
+    <dgm:txLinClrLst/>
+    <dgm:txFillClrLst meth="repeat">
+      <a:schemeClr val="lt1"/>
+    </dgm:txFillClrLst>
+    <dgm:txEffectClrLst/>
+  </dgm:styleLbl>
+  <dgm:styleLbl name="parChTrans2D4">
+    <dgm:fillClrLst meth="repeat">
+      <a:schemeClr val="accent1"/>
+    </dgm:fillClrLst>
+    <dgm:linClrLst meth="repeat">
+      <a:schemeClr val="accent1"/>
+    </dgm:linClrLst>
+    <dgm:effectClrLst/>
+    <dgm:txLinClrLst/>
+    <dgm:txFillClrLst meth="repeat">
+      <a:schemeClr val="lt1"/>
+    </dgm:txFillClrLst>
+    <dgm:txEffectClrLst/>
+  </dgm:styleLbl>
+  <dgm:styleLbl name="parChTrans1D1">
+    <dgm:fillClrLst meth="repeat">
+      <a:schemeClr val="accent1"/>
+    </dgm:fillClrLst>
+    <dgm:linClrLst meth="repeat">
+      <a:schemeClr val="accent1">
+        <a:shade val="60000"/>
+      </a:schemeClr>
+    </dgm:linClrLst>
+    <dgm:effectClrLst/>
+    <dgm:txLinClrLst/>
+    <dgm:txFillClrLst meth="repeat">
+      <a:schemeClr val="tx1"/>
+    </dgm:txFillClrLst>
+    <dgm:txEffectClrLst/>
+  </dgm:styleLbl>
+  <dgm:styleLbl name="parChTrans1D2">
+    <dgm:fillClrLst meth="repeat">
+      <a:schemeClr val="accent1"/>
+    </dgm:fillClrLst>
+    <dgm:linClrLst meth="repeat">
+      <a:schemeClr val="accent1">
+        <a:shade val="60000"/>
+      </a:schemeClr>
+    </dgm:linClrLst>
+    <dgm:effectClrLst/>
+    <dgm:txLinClrLst/>
+    <dgm:txFillClrLst meth="repeat">
+      <a:schemeClr val="tx1"/>
+    </dgm:txFillClrLst>
+    <dgm:txEffectClrLst/>
+  </dgm:styleLbl>
+  <dgm:styleLbl name="parChTrans1D3">
+    <dgm:fillClrLst meth="repeat">
+      <a:schemeClr val="accent1"/>
+    </dgm:fillClrLst>
+    <dgm:linClrLst meth="repeat">
+      <a:schemeClr val="accent1">
+        <a:shade val="80000"/>
+      </a:schemeClr>
+    </dgm:linClrLst>
+    <dgm:effectClrLst/>
+    <dgm:txLinClrLst/>
+    <dgm:txFillClrLst meth="repeat">
+      <a:schemeClr val="tx1"/>
+    </dgm:txFillClrLst>
+    <dgm:txEffectClrLst/>
+  </dgm:styleLbl>
+  <dgm:styleLbl name="parChTrans1D4">
+    <dgm:fillClrLst meth="repeat">
+      <a:schemeClr val="accent1"/>
+    </dgm:fillClrLst>
+    <dgm:linClrLst meth="repeat">
+      <a:schemeClr val="accent1">
+        <a:shade val="80000"/>
+      </a:schemeClr>
+    </dgm:linClrLst>
+    <dgm:effectClrLst/>
+    <dgm:txLinClrLst/>
+    <dgm:txFillClrLst meth="repeat">
+      <a:schemeClr val="tx1"/>
+    </dgm:txFillClrLst>
+    <dgm:txEffectClrLst/>
+  </dgm:styleLbl>
+  <dgm:styleLbl name="fgAcc1">
+    <dgm:fillClrLst meth="repeat">
+      <a:schemeClr val="lt1">
+        <a:alpha val="90000"/>
+      </a:schemeClr>
+    </dgm:fillClrLst>
+    <dgm:linClrLst meth="repeat">
+      <a:schemeClr val="accent1"/>
+    </dgm:linClrLst>
+    <dgm:effectClrLst/>
+    <dgm:txLinClrLst/>
+    <dgm:txFillClrLst meth="repeat">
+      <a:schemeClr val="dk1"/>
+    </dgm:txFillClrLst>
+    <dgm:txEffectClrLst/>
+  </dgm:styleLbl>
+  <dgm:styleLbl name="conFgAcc1">
+    <dgm:fillClrLst meth="repeat">
+      <a:schemeClr val="lt1">
+        <a:alpha val="90000"/>
+      </a:schemeClr>
+    </dgm:fillClrLst>
+    <dgm:linClrLst meth="repeat">
+      <a:schemeClr val="accent1"/>
+    </dgm:linClrLst>
+    <dgm:effectClrLst/>
+    <dgm:txLinClrLst/>
+    <dgm:txFillClrLst meth="repeat">
+      <a:schemeClr val="dk1"/>
+    </dgm:txFillClrLst>
+    <dgm:txEffectClrLst/>
+  </dgm:styleLbl>
+  <dgm:styleLbl name="alignAcc1">
+    <dgm:fillClrLst meth="repeat">
+      <a:schemeClr val="lt1">
+        <a:alpha val="90000"/>
+      </a:schemeClr>
+    </dgm:fillClrLst>
+    <dgm:linClrLst meth="repeat">
+      <a:schemeClr val="accent1"/>
+    </dgm:linClrLst>
+    <dgm:effectClrLst/>
+    <dgm:txLinClrLst/>
+    <dgm:txFillClrLst meth="repeat">
+      <a:schemeClr val="dk1"/>
+    </dgm:txFillClrLst>
+    <dgm:txEffectClrLst/>
+  </dgm:styleLbl>
+  <dgm:styleLbl name="trAlignAcc1">
+    <dgm:fillClrLst meth="repeat">
+      <a:schemeClr val="lt1">
+        <a:alpha val="40000"/>
+      </a:schemeClr>
+    </dgm:fillClrLst>
+    <dgm:linClrLst meth="repeat">
+      <a:schemeClr val="accent1"/>
+    </dgm:linClrLst>
+    <dgm:effectClrLst/>
+    <dgm:txLinClrLst/>
+    <dgm:txFillClrLst meth="repeat">
+      <a:schemeClr val="dk1"/>
+    </dgm:txFillClrLst>
+    <dgm:txEffectClrLst/>
+  </dgm:styleLbl>
+  <dgm:styleLbl name="bgAcc1">
+    <dgm:fillClrLst meth="repeat">
+      <a:schemeClr val="lt1">
+        <a:alpha val="90000"/>
+      </a:schemeClr>
+    </dgm:fillClrLst>
+    <dgm:linClrLst meth="repeat">
+      <a:schemeClr val="accent1"/>
+    </dgm:linClrLst>
+    <dgm:effectClrLst/>
+    <dgm:txLinClrLst/>
+    <dgm:txFillClrLst meth="repeat">
+      <a:schemeClr val="dk1"/>
+    </dgm:txFillClrLst>
+    <dgm:txEffectClrLst/>
+  </dgm:styleLbl>
+  <dgm:styleLbl name="solidFgAcc1">
+    <dgm:fillClrLst meth="repeat">
+      <a:schemeClr val="lt1"/>
+    </dgm:fillClrLst>
+    <dgm:linClrLst meth="repeat">
+      <a:schemeClr val="accent1"/>
+    </dgm:linClrLst>
+    <dgm:effectClrLst/>
+    <dgm:txLinClrLst/>
+    <dgm:txFillClrLst meth="repeat">
+      <a:schemeClr val="dk1"/>
+    </dgm:txFillClrLst>
+    <dgm:txEffectClrLst/>
+  </dgm:styleLbl>
+  <dgm:styleLbl name="solidAlignAcc1">
+    <dgm:fillClrLst meth="repeat">
+      <a:schemeClr val="lt1"/>
+    </dgm:fillClrLst>
+    <dgm:linClrLst meth="repeat">
+      <a:schemeClr val="accent1"/>
+    </dgm:linClrLst>
+    <dgm:effectClrLst/>
+    <dgm:txLinClrLst/>
+    <dgm:txFillClrLst meth="repeat">
+      <a:schemeClr val="dk1"/>
+    </dgm:txFillClrLst>
+    <dgm:txEffectClrLst/>
+  </dgm:styleLbl>
+  <dgm:styleLbl name="solidBgAcc1">
+    <dgm:fillClrLst meth="repeat">
+      <a:schemeClr val="lt1"/>
+    </dgm:fillClrLst>
+    <dgm:linClrLst meth="repeat">
+      <a:schemeClr val="accent1"/>
+    </dgm:linClrLst>
+    <dgm:effectClrLst/>
+    <dgm:txLinClrLst/>
+    <dgm:txFillClrLst meth="repeat">
+      <a:schemeClr val="dk1"/>
+    </dgm:txFillClrLst>
+    <dgm:txEffectClrLst/>
+  </dgm:styleLbl>
+  <dgm:styleLbl name="fgAccFollowNode1">
+    <dgm:fillClrLst meth="repeat">
+      <a:schemeClr val="accent1">
+        <a:alpha val="90000"/>
+        <a:tint val="40000"/>
+      </a:schemeClr>
+    </dgm:fillClrLst>
+    <dgm:linClrLst meth="repeat">
+      <a:schemeClr val="accent1">
+        <a:alpha val="90000"/>
+        <a:tint val="40000"/>
+      </a:schemeClr>
+    </dgm:linClrLst>
+    <dgm:effectClrLst/>
+    <dgm:txLinClrLst/>
+    <dgm:txFillClrLst meth="repeat">
+      <a:schemeClr val="dk1"/>
+    </dgm:txFillClrLst>
+    <dgm:txEffectClrLst/>
+  </dgm:styleLbl>
+  <dgm:styleLbl name="alignAccFollowNode1">
+    <dgm:fillClrLst meth="repeat">
+      <a:schemeClr val="accent1">
+        <a:alpha val="90000"/>
+        <a:tint val="40000"/>
+      </a:schemeClr>
+    </dgm:fillClrLst>
+    <dgm:linClrLst meth="repeat">
+      <a:schemeClr val="accent1">
+        <a:alpha val="90000"/>
+        <a:tint val="40000"/>
+      </a:schemeClr>
+    </dgm:linClrLst>
+    <dgm:effectClrLst/>
+    <dgm:txLinClrLst/>
+    <dgm:txFillClrLst meth="repeat">
+      <a:schemeClr val="dk1"/>
+    </dgm:txFillClrLst>
+    <dgm:txEffectClrLst/>
+  </dgm:styleLbl>
+  <dgm:styleLbl name="bgAccFollowNode1">
+    <dgm:fillClrLst meth="repeat">
+      <a:schemeClr val="accent1">
+        <a:alpha val="90000"/>
+        <a:tint val="40000"/>
+      </a:schemeClr>
+    </dgm:fillClrLst>
+    <dgm:linClrLst meth="repeat">
+      <a:schemeClr val="accent1">
+        <a:alpha val="90000"/>
+        <a:tint val="40000"/>
+      </a:schemeClr>
+    </dgm:linClrLst>
+    <dgm:effectClrLst/>
+    <dgm:txLinClrLst/>
+    <dgm:txFillClrLst meth="repeat">
+      <a:schemeClr val="dk1"/>
+    </dgm:txFillClrLst>
+    <dgm:txEffectClrLst/>
+  </dgm:styleLbl>
+  <dgm:styleLbl name="fgAcc0">
+    <dgm:fillClrLst meth="repeat">
+      <a:schemeClr val="lt1">
+        <a:alpha val="90000"/>
+      </a:schemeClr>
+    </dgm:fillClrLst>
+    <dgm:linClrLst meth="repeat">
+      <a:schemeClr val="accent1"/>
+    </dgm:linClrLst>
+    <dgm:effectClrLst/>
+    <dgm:txLinClrLst/>
+    <dgm:txFillClrLst meth="repeat">
+      <a:schemeClr val="dk1"/>
+    </dgm:txFillClrLst>
+    <dgm:txEffectClrLst/>
+  </dgm:styleLbl>
+  <dgm:styleLbl name="fgAcc2">
+    <dgm:fillClrLst meth="repeat">
+      <a:schemeClr val="lt1">
+        <a:alpha val="90000"/>
+      </a:schemeClr>
+    </dgm:fillClrLst>
+    <dgm:linClrLst meth="repeat">
+      <a:schemeClr val="accent1"/>
+    </dgm:linClrLst>
+    <dgm:effectClrLst/>
+    <dgm:txLinClrLst/>
+    <dgm:txFillClrLst meth="repeat">
+      <a:schemeClr val="dk1"/>
+    </dgm:txFillClrLst>
+    <dgm:txEffectClrLst/>
+  </dgm:styleLbl>
+  <dgm:styleLbl name="fgAcc3">
+    <dgm:fillClrLst meth="repeat">
+      <a:schemeClr val="lt1">
+        <a:alpha val="90000"/>
+      </a:schemeClr>
+    </dgm:fillClrLst>
+    <dgm:linClrLst meth="repeat">
+      <a:schemeClr val="accent1"/>
+    </dgm:linClrLst>
+    <dgm:effectClrLst/>
+    <dgm:txLinClrLst/>
+    <dgm:txFillClrLst meth="repeat">
+      <a:schemeClr val="dk1"/>
+    </dgm:txFillClrLst>
+    <dgm:txEffectClrLst/>
+  </dgm:styleLbl>
+  <dgm:styleLbl name="fgAcc4">
+    <dgm:fillClrLst meth="repeat">
+      <a:schemeClr val="lt1">
+        <a:alpha val="90000"/>
+      </a:schemeClr>
+    </dgm:fillClrLst>
+    <dgm:linClrLst meth="repeat">
+      <a:schemeClr val="accent1"/>
+    </dgm:linClrLst>
+    <dgm:effectClrLst/>
+    <dgm:txLinClrLst/>
+    <dgm:txFillClrLst meth="repeat">
+      <a:schemeClr val="dk1"/>
+    </dgm:txFillClrLst>
+    <dgm:txEffectClrLst/>
+  </dgm:styleLbl>
+  <dgm:styleLbl name="bgShp">
+    <dgm:fillClrLst meth="repeat">
+      <a:schemeClr val="accent1">
+        <a:tint val="40000"/>
+      </a:schemeClr>
+    </dgm:fillClrLst>
+    <dgm:linClrLst meth="repeat">
+      <a:schemeClr val="accent1"/>
+    </dgm:linClrLst>
+    <dgm:effectClrLst/>
+    <dgm:txLinClrLst/>
+    <dgm:txFillClrLst meth="repeat">
+      <a:schemeClr val="dk1"/>
+    </dgm:txFillClrLst>
+    <dgm:txEffectClrLst/>
+  </dgm:styleLbl>
+  <dgm:styleLbl name="dkBgShp">
+    <dgm:fillClrLst meth="repeat">
+      <a:schemeClr val="accent1">
+        <a:shade val="80000"/>
+      </a:schemeClr>
+    </dgm:fillClrLst>
+    <dgm:linClrLst meth="repeat">
+      <a:schemeClr val="accent1"/>
+    </dgm:linClrLst>
+    <dgm:effectClrLst/>
+    <dgm:txLinClrLst/>
+    <dgm:txFillClrLst meth="repeat">
+      <a:schemeClr val="lt1"/>
+    </dgm:txFillClrLst>
+    <dgm:txEffectClrLst/>
+  </dgm:styleLbl>
+  <dgm:styleLbl name="trBgShp">
+    <dgm:fillClrLst meth="repeat">
+      <a:schemeClr val="accent1">
+        <a:tint val="50000"/>
+        <a:alpha val="40000"/>
+      </a:schemeClr>
+    </dgm:fillClrLst>
+    <dgm:linClrLst meth="repeat">
+      <a:schemeClr val="accent1"/>
+    </dgm:linClrLst>
+    <dgm:effectClrLst/>
+    <dgm:txLinClrLst/>
+    <dgm:txFillClrLst meth="repeat">
+      <a:schemeClr val="lt1"/>
+    </dgm:txFillClrLst>
+    <dgm:txEffectClrLst/>
+  </dgm:styleLbl>
+  <dgm:styleLbl name="fgShp">
+    <dgm:fillClrLst meth="repeat">
+      <a:schemeClr val="accent1">
+        <a:tint val="60000"/>
+      </a:schemeClr>
+    </dgm:fillClrLst>
+    <dgm:linClrLst meth="repeat">
+      <a:schemeClr val="lt1"/>
+    </dgm:linClrLst>
+    <dgm:effectClrLst/>
+    <dgm:txLinClrLst/>
+    <dgm:txFillClrLst meth="repeat">
+      <a:schemeClr val="dk1"/>
+    </dgm:txFillClrLst>
+    <dgm:txEffectClrLst/>
+  </dgm:styleLbl>
+  <dgm:styleLbl name="revTx">
+    <dgm:fillClrLst meth="repeat">
+      <a:schemeClr val="lt1">
+        <a:alpha val="0"/>
+      </a:schemeClr>
+    </dgm:fillClrLst>
+    <dgm:linClrLst meth="repeat">
+      <a:schemeClr val="dk1">
+        <a:alpha val="0"/>
+      </a:schemeClr>
+    </dgm:linClrLst>
+    <dgm:effectClrLst/>
+    <dgm:txLinClrLst/>
+    <dgm:txFillClrLst meth="repeat">
+      <a:schemeClr val="tx1"/>
+    </dgm:txFillClrLst>
+    <dgm:txEffectClrLst/>
+  </dgm:styleLbl>
+</dgm:colorsDef>
+</file>
+
+<file path=ppt/diagrams/data1.xml><?xml version="1.0" encoding="utf-8"?>
+<dgm:dataModel xmlns:dgm="http://schemas.openxmlformats.org/drawingml/2006/diagram" xmlns:a="http://schemas.openxmlformats.org/drawingml/2006/main">
+  <dgm:ptLst>
+    <dgm:pt modelId="{FD3FB691-45D7-F04B-BA66-3F60EDADF4E1}" type="doc">
+      <dgm:prSet loTypeId="urn:microsoft.com/office/officeart/2005/8/layout/venn1" loCatId="" qsTypeId="urn:microsoft.com/office/officeart/2005/8/quickstyle/simple1" qsCatId="simple" csTypeId="urn:microsoft.com/office/officeart/2005/8/colors/accent1_2" csCatId="accent1" phldr="1"/>
+      <dgm:spPr/>
+    </dgm:pt>
+    <dgm:pt modelId="{AEB74F8B-CA02-4340-AB5C-4BB933202493}">
+      <dgm:prSet phldrT="[Text]"/>
+      <dgm:spPr/>
+      <dgm:t>
+        <a:bodyPr/>
+        <a:lstStyle/>
+        <a:p>
+          <a:r>
+            <a:rPr lang="en-US" dirty="0"/>
+            <a:t>Geospatial modeling</a:t>
+          </a:r>
+        </a:p>
+      </dgm:t>
+    </dgm:pt>
+    <dgm:pt modelId="{45376AE1-BF84-F743-8F6C-1A8B7BE03EA2}" type="parTrans" cxnId="{95B0B495-FE4F-934C-8002-67BC070E3AF4}">
+      <dgm:prSet/>
+      <dgm:spPr/>
+      <dgm:t>
+        <a:bodyPr/>
+        <a:lstStyle/>
+        <a:p>
+          <a:endParaRPr lang="en-US"/>
+        </a:p>
+      </dgm:t>
+    </dgm:pt>
+    <dgm:pt modelId="{9207088D-DADD-0147-A015-05667C8BDCDD}" type="sibTrans" cxnId="{95B0B495-FE4F-934C-8002-67BC070E3AF4}">
+      <dgm:prSet/>
+      <dgm:spPr/>
+      <dgm:t>
+        <a:bodyPr/>
+        <a:lstStyle/>
+        <a:p>
+          <a:endParaRPr lang="en-US"/>
+        </a:p>
+      </dgm:t>
+    </dgm:pt>
+    <dgm:pt modelId="{137565BA-E0BF-ED42-8AEF-4C9372C565F0}">
+      <dgm:prSet phldrT="[Text]"/>
+      <dgm:spPr/>
+      <dgm:t>
+        <a:bodyPr/>
+        <a:lstStyle/>
+        <a:p>
+          <a:r>
+            <a:rPr lang="en-US" dirty="0"/>
+            <a:t>Machine learning</a:t>
+          </a:r>
+        </a:p>
+      </dgm:t>
+    </dgm:pt>
+    <dgm:pt modelId="{59866C2A-7C1C-6742-A6DF-68DD02290325}" type="parTrans" cxnId="{B451CBC8-09D1-EC4D-8648-71E1A66FBFD6}">
+      <dgm:prSet/>
+      <dgm:spPr/>
+      <dgm:t>
+        <a:bodyPr/>
+        <a:lstStyle/>
+        <a:p>
+          <a:endParaRPr lang="en-US"/>
+        </a:p>
+      </dgm:t>
+    </dgm:pt>
+    <dgm:pt modelId="{8263563D-1CDF-B644-BBE6-F856B248A714}" type="sibTrans" cxnId="{B451CBC8-09D1-EC4D-8648-71E1A66FBFD6}">
+      <dgm:prSet/>
+      <dgm:spPr/>
+      <dgm:t>
+        <a:bodyPr/>
+        <a:lstStyle/>
+        <a:p>
+          <a:endParaRPr lang="en-US"/>
+        </a:p>
+      </dgm:t>
+    </dgm:pt>
+    <dgm:pt modelId="{4020AD38-9C05-B144-8803-6DF76CECF272}" type="pres">
+      <dgm:prSet presAssocID="{FD3FB691-45D7-F04B-BA66-3F60EDADF4E1}" presName="compositeShape" presStyleCnt="0">
+        <dgm:presLayoutVars>
+          <dgm:chMax val="7"/>
+          <dgm:dir/>
+          <dgm:resizeHandles val="exact"/>
+        </dgm:presLayoutVars>
+      </dgm:prSet>
+      <dgm:spPr/>
+    </dgm:pt>
+    <dgm:pt modelId="{178522FE-15D3-3442-9CEA-2D2226F2EBE1}" type="pres">
+      <dgm:prSet presAssocID="{AEB74F8B-CA02-4340-AB5C-4BB933202493}" presName="circ1" presStyleLbl="vennNode1" presStyleIdx="0" presStyleCnt="2"/>
+      <dgm:spPr/>
+    </dgm:pt>
+    <dgm:pt modelId="{D1CA48D6-15B1-8741-8C43-B212291E5D93}" type="pres">
+      <dgm:prSet presAssocID="{AEB74F8B-CA02-4340-AB5C-4BB933202493}" presName="circ1Tx" presStyleLbl="revTx" presStyleIdx="0" presStyleCnt="0">
+        <dgm:presLayoutVars>
+          <dgm:chMax val="0"/>
+          <dgm:chPref val="0"/>
+          <dgm:bulletEnabled val="1"/>
+        </dgm:presLayoutVars>
+      </dgm:prSet>
+      <dgm:spPr/>
+    </dgm:pt>
+    <dgm:pt modelId="{DB3153B1-09EC-B24B-9DF1-54D6A6906C64}" type="pres">
+      <dgm:prSet presAssocID="{137565BA-E0BF-ED42-8AEF-4C9372C565F0}" presName="circ2" presStyleLbl="vennNode1" presStyleIdx="1" presStyleCnt="2"/>
+      <dgm:spPr/>
+    </dgm:pt>
+    <dgm:pt modelId="{E138EA91-CE2D-2847-8ABE-FDE6F55A9C0F}" type="pres">
+      <dgm:prSet presAssocID="{137565BA-E0BF-ED42-8AEF-4C9372C565F0}" presName="circ2Tx" presStyleLbl="revTx" presStyleIdx="0" presStyleCnt="0">
+        <dgm:presLayoutVars>
+          <dgm:chMax val="0"/>
+          <dgm:chPref val="0"/>
+          <dgm:bulletEnabled val="1"/>
+        </dgm:presLayoutVars>
+      </dgm:prSet>
+      <dgm:spPr/>
+    </dgm:pt>
+  </dgm:ptLst>
+  <dgm:cxnLst>
+    <dgm:cxn modelId="{2B787D04-025D-3E4A-8F88-E5EF3F40536A}" type="presOf" srcId="{AEB74F8B-CA02-4340-AB5C-4BB933202493}" destId="{178522FE-15D3-3442-9CEA-2D2226F2EBE1}" srcOrd="0" destOrd="0" presId="urn:microsoft.com/office/officeart/2005/8/layout/venn1"/>
+    <dgm:cxn modelId="{DF151620-52CE-FA4B-9BED-B7DF4A212B07}" type="presOf" srcId="{137565BA-E0BF-ED42-8AEF-4C9372C565F0}" destId="{DB3153B1-09EC-B24B-9DF1-54D6A6906C64}" srcOrd="0" destOrd="0" presId="urn:microsoft.com/office/officeart/2005/8/layout/venn1"/>
+    <dgm:cxn modelId="{95B0B495-FE4F-934C-8002-67BC070E3AF4}" srcId="{FD3FB691-45D7-F04B-BA66-3F60EDADF4E1}" destId="{AEB74F8B-CA02-4340-AB5C-4BB933202493}" srcOrd="0" destOrd="0" parTransId="{45376AE1-BF84-F743-8F6C-1A8B7BE03EA2}" sibTransId="{9207088D-DADD-0147-A015-05667C8BDCDD}"/>
+    <dgm:cxn modelId="{EF8267A3-1F6C-144F-9A11-91ED0CE424A2}" type="presOf" srcId="{AEB74F8B-CA02-4340-AB5C-4BB933202493}" destId="{D1CA48D6-15B1-8741-8C43-B212291E5D93}" srcOrd="1" destOrd="0" presId="urn:microsoft.com/office/officeart/2005/8/layout/venn1"/>
+    <dgm:cxn modelId="{B451CBC8-09D1-EC4D-8648-71E1A66FBFD6}" srcId="{FD3FB691-45D7-F04B-BA66-3F60EDADF4E1}" destId="{137565BA-E0BF-ED42-8AEF-4C9372C565F0}" srcOrd="1" destOrd="0" parTransId="{59866C2A-7C1C-6742-A6DF-68DD02290325}" sibTransId="{8263563D-1CDF-B644-BBE6-F856B248A714}"/>
+    <dgm:cxn modelId="{CF0817D9-913A-5A49-A266-C9C4FD5ED0B8}" type="presOf" srcId="{FD3FB691-45D7-F04B-BA66-3F60EDADF4E1}" destId="{4020AD38-9C05-B144-8803-6DF76CECF272}" srcOrd="0" destOrd="0" presId="urn:microsoft.com/office/officeart/2005/8/layout/venn1"/>
+    <dgm:cxn modelId="{6E6F38FD-7FB4-2A4F-BCA9-566E07F1ACAF}" type="presOf" srcId="{137565BA-E0BF-ED42-8AEF-4C9372C565F0}" destId="{E138EA91-CE2D-2847-8ABE-FDE6F55A9C0F}" srcOrd="1" destOrd="0" presId="urn:microsoft.com/office/officeart/2005/8/layout/venn1"/>
+    <dgm:cxn modelId="{AB5EBF4A-D075-D941-B227-F7DECEB5B87E}" type="presParOf" srcId="{4020AD38-9C05-B144-8803-6DF76CECF272}" destId="{178522FE-15D3-3442-9CEA-2D2226F2EBE1}" srcOrd="0" destOrd="0" presId="urn:microsoft.com/office/officeart/2005/8/layout/venn1"/>
+    <dgm:cxn modelId="{10C56C0D-9D10-D04B-9D8F-F4A676FD05E8}" type="presParOf" srcId="{4020AD38-9C05-B144-8803-6DF76CECF272}" destId="{D1CA48D6-15B1-8741-8C43-B212291E5D93}" srcOrd="1" destOrd="0" presId="urn:microsoft.com/office/officeart/2005/8/layout/venn1"/>
+    <dgm:cxn modelId="{53B42072-05AD-144F-A5E5-102112BD7BC0}" type="presParOf" srcId="{4020AD38-9C05-B144-8803-6DF76CECF272}" destId="{DB3153B1-09EC-B24B-9DF1-54D6A6906C64}" srcOrd="2" destOrd="0" presId="urn:microsoft.com/office/officeart/2005/8/layout/venn1"/>
+    <dgm:cxn modelId="{E88D39D3-6B09-C44F-9A84-149985031E1C}" type="presParOf" srcId="{4020AD38-9C05-B144-8803-6DF76CECF272}" destId="{E138EA91-CE2D-2847-8ABE-FDE6F55A9C0F}" srcOrd="3" destOrd="0" presId="urn:microsoft.com/office/officeart/2005/8/layout/venn1"/>
+  </dgm:cxnLst>
+  <dgm:bg/>
+  <dgm:whole/>
+  <dgm:extLst>
+    <a:ext uri="http://schemas.microsoft.com/office/drawing/2008/diagram">
+      <dsp:dataModelExt xmlns:dsp="http://schemas.microsoft.com/office/drawing/2008/diagram" relId="rId6" minVer="http://schemas.openxmlformats.org/drawingml/2006/diagram"/>
+    </a:ext>
+  </dgm:extLst>
+</dgm:dataModel>
+</file>
+
+<file path=ppt/diagrams/drawing1.xml><?xml version="1.0" encoding="utf-8"?>
+<dsp:drawing xmlns:dgm="http://schemas.openxmlformats.org/drawingml/2006/diagram" xmlns:dsp="http://schemas.microsoft.com/office/drawing/2008/diagram" xmlns:a="http://schemas.openxmlformats.org/drawingml/2006/main">
+  <dsp:spTree>
+    <dsp:nvGrpSpPr>
+      <dsp:cNvPr id="0" name=""/>
+      <dsp:cNvGrpSpPr/>
+    </dsp:nvGrpSpPr>
+    <dsp:grpSpPr/>
+    <dsp:sp modelId="{178522FE-15D3-3442-9CEA-2D2226F2EBE1}">
+      <dsp:nvSpPr>
+        <dsp:cNvPr id="0" name=""/>
+        <dsp:cNvSpPr/>
+      </dsp:nvSpPr>
+      <dsp:spPr>
+        <a:xfrm>
+          <a:off x="74104" y="291486"/>
+          <a:ext cx="1827910" cy="1827910"/>
+        </a:xfrm>
+        <a:prstGeom prst="ellipse">
+          <a:avLst/>
+        </a:prstGeom>
+        <a:solidFill>
+          <a:schemeClr val="accent1">
+            <a:alpha val="50000"/>
+            <a:hueOff val="0"/>
+            <a:satOff val="0"/>
+            <a:lumOff val="0"/>
+            <a:alphaOff val="0"/>
+          </a:schemeClr>
+        </a:solidFill>
+        <a:ln w="25400" cap="flat" cmpd="sng" algn="ctr">
+          <a:solidFill>
+            <a:schemeClr val="lt1">
+              <a:hueOff val="0"/>
+              <a:satOff val="0"/>
+              <a:lumOff val="0"/>
+              <a:alphaOff val="0"/>
+            </a:schemeClr>
+          </a:solidFill>
+          <a:prstDash val="solid"/>
+        </a:ln>
+        <a:effectLst/>
+      </dsp:spPr>
+      <dsp:style>
+        <a:lnRef idx="2">
+          <a:scrgbClr r="0" g="0" b="0"/>
+        </a:lnRef>
+        <a:fillRef idx="1">
+          <a:scrgbClr r="0" g="0" b="0"/>
+        </a:fillRef>
+        <a:effectRef idx="0">
+          <a:scrgbClr r="0" g="0" b="0"/>
+        </a:effectRef>
+        <a:fontRef idx="minor">
+          <a:schemeClr val="tx1"/>
+        </a:fontRef>
+      </dsp:style>
+      <dsp:txBody>
+        <a:bodyPr spcFirstLastPara="0" vert="horz" wrap="square" lIns="0" tIns="0" rIns="0" bIns="0" numCol="1" spcCol="1270" anchor="ctr" anchorCtr="0">
+          <a:noAutofit/>
+        </a:bodyPr>
+        <a:lstStyle/>
+        <a:p>
+          <a:pPr marL="0" lvl="0" indent="0" algn="ctr" defTabSz="844550">
+            <a:lnSpc>
+              <a:spcPct val="90000"/>
+            </a:lnSpc>
+            <a:spcBef>
+              <a:spcPct val="0"/>
+            </a:spcBef>
+            <a:spcAft>
+              <a:spcPct val="35000"/>
+            </a:spcAft>
+            <a:buNone/>
+          </a:pPr>
+          <a:r>
+            <a:rPr lang="en-US" sz="1900" kern="1200" dirty="0"/>
+            <a:t>Geospatial modeling</a:t>
+          </a:r>
+        </a:p>
+      </dsp:txBody>
+      <dsp:txXfrm>
+        <a:off x="329353" y="507036"/>
+        <a:ext cx="1053930" cy="1396810"/>
+      </dsp:txXfrm>
+    </dsp:sp>
+    <dsp:sp modelId="{DB3153B1-09EC-B24B-9DF1-54D6A6906C64}">
+      <dsp:nvSpPr>
+        <dsp:cNvPr id="0" name=""/>
+        <dsp:cNvSpPr/>
+      </dsp:nvSpPr>
+      <dsp:spPr>
+        <a:xfrm>
+          <a:off x="1391517" y="291486"/>
+          <a:ext cx="1827910" cy="1827910"/>
+        </a:xfrm>
+        <a:prstGeom prst="ellipse">
+          <a:avLst/>
+        </a:prstGeom>
+        <a:solidFill>
+          <a:schemeClr val="accent1">
+            <a:alpha val="50000"/>
+            <a:hueOff val="0"/>
+            <a:satOff val="0"/>
+            <a:lumOff val="0"/>
+            <a:alphaOff val="0"/>
+          </a:schemeClr>
+        </a:solidFill>
+        <a:ln w="25400" cap="flat" cmpd="sng" algn="ctr">
+          <a:solidFill>
+            <a:schemeClr val="lt1">
+              <a:hueOff val="0"/>
+              <a:satOff val="0"/>
+              <a:lumOff val="0"/>
+              <a:alphaOff val="0"/>
+            </a:schemeClr>
+          </a:solidFill>
+          <a:prstDash val="solid"/>
+        </a:ln>
+        <a:effectLst/>
+      </dsp:spPr>
+      <dsp:style>
+        <a:lnRef idx="2">
+          <a:scrgbClr r="0" g="0" b="0"/>
+        </a:lnRef>
+        <a:fillRef idx="1">
+          <a:scrgbClr r="0" g="0" b="0"/>
+        </a:fillRef>
+        <a:effectRef idx="0">
+          <a:scrgbClr r="0" g="0" b="0"/>
+        </a:effectRef>
+        <a:fontRef idx="minor">
+          <a:schemeClr val="tx1"/>
+        </a:fontRef>
+      </dsp:style>
+      <dsp:txBody>
+        <a:bodyPr spcFirstLastPara="0" vert="horz" wrap="square" lIns="0" tIns="0" rIns="0" bIns="0" numCol="1" spcCol="1270" anchor="ctr" anchorCtr="0">
+          <a:noAutofit/>
+        </a:bodyPr>
+        <a:lstStyle/>
+        <a:p>
+          <a:pPr marL="0" lvl="0" indent="0" algn="ctr" defTabSz="844550">
+            <a:lnSpc>
+              <a:spcPct val="90000"/>
+            </a:lnSpc>
+            <a:spcBef>
+              <a:spcPct val="0"/>
+            </a:spcBef>
+            <a:spcAft>
+              <a:spcPct val="35000"/>
+            </a:spcAft>
+            <a:buNone/>
+          </a:pPr>
+          <a:r>
+            <a:rPr lang="en-US" sz="1900" kern="1200" dirty="0"/>
+            <a:t>Machine learning</a:t>
+          </a:r>
+        </a:p>
+      </dsp:txBody>
+      <dsp:txXfrm>
+        <a:off x="1910249" y="507036"/>
+        <a:ext cx="1053930" cy="1396810"/>
+      </dsp:txXfrm>
+    </dsp:sp>
+  </dsp:spTree>
+</dsp:drawing>
+</file>
+
+<file path=ppt/diagrams/layout1.xml><?xml version="1.0" encoding="utf-8"?>
+<dgm:layoutDef xmlns:dgm="http://schemas.openxmlformats.org/drawingml/2006/diagram" xmlns:a="http://schemas.openxmlformats.org/drawingml/2006/main" uniqueId="urn:microsoft.com/office/officeart/2005/8/layout/venn1">
+  <dgm:title val=""/>
+  <dgm:desc val=""/>
+  <dgm:catLst>
+    <dgm:cat type="relationship" pri="28000"/>
+    <dgm:cat type="convert" pri="19000"/>
+  </dgm:catLst>
+  <dgm:sampData useDef="1">
+    <dgm:dataModel>
+      <dgm:ptLst/>
+      <dgm:bg/>
+      <dgm:whole/>
+    </dgm:dataModel>
+  </dgm:sampData>
+  <dgm:styleData useDef="1">
+    <dgm:dataModel>
+      <dgm:ptLst/>
+      <dgm:bg/>
+      <dgm:whole/>
+    </dgm:dataModel>
+  </dgm:styleData>
+  <dgm:clrData>
+    <dgm:dataModel>
+      <dgm:ptLst>
+        <dgm:pt modelId="0" type="doc"/>
+        <dgm:pt modelId="1"/>
+        <dgm:pt modelId="2"/>
+        <dgm:pt modelId="3"/>
+        <dgm:pt modelId="4"/>
+      </dgm:ptLst>
+      <dgm:cxnLst>
+        <dgm:cxn modelId="7" srcId="0" destId="1" srcOrd="0" destOrd="0"/>
+        <dgm:cxn modelId="8" srcId="0" destId="2" srcOrd="1" destOrd="0"/>
+        <dgm:cxn modelId="9" srcId="0" destId="3" srcOrd="2" destOrd="0"/>
+        <dgm:cxn modelId="10" srcId="0" destId="4" srcOrd="3" destOrd="0"/>
+      </dgm:cxnLst>
+      <dgm:bg/>
+      <dgm:whole/>
+    </dgm:dataModel>
+  </dgm:clrData>
+  <dgm:layoutNode name="compositeShape">
+    <dgm:varLst>
+      <dgm:chMax val="7"/>
+      <dgm:dir/>
+      <dgm:resizeHandles val="exact"/>
+    </dgm:varLst>
+    <dgm:choose name="Name0">
+      <dgm:if name="Name1" axis="ch" ptType="node" func="cnt" op="equ" val="1">
+        <dgm:alg type="composite">
+          <dgm:param type="ar" val="1"/>
+        </dgm:alg>
+      </dgm:if>
+      <dgm:if name="Name2" axis="ch" ptType="node" func="cnt" op="equ" val="2">
+        <dgm:alg type="composite">
+          <dgm:param type="ar" val="1.792"/>
+        </dgm:alg>
+      </dgm:if>
+      <dgm:if name="Name3" axis="ch" ptType="node" func="cnt" op="equ" val="3">
+        <dgm:alg type="composite">
+          <dgm:param type="ar" val="1"/>
+        </dgm:alg>
+      </dgm:if>
+      <dgm:if name="Name4" axis="ch" ptType="node" func="cnt" op="equ" val="4">
+        <dgm:alg type="composite">
+          <dgm:param type="ar" val="1"/>
+        </dgm:alg>
+      </dgm:if>
+      <dgm:if name="Name5" axis="ch" ptType="node" func="cnt" op="equ" val="5">
+        <dgm:alg type="composite">
+          <dgm:param type="ar" val="1.4"/>
+        </dgm:alg>
+      </dgm:if>
+      <dgm:if name="Name6" axis="ch" ptType="node" func="cnt" op="equ" val="6">
+        <dgm:alg type="composite">
+          <dgm:param type="ar" val="1.285"/>
+        </dgm:alg>
+      </dgm:if>
+      <dgm:if name="Name7" axis="ch" ptType="node" func="cnt" op="equ" val="7">
+        <dgm:alg type="composite">
+          <dgm:param type="ar" val="1.359"/>
+        </dgm:alg>
+      </dgm:if>
+      <dgm:else name="Name8">
+        <dgm:alg type="composite">
+          <dgm:param type="ar" val="1.359"/>
+        </dgm:alg>
+      </dgm:else>
+    </dgm:choose>
+    <dgm:shape xmlns:r="http://schemas.openxmlformats.org/officeDocument/2006/relationships" r:blip="">
+      <dgm:adjLst/>
+    </dgm:shape>
+    <dgm:presOf/>
+    <dgm:choose name="Name9">
+      <dgm:if name="Name10" axis="ch" ptType="node" func="cnt" op="equ" val="1">
+        <dgm:constrLst>
+          <dgm:constr type="ctrX" for="ch" forName="circ1TxSh" refType="w" fact="0.5"/>
+          <dgm:constr type="ctrY" for="ch" forName="circ1TxSh" refType="h" fact="0.5"/>
+          <dgm:constr type="w" for="ch" forName="circ1TxSh" refType="w"/>
+          <dgm:constr type="h" for="ch" forName="circ1TxSh" refType="h"/>
+          <dgm:constr type="primFontSz" for="ch" ptType="node" op="equ"/>
+        </dgm:constrLst>
+      </dgm:if>
+      <dgm:if name="Name11" axis="ch" ptType="node" func="cnt" op="equ" val="2">
+        <dgm:constrLst>
+          <dgm:constr type="ctrX" for="ch" forName="circ1" refType="w" fact="0.3"/>
+          <dgm:constr type="ctrY" for="ch" forName="circ1" refType="h" fact="0.5"/>
+          <dgm:constr type="w" for="ch" forName="circ1" refType="w" fact="0.555"/>
+          <dgm:constr type="h" for="ch" forName="circ1" refType="h" fact="0.99456"/>
+          <dgm:constr type="l" for="ch" forName="circ1Tx" refType="w" fact="0.1"/>
+          <dgm:constr type="t" for="ch" forName="circ1Tx" refType="h" fact="0.12"/>
+          <dgm:constr type="w" for="ch" forName="circ1Tx" refType="w" fact="0.32"/>
+          <dgm:constr type="h" for="ch" forName="circ1Tx" refType="h" fact="0.76"/>
+          <dgm:constr type="ctrX" for="ch" forName="circ2" refType="w" fact="0.7"/>
+          <dgm:constr type="ctrY" for="ch" forName="circ2" refType="h" fact="0.5"/>
+          <dgm:constr type="w" for="ch" forName="circ2" refType="w" fact="0.555"/>
+          <dgm:constr type="h" for="ch" forName="circ2" refType="h" fact="0.99456"/>
+          <dgm:constr type="l" for="ch" forName="circ2Tx" refType="w" fact="0.58"/>
+          <dgm:constr type="t" for="ch" forName="circ2Tx" refType="h" fact="0.12"/>
+          <dgm:constr type="w" for="ch" forName="circ2Tx" refType="w" fact="0.32"/>
+          <dgm:constr type="h" for="ch" forName="circ2Tx" refType="h" fact="0.76"/>
+          <dgm:constr type="primFontSz" for="ch" ptType="node" op="equ"/>
+        </dgm:constrLst>
+      </dgm:if>
+      <dgm:if name="Name12" axis="ch" ptType="node" func="cnt" op="equ" val="3">
+        <dgm:constrLst>
+          <dgm:constr type="ctrX" for="ch" forName="circ1" refType="w" fact="0.5"/>
+          <dgm:constr type="ctrY" for="ch" forName="circ1" refType="w" fact="0.25"/>
+          <dgm:constr type="w" for="ch" forName="circ1" refType="w" fact="0.6"/>
+          <dgm:constr type="h" for="ch" forName="circ1" refType="h" fact="0.6"/>
+          <dgm:constr type="l" for="ch" forName="circ1Tx" refType="w" fact="0.28"/>
+          <dgm:constr type="t" for="ch" forName="circ1Tx" refType="h" fact="0.055"/>
+          <dgm:constr type="w" for="ch" forName="circ1Tx" refType="w" fact="0.44"/>
+          <dgm:constr type="h" for="ch" forName="circ1Tx" refType="h" fact="0.27"/>
+          <dgm:constr type="ctrX" for="ch" forName="circ2" refType="w" fact="0.7165"/>
+          <dgm:constr type="ctrY" for="ch" forName="circ2" refType="w" fact="0.625"/>
+          <dgm:constr type="w" for="ch" forName="circ2" refType="w" fact="0.6"/>
+          <dgm:constr type="h" for="ch" forName="circ2" refType="h" fact="0.6"/>
+          <dgm:constr type="l" for="ch" forName="circ2Tx" refType="w" fact="0.6"/>
+          <dgm:constr type="t" for="ch" forName="circ2Tx" refType="h" fact="0.48"/>
+          <dgm:constr type="w" for="ch" forName="circ2Tx" refType="w" fact="0.36"/>
+          <dgm:constr type="h" for="ch" forName="circ2Tx" refType="h" fact="0.33"/>
+          <dgm:constr type="ctrX" for="ch" forName="circ3" refType="w" fact="0.2835"/>
+          <dgm:constr type="ctrY" for="ch" forName="circ3" refType="w" fact="0.625"/>
+          <dgm:constr type="w" for="ch" forName="circ3" refType="w" fact="0.6"/>
+          <dgm:constr type="h" for="ch" forName="circ3" refType="h" fact="0.6"/>
+          <dgm:constr type="l" for="ch" forName="circ3Tx" refType="w" fact="0.04"/>
+          <dgm:constr type="t" for="ch" forName="circ3Tx" refType="h" fact="0.48"/>
+          <dgm:constr type="w" for="ch" forName="circ3Tx" refType="w" fact="0.36"/>
+          <dgm:constr type="h" for="ch" forName="circ3Tx" refType="h" fact="0.33"/>
+          <dgm:constr type="primFontSz" for="ch" ptType="node" op="equ"/>
+        </dgm:constrLst>
+      </dgm:if>
+      <dgm:if name="Name13" axis="ch" ptType="node" func="cnt" op="equ" val="4">
+        <dgm:constrLst>
+          <dgm:constr type="ctrX" for="ch" forName="circ1" refType="w" fact="0.5"/>
+          <dgm:constr type="ctrY" for="ch" forName="circ1" refType="w" fact="0.27"/>
+          <dgm:constr type="w" for="ch" forName="circ1" refType="w" fact="0.52"/>
+          <dgm:constr type="h" for="ch" forName="circ1" refType="h" fact="0.52"/>
+          <dgm:constr type="l" for="ch" forName="circ1Tx" refType="w" fact="0.3"/>
+          <dgm:constr type="t" for="ch" forName="circ1Tx" refType="h" fact="0.08"/>
+          <dgm:constr type="w" for="ch" forName="circ1Tx" refType="w" fact="0.4"/>
+          <dgm:constr type="h" for="ch" forName="circ1Tx" refType="h" fact="0.165"/>
+          <dgm:constr type="ctrX" for="ch" forName="circ2" refType="w" fact="0.73"/>
+          <dgm:constr type="ctrY" for="ch" forName="circ2" refType="w" fact="0.5"/>
+          <dgm:constr type="w" for="ch" forName="circ2" refType="w" fact="0.52"/>
+          <dgm:constr type="h" for="ch" forName="circ2" refType="h" fact="0.52"/>
+          <dgm:constr type="r" for="ch" forName="circ2Tx" refType="w" fact="0.95"/>
+          <dgm:constr type="t" for="ch" forName="circ2Tx" refType="h" fact="0.3"/>
+          <dgm:constr type="w" for="ch" forName="circ2Tx" refType="w" fact="0.2"/>
+          <dgm:constr type="h" for="ch" forName="circ2Tx" refType="h" fact="0.4"/>
+          <dgm:constr type="ctrX" for="ch" forName="circ3" refType="w" fact="0.5"/>
+          <dgm:constr type="ctrY" for="ch" forName="circ3" refType="w" fact="0.73"/>
+          <dgm:constr type="w" for="ch" forName="circ3" refType="w" fact="0.52"/>
+          <dgm:constr type="h" for="ch" forName="circ3" refType="h" fact="0.52"/>
+          <dgm:constr type="l" for="ch" forName="circ3Tx" refType="w" fact="0.3"/>
+          <dgm:constr type="b" for="ch" forName="circ3Tx" refType="h" fact="0.92"/>
+          <dgm:constr type="w" for="ch" forName="circ3Tx" refType="w" fact="0.4"/>
+          <dgm:constr type="h" for="ch" forName="circ3Tx" refType="h" fact="0.165"/>
+          <dgm:constr type="ctrX" for="ch" forName="circ4" refType="w" fact="0.27"/>
+          <dgm:constr type="ctrY" for="ch" forName="circ4" refType="h" fact="0.5"/>
+          <dgm:constr type="w" for="ch" forName="circ4" refType="w" fact="0.52"/>
+          <dgm:constr type="h" for="ch" forName="circ4" refType="h" fact="0.52"/>
+          <dgm:constr type="l" for="ch" forName="circ4Tx" refType="w" fact="0.05"/>
+          <dgm:constr type="t" for="ch" forName="circ4Tx" refType="h" fact="0.3"/>
+          <dgm:constr type="w" for="ch" forName="circ4Tx" refType="w" fact="0.2"/>
+          <dgm:constr type="h" for="ch" forName="circ4Tx" refType="h" fact="0.4"/>
+          <dgm:constr type="primFontSz" for="ch" ptType="node" op="equ"/>
+        </dgm:constrLst>
+      </dgm:if>
+      <dgm:if name="Name14" axis="ch" ptType="node" func="cnt" op="equ" val="5">
+        <dgm:constrLst>
+          <dgm:constr type="ctrX" for="ch" forName="circ1" refType="w" fact="0.5"/>
+          <dgm:constr type="ctrY" for="ch" forName="circ1" refType="h" fact="0.46"/>
+          <dgm:constr type="w" for="ch" forName="circ1" refType="w" fact="0.25"/>
+          <dgm:constr type="h" for="ch" forName="circ1" refType="h" fact="0.35"/>
+          <dgm:constr type="l" for="ch" forName="circ1Tx" refType="w" fact="0.355"/>
+          <dgm:constr type="t" for="ch" forName="circ1Tx"/>
+          <dgm:constr type="w" for="ch" forName="circ1Tx" refType="w" fact="0.29"/>
+          <dgm:constr type="h" for="ch" forName="circ1Tx" refType="h" fact="0.235"/>
+          <dgm:constr type="ctrX" for="ch" forName="circ2" refType="w" fact="0.5951"/>
+          <dgm:constr type="ctrY" for="ch" forName="circ2" refType="h" fact="0.5567"/>
+          <dgm:constr type="w" for="ch" forName="circ2" refType="w" fact="0.25"/>
+          <dgm:constr type="h" for="ch" forName="circ2" refType="h" fact="0.35"/>
+          <dgm:constr type="l" for="ch" forName="circ2Tx" refType="w" fact="0.74"/>
+          <dgm:constr type="t" for="ch" forName="circ2Tx" refType="h" fact="0.31"/>
+          <dgm:constr type="w" for="ch" forName="circ2Tx" refType="w" fact="0.26"/>
+          <dgm:constr type="h" for="ch" forName="circ2Tx" refType="h" fact="0.255"/>
+          <dgm:constr type="ctrX" for="ch" forName="circ3" refType="w" fact="0.5588"/>
+          <dgm:constr type="ctrY" for="ch" forName="circ3" refType="h" fact="0.7133"/>
+          <dgm:constr type="w" for="ch" forName="circ3" refType="w" fact="0.25"/>
+          <dgm:constr type="h" for="ch" forName="circ3" refType="h" fact="0.35"/>
+          <dgm:constr type="l" for="ch" forName="circ3Tx" refType="w" fact="0.7"/>
+          <dgm:constr type="t" for="ch" forName="circ3Tx" refType="h" fact="0.745"/>
+          <dgm:constr type="w" for="ch" forName="circ3Tx" refType="w" fact="0.26"/>
+          <dgm:constr type="h" for="ch" forName="circ3Tx" refType="h" fact="0.255"/>
+          <dgm:constr type="ctrX" for="ch" forName="circ4" refType="w" fact="0.4412"/>
+          <dgm:constr type="ctrY" for="ch" forName="circ4" refType="h" fact="0.7133"/>
+          <dgm:constr type="w" for="ch" forName="circ4" refType="w" fact="0.25"/>
+          <dgm:constr type="h" for="ch" forName="circ4" refType="h" fact="0.35"/>
+          <dgm:constr type="l" for="ch" forName="circ4Tx" refType="w" fact="0.04"/>
+          <dgm:constr type="t" for="ch" forName="circ4Tx" refType="h" fact="0.745"/>
+          <dgm:constr type="w" for="ch" forName="circ4Tx" refType="w" fact="0.26"/>
+          <dgm:constr type="h" for="ch" forName="circ4Tx" refType="h" fact="0.255"/>
+          <dgm:constr type="ctrX" for="ch" forName="circ5" refType="w" fact="0.4049"/>
+          <dgm:constr type="ctrY" for="ch" forName="circ5" refType="h" fact="0.5567"/>
+          <dgm:constr type="w" for="ch" forName="circ5" refType="w" fact="0.25"/>
+          <dgm:constr type="h" for="ch" forName="circ5" refType="h" fact="0.35"/>
+          <dgm:constr type="l" for="ch" forName="circ5Tx"/>
+          <dgm:constr type="t" for="ch" forName="circ5Tx" refType="h" fact="0.31"/>
+          <dgm:constr type="w" for="ch" forName="circ5Tx" refType="w" fact="0.26"/>
+          <dgm:constr type="h" for="ch" forName="circ5Tx" refType="h" fact="0.255"/>
+          <dgm:constr type="primFontSz" for="ch" ptType="node" op="equ"/>
+        </dgm:constrLst>
+      </dgm:if>
+      <dgm:if name="Name15" axis="ch" ptType="node" func="cnt" op="equ" val="6">
+        <dgm:constrLst>
+          <dgm:constr type="ctrX" for="ch" forName="circ1" refType="w" fact="0.5"/>
+          <dgm:constr type="ctrY" for="ch" forName="circ1" refType="h" fact="0.3844"/>
+          <dgm:constr type="w" for="ch" forName="circ1" refType="w" fact="0.24"/>
+          <dgm:constr type="h" for="ch" forName="circ1" refType="h" fact="0.3084"/>
+          <dgm:constr type="l" for="ch" forName="circ1Tx" refType="w" fact="0.35"/>
+          <dgm:constr type="t" for="ch" forName="circ1Tx"/>
+          <dgm:constr type="w" for="ch" forName="circ1Tx" refType="w" fact="0.3"/>
+          <dgm:constr type="h" for="ch" forName="circ1Tx" refType="h" fact="0.21"/>
+          <dgm:constr type="ctrX" for="ch" forName="circ2" refType="w" fact="0.5779"/>
+          <dgm:constr type="ctrY" for="ch" forName="circ2" refType="h" fact="0.4422"/>
+          <dgm:constr type="w" for="ch" forName="circ2" refType="w" fact="0.24"/>
+          <dgm:constr type="h" for="ch" forName="circ2" refType="h" fact="0.3084"/>
+          <dgm:constr type="l" for="ch" forName="circ2Tx" refType="w" fact="0.7157"/>
+          <dgm:constr type="t" for="ch" forName="circ2Tx" refType="h" fact="0.2"/>
+          <dgm:constr type="w" for="ch" forName="circ2Tx" refType="w" fact="0.2843"/>
+          <dgm:constr type="h" for="ch" forName="circ2Tx" refType="h" fact="0.23"/>
+          <dgm:constr type="ctrX" for="ch" forName="circ3" refType="w" fact="0.5779"/>
+          <dgm:constr type="ctrY" for="ch" forName="circ3" refType="h" fact="0.5578"/>
+          <dgm:constr type="w" for="ch" forName="circ3" refType="w" fact="0.24"/>
+          <dgm:constr type="h" for="ch" forName="circ3" refType="h" fact="0.3084"/>
+          <dgm:constr type="l" for="ch" forName="circ3Tx" refType="w" fact="0.7157"/>
+          <dgm:constr type="t" for="ch" forName="circ3Tx" refType="h" fact="0.543"/>
+          <dgm:constr type="w" for="ch" forName="circ3Tx" refType="w" fact="0.2843"/>
+          <dgm:constr type="h" for="ch" forName="circ3Tx" refType="h" fact="0.257"/>
+          <dgm:constr type="ctrX" for="ch" forName="circ4" refType="w" fact="0.5"/>
+          <dgm:constr type="ctrY" for="ch" forName="circ4" refType="h" fact="0.6157"/>
+          <dgm:constr type="w" for="ch" forName="circ4" refType="w" fact="0.24"/>
+          <dgm:constr type="h" for="ch" forName="circ4" refType="h" fact="0.3084"/>
+          <dgm:constr type="l" for="ch" forName="circ4Tx" refType="w" fact="0.35"/>
+          <dgm:constr type="t" for="ch" forName="circ4Tx" refType="h" fact="0.79"/>
+          <dgm:constr type="w" for="ch" forName="circ4Tx" refType="w" fact="0.3"/>
+          <dgm:constr type="h" for="ch" forName="circ4Tx" refType="h" fact="0.21"/>
+          <dgm:constr type="ctrX" for="ch" forName="circ5" refType="w" fact="0.4221"/>
+          <dgm:constr type="ctrY" for="ch" forName="circ5" refType="h" fact="0.5578"/>
+          <dgm:constr type="w" for="ch" forName="circ5" refType="w" fact="0.24"/>
+          <dgm:constr type="h" for="ch" forName="circ5" refType="h" fact="0.3084"/>
+          <dgm:constr type="l" for="ch" forName="circ5Tx" refType="w" fact="0"/>
+          <dgm:constr type="t" for="ch" forName="circ5Tx" refType="h" fact="0.543"/>
+          <dgm:constr type="w" for="ch" forName="circ5Tx" refType="w" fact="0.2843"/>
+          <dgm:constr type="h" for="ch" forName="circ5Tx" refType="h" fact="0.257"/>
+          <dgm:constr type="ctrX" for="ch" forName="circ6" refType="w" fact="0.4221"/>
+          <dgm:constr type="ctrY" for="ch" forName="circ6" refType="h" fact="0.4422"/>
+          <dgm:constr type="w" for="ch" forName="circ6" refType="w" fact="0.24"/>
+          <dgm:constr type="h" for="ch" forName="circ6" refType="h" fact="0.3084"/>
+          <dgm:constr type="l" for="ch" forName="circ6Tx" refType="w" fact="0"/>
+          <dgm:constr type="t" for="ch" forName="circ6Tx" refType="h" fact="0.2"/>
+          <dgm:constr type="w" for="ch" forName="circ6Tx" refType="w" fact="0.2843"/>
+          <dgm:constr type="h" for="ch" forName="circ6Tx" refType="h" fact="0.257"/>
+          <dgm:constr type="primFontSz" for="ch" ptType="node" op="equ"/>
+        </dgm:constrLst>
+      </dgm:if>
+      <dgm:else name="Name16">
+        <dgm:constrLst>
+          <dgm:constr type="ctrX" for="ch" forName="circ1" refType="w" fact="0.5"/>
+          <dgm:constr type="ctrY" for="ch" forName="circ1" refType="h" fact="0.4177"/>
+          <dgm:constr type="w" for="ch" forName="circ1" refType="w" fact="0.24"/>
+          <dgm:constr type="h" for="ch" forName="circ1" refType="h" fact="0.3262"/>
+          <dgm:constr type="l" for="ch" forName="circ1Tx" refType="w" fact="0.3625"/>
+          <dgm:constr type="t" for="ch" forName="circ1Tx"/>
+          <dgm:constr type="w" for="ch" forName="circ1Tx" refType="w" fact="0.275"/>
+          <dgm:constr type="h" for="ch" forName="circ1Tx" refType="h" fact="0.2"/>
+          <dgm:constr type="ctrX" for="ch" forName="circ2" refType="w" fact="0.5704"/>
+          <dgm:constr type="ctrY" for="ch" forName="circ2" refType="h" fact="0.4637"/>
+          <dgm:constr type="w" for="ch" forName="circ2" refType="w" fact="0.24"/>
+          <dgm:constr type="h" for="ch" forName="circ2" refType="h" fact="0.3262"/>
+          <dgm:constr type="l" for="ch" forName="circ2Tx" refType="w" fact="0.72"/>
+          <dgm:constr type="t" for="ch" forName="circ2Tx" refType="h" fact="0.19"/>
+          <dgm:constr type="w" for="ch" forName="circ2Tx" refType="w" fact="0.26"/>
+          <dgm:constr type="h" for="ch" forName="circ2Tx" refType="h" fact="0.22"/>
+          <dgm:constr type="ctrX" for="ch" forName="circ3" refType="w" fact="0.5877"/>
+          <dgm:constr type="ctrY" for="ch" forName="circ3" refType="h" fact="0.5672"/>
+          <dgm:constr type="w" for="ch" forName="circ3" refType="w" fact="0.24"/>
+          <dgm:constr type="h" for="ch" forName="circ3" refType="h" fact="0.3262"/>
+          <dgm:constr type="l" for="ch" forName="circ3Tx" refType="w" fact="0.745"/>
+          <dgm:constr type="t" for="ch" forName="circ3Tx" refType="h" fact="0.47"/>
+          <dgm:constr type="w" for="ch" forName="circ3Tx" refType="w" fact="0.255"/>
+          <dgm:constr type="h" for="ch" forName="circ3Tx" refType="h" fact="0.235"/>
+          <dgm:constr type="ctrX" for="ch" forName="circ4" refType="w" fact="0.539"/>
+          <dgm:constr type="ctrY" for="ch" forName="circ4" refType="h" fact="0.6502"/>
+          <dgm:constr type="w" for="ch" forName="circ4" refType="w" fact="0.24"/>
+          <dgm:constr type="h" for="ch" forName="circ4" refType="h" fact="0.3262"/>
+          <dgm:constr type="l" for="ch" forName="circ4Tx" refType="w" fact="0.635"/>
+          <dgm:constr type="t" for="ch" forName="circ4Tx" refType="h" fact="0.785"/>
+          <dgm:constr type="w" for="ch" forName="circ4Tx" refType="w" fact="0.275"/>
+          <dgm:constr type="h" for="ch" forName="circ4Tx" refType="h" fact="0.215"/>
+          <dgm:constr type="ctrX" for="ch" forName="circ5" refType="w" fact="0.461"/>
+          <dgm:constr type="ctrY" for="ch" forName="circ5" refType="h" fact="0.6502"/>
+          <dgm:constr type="w" for="ch" forName="circ5" refType="w" fact="0.24"/>
+          <dgm:constr type="h" for="ch" forName="circ5" refType="h" fact="0.3262"/>
+          <dgm:constr type="l" for="ch" forName="circ5Tx" refType="w" fact="0.09"/>
+          <dgm:constr type="t" for="ch" forName="circ5Tx" refType="h" fact="0.785"/>
+          <dgm:constr type="w" for="ch" forName="circ5Tx" refType="w" fact="0.275"/>
+          <dgm:constr type="h" for="ch" forName="circ5Tx" refType="h" fact="0.215"/>
+          <dgm:constr type="ctrX" for="ch" forName="circ6" refType="w" fact="0.4123"/>
+          <dgm:constr type="ctrY" for="ch" forName="circ6" refType="h" fact="0.5672"/>
+          <dgm:constr type="w" for="ch" forName="circ6" refType="w" fact="0.24"/>
+          <dgm:constr type="h" for="ch" forName="circ6" refType="h" fact="0.3262"/>
+          <dgm:constr type="l" for="ch" forName="circ6Tx"/>
+          <dgm:constr type="t" for="ch" forName="circ6Tx" refType="h" fact="0.47"/>
+          <dgm:constr type="w" for="ch" forName="circ6Tx" refType="w" fact="0.255"/>
+          <dgm:constr type="h" for="ch" forName="circ6Tx" refType="h" fact="0.235"/>
+          <dgm:constr type="ctrX" for="ch" forName="circ7" refType="w" fact="0.4296"/>
+          <dgm:constr type="ctrY" for="ch" forName="circ7" refType="h" fact="0.4637"/>
+          <dgm:constr type="w" for="ch" forName="circ7" refType="w" fact="0.24"/>
+          <dgm:constr type="h" for="ch" forName="circ7" refType="h" fact="0.3262"/>
+          <dgm:constr type="l" for="ch" forName="circ7Tx" refType="w" fact="0.02"/>
+          <dgm:constr type="t" for="ch" forName="circ7Tx" refType="h" fact="0.19"/>
+          <dgm:constr type="w" for="ch" forName="circ7Tx" refType="w" fact="0.26"/>
+          <dgm:constr type="h" for="ch" forName="circ7Tx" refType="h" fact="0.22"/>
+          <dgm:constr type="primFontSz" for="ch" ptType="node" op="equ"/>
+        </dgm:constrLst>
+      </dgm:else>
+    </dgm:choose>
+    <dgm:ruleLst/>
+    <dgm:forEach name="Name17" axis="ch" ptType="node" cnt="1">
+      <dgm:choose name="Name18">
+        <dgm:if name="Name19" axis="root ch" ptType="all node" func="cnt" op="equ" val="1">
+          <dgm:layoutNode name="circ1TxSh" styleLbl="vennNode1">
+            <dgm:alg type="tx">
+              <dgm:param type="txAnchorHorzCh" val="ctr"/>
+              <dgm:param type="txAnchorVertCh" val="mid"/>
+            </dgm:alg>
+            <dgm:shape xmlns:r="http://schemas.openxmlformats.org/officeDocument/2006/relationships" type="ellipse" r:blip="">
+              <dgm:adjLst/>
+            </dgm:shape>
+            <dgm:choose name="Name20">
+              <dgm:if name="Name21" func="var" arg="dir" op="equ" val="norm">
+                <dgm:choose name="Name22">
+                  <dgm:if name="Name23" axis="root ch" ptType="all node" func="cnt" op="lte" val="4">
+                    <dgm:presOf axis="desOrSelf" ptType="node"/>
+                  </dgm:if>
+                  <dgm:else name="Name24">
+                    <dgm:presOf/>
+                  </dgm:else>
+                </dgm:choose>
+              </dgm:if>
+              <dgm:else name="Name25">
+                <dgm:choose name="Name26">
+                  <dgm:if name="Name27" axis="root ch" ptType="all node" func="cnt" op="equ" val="2">
+                    <dgm:presOf axis="root ch desOrSelf" ptType="all node node" st="1 2 1" cnt="1 1 0"/>
+                  </dgm:if>
+                  <dgm:else name="Name28">
+                    <dgm:presOf axis="desOrSelf" ptType="node"/>
+                  </dgm:else>
+                </dgm:choose>
+              </dgm:else>
+            </dgm:choose>
+            <dgm:constrLst>
+              <dgm:constr type="tMarg"/>
+              <dgm:constr type="bMarg"/>
+              <dgm:constr type="lMarg"/>
+              <dgm:constr type="rMarg"/>
+              <dgm:constr type="primFontSz" val="65"/>
+            </dgm:constrLst>
+            <dgm:ruleLst>
+              <dgm:rule type="primFontSz" val="5" fact="NaN" max="NaN"/>
+            </dgm:ruleLst>
+          </dgm:layoutNode>
+        </dgm:if>
+        <dgm:else name="Name29">
+          <dgm:layoutNode name="circ1" styleLbl="vennNode1">
+            <dgm:alg type="sp"/>
+            <dgm:shape xmlns:r="http://schemas.openxmlformats.org/officeDocument/2006/relationships" type="ellipse" r:blip="">
+              <dgm:adjLst/>
+            </dgm:shape>
+            <dgm:choose name="Name30">
+              <dgm:if name="Name31" func="var" arg="dir" op="equ" val="norm">
+                <dgm:choose name="Name32">
+                  <dgm:if name="Name33" axis="root ch" ptType="all node" func="cnt" op="lte" val="4">
+                    <dgm:presOf axis="desOrSelf" ptType="node"/>
+                  </dgm:if>
+                  <dgm:else name="Name34">
+                    <dgm:presOf/>
+                  </dgm:else>
+                </dgm:choose>
+              </dgm:if>
+              <dgm:else name="Name35">
+                <dgm:choose name="Name36">
+                  <dgm:if name="Name37" axis="root ch" ptType="all node" func="cnt" op="equ" val="2">
+                    <dgm:presOf axis="root ch desOrSelf" ptType="all node node" st="1 2 1" cnt="1 1 0"/>
+                  </dgm:if>
+                  <dgm:else name="Name38">
+                    <dgm:choose name="Name39">
+                      <dgm:if name="Name40" axis="root ch" ptType="all node" func="cnt" op="lte" val="4">
+                        <dgm:presOf axis="desOrSelf" ptType="node"/>
+                      </dgm:if>
+                      <dgm:else name="Name41">
+                        <dgm:presOf/>
+                      </dgm:else>
+                    </dgm:choose>
+                  </dgm:else>
+                </dgm:choose>
+              </dgm:else>
+            </dgm:choose>
+            <dgm:constrLst/>
+            <dgm:ruleLst/>
+          </dgm:layoutNode>
+          <dgm:layoutNode name="circ1Tx" styleLbl="revTx">
+            <dgm:varLst>
+              <dgm:chMax val="0"/>
+              <dgm:chPref val="0"/>
+              <dgm:bulletEnabled val="1"/>
+            </dgm:varLst>
+            <dgm:alg type="tx">
+              <dgm:param type="txAnchorHorzCh" val="ctr"/>
+              <dgm:param type="txAnchorVertCh" val="mid"/>
+            </dgm:alg>
+            <dgm:shape xmlns:r="http://schemas.openxmlformats.org/officeDocument/2006/relationships" type="rect" r:blip="" hideGeom="1">
+              <dgm:adjLst/>
+            </dgm:shape>
+            <dgm:choose name="Name42">
+              <dgm:if name="Name43" func="var" arg="dir" op="equ" val="norm">
+                <dgm:presOf axis="desOrSelf" ptType="node"/>
+              </dgm:if>
+              <dgm:else name="Name44">
+                <dgm:choose name="Name45">
+                  <dgm:if name="Name46" axis="root ch" ptType="all node" func="cnt" op="equ" val="2">
+                    <dgm:presOf axis="root ch desOrSelf" ptType="all node node" st="1 2 1" cnt="1 1 0"/>
+                  </dgm:if>
+                  <dgm:else name="Name47">
+                    <dgm:presOf axis="desOrSelf" ptType="node"/>
+                  </dgm:else>
+                </dgm:choose>
+              </dgm:else>
+            </dgm:choose>
+            <dgm:constrLst>
+              <dgm:constr type="tMarg"/>
+              <dgm:constr type="bMarg"/>
+              <dgm:constr type="lMarg"/>
+              <dgm:constr type="rMarg"/>
+              <dgm:constr type="primFontSz" val="65"/>
+            </dgm:constrLst>
+            <dgm:ruleLst>
+              <dgm:rule type="primFontSz" val="5" fact="NaN" max="NaN"/>
+            </dgm:ruleLst>
+          </dgm:layoutNode>
+        </dgm:else>
+      </dgm:choose>
+    </dgm:forEach>
+    <dgm:forEach name="Name48" axis="ch" ptType="node" st="2" cnt="1">
+      <dgm:layoutNode name="circ2" styleLbl="vennNode1">
+        <dgm:alg type="sp"/>
+        <dgm:shape xmlns:r="http://schemas.openxmlformats.org/officeDocument/2006/relationships" type="ellipse" r:blip="">
+          <dgm:adjLst/>
+        </dgm:shape>
+        <dgm:choose name="Name49">
+          <dgm:if name="Name50" func="var" arg="dir" op="equ" val="norm">
+            <dgm:choose name="Name51">
+              <dgm:if name="Name52" axis="root ch" ptType="all node" func="cnt" op="lte" val="4">
+                <dgm:presOf axis="desOrSelf" ptType="node"/>
+              </dgm:if>
+              <dgm:else name="Name53">
+                <dgm:presOf/>
+              </dgm:else>
+            </dgm:choose>
+          </dgm:if>
+          <dgm:else name="Name54">
+            <dgm:choose name="Name55">
+              <dgm:if name="Name56" axis="root ch" ptType="all node" func="cnt" op="equ" val="2">
+                <dgm:presOf axis="root ch desOrSelf" ptType="all node node" st="1 1 1" cnt="1 1 0"/>
+              </dgm:if>
+              <dgm:if name="Name57" axis="root ch" ptType="all node" func="cnt" op="equ" val="3">
+                <dgm:presOf axis="root ch desOrSelf" ptType="all node node" st="1 3 1" cnt="1 1 0"/>
+              </dgm:if>
+              <dgm:if name="Name58" axis="root ch" ptType="all node" func="cnt" op="equ" val="4">
+                <dgm:presOf axis="root ch desOrSelf" ptType="all node node" st="1 4 1" cnt="1 1 0"/>
+              </dgm:if>
+              <dgm:else name="Name59">
+                <dgm:presOf/>
+              </dgm:else>
+            </dgm:choose>
+          </dgm:else>
+        </dgm:choose>
+        <dgm:constrLst/>
+        <dgm:ruleLst/>
+      </dgm:layoutNode>
+      <dgm:layoutNode name="circ2Tx" styleLbl="revTx">
+        <dgm:varLst>
+          <dgm:chMax val="0"/>
+          <dgm:chPref val="0"/>
+          <dgm:bulletEnabled val="1"/>
+        </dgm:varLst>
+        <dgm:alg type="tx">
+          <dgm:param type="txAnchorHorzCh" val="ctr"/>
+          <dgm:param type="txAnchorVertCh" val="mid"/>
+        </dgm:alg>
+        <dgm:shape xmlns:r="http://schemas.openxmlformats.org/officeDocument/2006/relationships" type="rect" r:blip="" hideGeom="1">
+          <dgm:adjLst/>
+        </dgm:shape>
+        <dgm:choose name="Name60">
+          <dgm:if name="Name61" func="var" arg="dir" op="equ" val="norm">
+            <dgm:presOf axis="desOrSelf" ptType="node"/>
+          </dgm:if>
+          <dgm:else name="Name62">
+            <dgm:choose name="Name63">
+              <dgm:if name="Name64" axis="root ch" ptType="all node" func="cnt" op="equ" val="2">
+                <dgm:presOf axis="root ch desOrSelf" ptType="all node node" st="1 1 1" cnt="1 1 0"/>
+              </dgm:if>
+              <dgm:if name="Name65" axis="root ch" ptType="all node" func="cnt" op="equ" val="3">
+                <dgm:presOf axis="root ch desOrSelf" ptType="all node node" st="1 3 1" cnt="1 1 0"/>
+              </dgm:if>
+              <dgm:if name="Name66" axis="root ch" ptType="all node" func="cnt" op="equ" val="4">
+                <dgm:presOf axis="root ch desOrSelf" ptType="all node node" st="1 4 1" cnt="1 1 0"/>
+              </dgm:if>
+              <dgm:if name="Name67" axis="root ch" ptType="all node" func="cnt" op="equ" val="5">
+                <dgm:presOf axis="root ch desOrSelf" ptType="all node node" st="1 5 1" cnt="1 1 0"/>
+              </dgm:if>
+              <dgm:if name="Name68" axis="root ch" ptType="all node" func="cnt" op="equ" val="6">
+                <dgm:presOf axis="root ch desOrSelf" ptType="all node node" st="1 6 1" cnt="1 1 0"/>
+              </dgm:if>
+              <dgm:else name="Name69">
+                <dgm:presOf axis="root ch desOrSelf" ptType="all node node" st="1 7 1" cnt="1 1 0"/>
+              </dgm:else>
+            </dgm:choose>
+          </dgm:else>
+        </dgm:choose>
+        <dgm:constrLst>
+          <dgm:constr type="tMarg"/>
+          <dgm:constr type="bMarg"/>
+          <dgm:constr type="lMarg"/>
+          <dgm:constr type="rMarg"/>
+          <dgm:constr type="primFontSz" val="65"/>
+        </dgm:constrLst>
+        <dgm:ruleLst>
+          <dgm:rule type="primFontSz" val="5" fact="NaN" max="NaN"/>
+        </dgm:ruleLst>
+      </dgm:layoutNode>
+    </dgm:forEach>
+    <dgm:forEach name="Name70" axis="ch" ptType="node" st="3" cnt="1">
+      <dgm:layoutNode name="circ3" styleLbl="vennNode1">
+        <dgm:alg type="sp"/>
+        <dgm:shape xmlns:r="http://schemas.openxmlformats.org/officeDocument/2006/relationships" type="ellipse" r:blip="">
+          <dgm:adjLst/>
+        </dgm:shape>
+        <dgm:choose name="Name71">
+          <dgm:if name="Name72" func="var" arg="dir" op="equ" val="norm">
+            <dgm:choose name="Name73">
+              <dgm:if name="Name74" axis="root ch" ptType="all node" func="cnt" op="lte" val="4">
+                <dgm:presOf axis="desOrSelf" ptType="node"/>
+              </dgm:if>
+              <dgm:else name="Name75">
+                <dgm:presOf/>
+              </dgm:else>
+            </dgm:choose>
+          </dgm:if>
+          <dgm:else name="Name76">
+            <dgm:choose name="Name77">
+              <dgm:if name="Name78" axis="root ch" ptType="all node" func="cnt" op="equ" val="3">
+                <dgm:presOf axis="root ch desOrSelf" ptType="all node node" st="1 2 1" cnt="1 1 0"/>
+              </dgm:if>
+              <dgm:if name="Name79" axis="root ch" ptType="all node" func="cnt" op="equ" val="4">
+                <dgm:presOf axis="root ch desOrSelf" ptType="all node node" st="1 3 1" cnt="1 1 0"/>
+              </dgm:if>
+              <dgm:else name="Name80">
+                <dgm:presOf/>
+              </dgm:else>
+            </dgm:choose>
+          </dgm:else>
+        </dgm:choose>
+        <dgm:constrLst/>
+        <dgm:ruleLst/>
+      </dgm:layoutNode>
+      <dgm:layoutNode name="circ3Tx" styleLbl="revTx">
+        <dgm:varLst>
+          <dgm:chMax val="0"/>
+          <dgm:chPref val="0"/>
+          <dgm:bulletEnabled val="1"/>
+        </dgm:varLst>
+        <dgm:alg type="tx">
+          <dgm:param type="txAnchorHorzCh" val="ctr"/>
+          <dgm:param type="txAnchorVertCh" val="mid"/>
+        </dgm:alg>
+        <dgm:shape xmlns:r="http://schemas.openxmlformats.org/officeDocument/2006/relationships" type="rect" r:blip="" hideGeom="1">
+          <dgm:adjLst/>
+        </dgm:shape>
+        <dgm:choose name="Name81">
+          <dgm:if name="Name82" func="var" arg="dir" op="equ" val="norm">
+            <dgm:presOf axis="desOrSelf" ptType="node"/>
+          </dgm:if>
+          <dgm:else name="Name83">
+            <dgm:choose name="Name84">
+              <dgm:if name="Name85" axis="root ch" ptType="all node" func="cnt" op="equ" val="3">
+                <dgm:presOf axis="root ch desOrSelf" ptType="all node node" st="1 2 1" cnt="1 1 0"/>
+              </dgm:if>
+              <dgm:if name="Name86" axis="root ch" ptType="all node" func="cnt" op="equ" val="4">
+                <dgm:presOf axis="root ch desOrSelf" ptType="all node node" st="1 3 1" cnt="1 1 0"/>
+              </dgm:if>
+              <dgm:if name="Name87" axis="root ch" ptType="all node" func="cnt" op="equ" val="5">
+                <dgm:presOf axis="root ch desOrSelf" ptType="all node node" st="1 4 1" cnt="1 1 0"/>
+              </dgm:if>
+              <dgm:if name="Name88" axis="root ch" ptType="all node" func="cnt" op="equ" val="6">
+                <dgm:presOf axis="root ch desOrSelf" ptType="all node node" st="1 5 1" cnt="1 1 0"/>
+              </dgm:if>
+              <dgm:else name="Name89">
+                <dgm:presOf axis="root ch desOrSelf" ptType="all node node" st="1 6 1" cnt="1 1 0"/>
+              </dgm:else>
+            </dgm:choose>
+          </dgm:else>
+        </dgm:choose>
+        <dgm:constrLst>
+          <dgm:constr type="tMarg"/>
+          <dgm:constr type="bMarg"/>
+          <dgm:constr type="lMarg"/>
+          <dgm:constr type="rMarg"/>
+          <dgm:constr type="primFontSz" val="65"/>
+        </dgm:constrLst>
+        <dgm:ruleLst>
+          <dgm:rule type="primFontSz" val="5" fact="NaN" max="NaN"/>
+        </dgm:ruleLst>
+      </dgm:layoutNode>
+    </dgm:forEach>
+    <dgm:forEach name="Name90" axis="ch" ptType="node" st="4" cnt="1">
+      <dgm:layoutNode name="circ4" styleLbl="vennNode1">
+        <dgm:alg type="sp"/>
+        <dgm:shape xmlns:r="http://schemas.openxmlformats.org/officeDocument/2006/relationships" type="ellipse" r:blip="">
+          <dgm:adjLst/>
+        </dgm:shape>
+        <dgm:choose name="Name91">
+          <dgm:if name="Name92" func="var" arg="dir" op="equ" val="norm">
+            <dgm:choose name="Name93">
+              <dgm:if name="Name94" axis="root ch" ptType="all node" func="cnt" op="lte" val="4">
+                <dgm:presOf axis="desOrSelf" ptType="node"/>
+              </dgm:if>
+              <dgm:else name="Name95">
+                <dgm:presOf/>
+              </dgm:else>
+            </dgm:choose>
+          </dgm:if>
+          <dgm:else name="Name96">
+            <dgm:choose name="Name97">
+              <dgm:if name="Name98" axis="root ch" ptType="all node" func="cnt" op="equ" val="4">
+                <dgm:presOf axis="root ch desOrSelf" ptType="all node node" st="1 2 1" cnt="1 1 0"/>
+              </dgm:if>
+              <dgm:else name="Name99">
+                <dgm:presOf/>
+              </dgm:else>
+            </dgm:choose>
+          </dgm:else>
+        </dgm:choose>
+        <dgm:constrLst/>
+        <dgm:ruleLst/>
+      </dgm:layoutNode>
+      <dgm:layoutNode name="circ4Tx" styleLbl="revTx">
+        <dgm:varLst>
+          <dgm:chMax val="0"/>
+          <dgm:chPref val="0"/>
+          <dgm:bulletEnabled val="1"/>
+        </dgm:varLst>
+        <dgm:alg type="tx">
+          <dgm:param type="txAnchorHorzCh" val="ctr"/>
+          <dgm:param type="txAnchorVertCh" val="mid"/>
+        </dgm:alg>
+        <dgm:shape xmlns:r="http://schemas.openxmlformats.org/officeDocument/2006/relationships" type="rect" r:blip="" hideGeom="1">
+          <dgm:adjLst/>
+        </dgm:shape>
+        <dgm:choose name="Name100">
+          <dgm:if name="Name101" func="var" arg="dir" op="equ" val="norm">
+            <dgm:presOf axis="desOrSelf" ptType="node"/>
+          </dgm:if>
+          <dgm:else name="Name102">
+            <dgm:choose name="Name103">
+              <dgm:if name="Name104" axis="root ch" ptType="all node" func="cnt" op="equ" val="4">
+                <dgm:presOf axis="root ch desOrSelf" ptType="all node node" st="1 2 1" cnt="1 1 0"/>
+              </dgm:if>
+              <dgm:if name="Name105" axis="root ch" ptType="all node" func="cnt" op="equ" val="5">
+                <dgm:presOf axis="root ch desOrSelf" ptType="all node node" st="1 3 1" cnt="1 1 0"/>
+              </dgm:if>
+              <dgm:if name="Name106" axis="root ch" ptType="all node" func="cnt" op="equ" val="6">
+                <dgm:presOf axis="root ch desOrSelf" ptType="all node node" st="1 4 1" cnt="1 1 0"/>
+              </dgm:if>
+              <dgm:else name="Name107">
+                <dgm:presOf axis="root ch desOrSelf" ptType="all node node" st="1 5 1" cnt="1 1 0"/>
+              </dgm:else>
+            </dgm:choose>
+          </dgm:else>
+        </dgm:choose>
+        <dgm:constrLst>
+          <dgm:constr type="tMarg"/>
+          <dgm:constr type="bMarg"/>
+          <dgm:constr type="lMarg"/>
+          <dgm:constr type="rMarg"/>
+          <dgm:constr type="primFontSz" val="65"/>
+        </dgm:constrLst>
+        <dgm:ruleLst>
+          <dgm:rule type="primFontSz" val="5" fact="NaN" max="NaN"/>
+        </dgm:ruleLst>
+      </dgm:layoutNode>
+    </dgm:forEach>
+    <dgm:forEach name="Name108" axis="ch" ptType="node" st="5" cnt="1">
+      <dgm:layoutNode name="circ5" styleLbl="vennNode1">
+        <dgm:alg type="sp"/>
+        <dgm:shape xmlns:r="http://schemas.openxmlformats.org/officeDocument/2006/relationships" type="ellipse" r:blip="">
+          <dgm:adjLst/>
+        </dgm:shape>
+        <dgm:presOf/>
+        <dgm:constrLst/>
+        <dgm:ruleLst/>
+      </dgm:layoutNode>
+      <dgm:layoutNode name="circ5Tx" styleLbl="revTx">
+        <dgm:varLst>
+          <dgm:chMax val="0"/>
+          <dgm:chPref val="0"/>
+          <dgm:bulletEnabled val="1"/>
+        </dgm:varLst>
+        <dgm:alg type="tx">
+          <dgm:param type="txAnchorHorzCh" val="ctr"/>
+          <dgm:param type="txAnchorVertCh" val="mid"/>
+        </dgm:alg>
+        <dgm:shape xmlns:r="http://schemas.openxmlformats.org/officeDocument/2006/relationships" type="rect" r:blip="" hideGeom="1">
+          <dgm:adjLst/>
+        </dgm:shape>
+        <dgm:choose name="Name109">
+          <dgm:if name="Name110" func="var" arg="dir" op="equ" val="norm">
+            <dgm:presOf axis="desOrSelf" ptType="node"/>
+          </dgm:if>
+          <dgm:else name="Name111">
+            <dgm:choose name="Name112">
+              <dgm:if name="Name113" axis="root ch" ptType="all node" func="cnt" op="equ" val="5">
+                <dgm:presOf axis="root ch desOrSelf" ptType="all node node" st="1 2 1" cnt="1 1 0"/>
+              </dgm:if>
+              <dgm:if name="Name114" axis="root ch" ptType="all node" func="cnt" op="equ" val="6">
+                <dgm:presOf axis="root ch desOrSelf" ptType="all node node" st="1 3 1" cnt="1 1 0"/>
+              </dgm:if>
+              <dgm:else name="Name115">
+                <dgm:presOf axis="root ch desOrSelf" ptType="all node node" st="1 4 1" cnt="1 1 0"/>
+              </dgm:else>
+            </dgm:choose>
+          </dgm:else>
+        </dgm:choose>
+        <dgm:constrLst>
+          <dgm:constr type="tMarg"/>
+          <dgm:constr type="bMarg"/>
+          <dgm:constr type="lMarg"/>
+          <dgm:constr type="rMarg"/>
+          <dgm:constr type="primFontSz" val="65"/>
+        </dgm:constrLst>
+        <dgm:ruleLst>
+          <dgm:rule type="primFontSz" val="5" fact="NaN" max="NaN"/>
+        </dgm:ruleLst>
+      </dgm:layoutNode>
+    </dgm:forEach>
+    <dgm:forEach name="Name116" axis="ch" ptType="node" st="6" cnt="1">
+      <dgm:layoutNode name="circ6" styleLbl="vennNode1">
+        <dgm:alg type="sp"/>
+        <dgm:shape xmlns:r="http://schemas.openxmlformats.org/officeDocument/2006/relationships" type="ellipse" r:blip="">
+          <dgm:adjLst/>
+        </dgm:shape>
+        <dgm:presOf/>
+        <dgm:constrLst/>
+        <dgm:ruleLst/>
+      </dgm:layoutNode>
+      <dgm:layoutNode name="circ6Tx" styleLbl="revTx">
+        <dgm:varLst>
+          <dgm:chMax val="0"/>
+          <dgm:chPref val="0"/>
+          <dgm:bulletEnabled val="1"/>
+        </dgm:varLst>
+        <dgm:alg type="tx">
+          <dgm:param type="txAnchorHorzCh" val="ctr"/>
+          <dgm:param type="txAnchorVertCh" val="mid"/>
+        </dgm:alg>
+        <dgm:shape xmlns:r="http://schemas.openxmlformats.org/officeDocument/2006/relationships" type="rect" r:blip="" hideGeom="1">
+          <dgm:adjLst/>
+        </dgm:shape>
+        <dgm:choose name="Name117">
+          <dgm:if name="Name118" func="var" arg="dir" op="equ" val="norm">
+            <dgm:presOf axis="desOrSelf" ptType="node"/>
+          </dgm:if>
+          <dgm:else name="Name119">
+            <dgm:choose name="Name120">
+              <dgm:if name="Name121" axis="root ch" ptType="all node" func="cnt" op="equ" val="6">
+                <dgm:presOf axis="root ch desOrSelf" ptType="all node node" st="1 2 1" cnt="1 1 0"/>
+              </dgm:if>
+              <dgm:else name="Name122">
+                <dgm:presOf axis="root ch desOrSelf" ptType="all node node" st="1 3 1" cnt="1 1 0"/>
+              </dgm:else>
+            </dgm:choose>
+          </dgm:else>
+        </dgm:choose>
+        <dgm:constrLst>
+          <dgm:constr type="tMarg"/>
+          <dgm:constr type="bMarg"/>
+          <dgm:constr type="lMarg"/>
+          <dgm:constr type="rMarg"/>
+          <dgm:constr type="primFontSz" val="65"/>
+        </dgm:constrLst>
+        <dgm:ruleLst>
+          <dgm:rule type="primFontSz" val="5" fact="NaN" max="NaN"/>
+        </dgm:ruleLst>
+      </dgm:layoutNode>
+    </dgm:forEach>
+    <dgm:forEach name="Name123" axis="ch" ptType="node" st="7" cnt="1">
+      <dgm:layoutNode name="circ7" styleLbl="vennNode1">
+        <dgm:alg type="sp"/>
+        <dgm:shape xmlns:r="http://schemas.openxmlformats.org/officeDocument/2006/relationships" type="ellipse" r:blip="">
+          <dgm:adjLst/>
+        </dgm:shape>
+        <dgm:presOf/>
+        <dgm:constrLst/>
+        <dgm:ruleLst/>
+      </dgm:layoutNode>
+      <dgm:layoutNode name="circ7Tx" styleLbl="revTx">
+        <dgm:varLst>
+          <dgm:chMax val="0"/>
+          <dgm:chPref val="0"/>
+          <dgm:bulletEnabled val="1"/>
+        </dgm:varLst>
+        <dgm:alg type="tx">
+          <dgm:param type="txAnchorHorzCh" val="ctr"/>
+          <dgm:param type="txAnchorVertCh" val="mid"/>
+        </dgm:alg>
+        <dgm:shape xmlns:r="http://schemas.openxmlformats.org/officeDocument/2006/relationships" type="rect" r:blip="" hideGeom="1">
+          <dgm:adjLst/>
+        </dgm:shape>
+        <dgm:choose name="Name124">
+          <dgm:if name="Name125" func="var" arg="dir" op="equ" val="norm">
+            <dgm:presOf axis="desOrSelf" ptType="node"/>
+          </dgm:if>
+          <dgm:else name="Name126">
+            <dgm:presOf axis="root ch desOrSelf" ptType="all node node" st="1 2 1" cnt="1 1 0"/>
+          </dgm:else>
+        </dgm:choose>
+        <dgm:constrLst>
+          <dgm:constr type="tMarg"/>
+          <dgm:constr type="bMarg"/>
+          <dgm:constr type="lMarg"/>
+          <dgm:constr type="rMarg"/>
+          <dgm:constr type="primFontSz" val="65"/>
+        </dgm:constrLst>
+        <dgm:ruleLst>
+          <dgm:rule type="primFontSz" val="5" fact="NaN" max="NaN"/>
+        </dgm:ruleLst>
+      </dgm:layoutNode>
+    </dgm:forEach>
+  </dgm:layoutNode>
+</dgm:layoutDef>
+</file>
+
+<file path=ppt/diagrams/quickStyle1.xml><?xml version="1.0" encoding="utf-8"?>
+<dgm:styleDef xmlns:dgm="http://schemas.openxmlformats.org/drawingml/2006/diagram" xmlns:a="http://schemas.openxmlformats.org/drawingml/2006/main" uniqueId="urn:microsoft.com/office/officeart/2005/8/quickstyle/simple1">
+  <dgm:title val=""/>
+  <dgm:desc val=""/>
+  <dgm:catLst>
+    <dgm:cat type="simple" pri="10100"/>
+  </dgm:catLst>
+  <dgm:scene3d>
+    <a:camera prst="orthographicFront"/>
+    <a:lightRig rig="threePt" dir="t"/>
+  </dgm:scene3d>
+  <dgm:styleLbl name="node0">
+    <dgm:scene3d>
+      <a:camera prst="orthographicFront"/>
+      <a:lightRig rig="threePt" dir="t"/>
+    </dgm:scene3d>
+    <dgm:sp3d/>
+    <dgm:txPr/>
+    <dgm:style>
+      <a:lnRef idx="2">
+        <a:scrgbClr r="0" g="0" b="0"/>
+      </a:lnRef>
+      <a:fillRef idx="1">
+        <a:scrgbClr r="0" g="0" b="0"/>
+      </a:fillRef>
+      <a:effectRef idx="0">
+        <a:scrgbClr r="0" g="0" b="0"/>
+      </a:effectRef>
+      <a:fontRef idx="minor">
+        <a:schemeClr val="lt1"/>
+      </a:fontRef>
+    </dgm:style>
+  </dgm:styleLbl>
+  <dgm:styleLbl name="lnNode1">
+    <dgm:scene3d>
+      <a:camera prst="orthographicFront"/>
+      <a:lightRig rig="threePt" dir="t"/>
+    </dgm:scene3d>
+    <dgm:sp3d/>
+    <dgm:txPr/>
+    <dgm:style>
+      <a:lnRef idx="2">
+        <a:scrgbClr r="0" g="0" b="0"/>
+      </a:lnRef>
+      <a:fillRef idx="1">
+        <a:scrgbClr r="0" g="0" b="0"/>
+      </a:fillRef>
+      <a:effectRef idx="0">
+        <a:scrgbClr r="0" g="0" b="0"/>
+      </a:effectRef>
+      <a:fontRef idx="minor">
+        <a:schemeClr val="lt1"/>
+      </a:fontRef>
+    </dgm:style>
+  </dgm:styleLbl>
+  <dgm:styleLbl name="vennNode1">
+    <dgm:scene3d>
+      <a:camera prst="orthographicFront"/>
+      <a:lightRig rig="threePt" dir="t"/>
+    </dgm:scene3d>
+    <dgm:sp3d/>
+    <dgm:txPr/>
+    <dgm:style>
+      <a:lnRef idx="2">
+        <a:scrgbClr r="0" g="0" b="0"/>
+      </a:lnRef>
+      <a:fillRef idx="1">
+        <a:scrgbClr r="0" g="0" b="0"/>
+      </a:fillRef>
+      <a:effectRef idx="0">
+        <a:scrgbClr r="0" g="0" b="0"/>
+      </a:effectRef>
+      <a:fontRef idx="minor">
+        <a:schemeClr val="tx1"/>
+      </a:fontRef>
+    </dgm:style>
+  </dgm:styleLbl>
+  <dgm:styleLbl name="alignNode1">
+    <dgm:scene3d>
+      <a:camera prst="orthographicFront"/>
+      <a:lightRig rig="threePt" dir="t"/>
+    </dgm:scene3d>
+    <dgm:sp3d/>
+    <dgm:txPr/>
+    <dgm:style>
+      <a:lnRef idx="2">
+        <a:scrgbClr r="0" g="0" b="0"/>
+      </a:lnRef>
+      <a:fillRef idx="1">
+        <a:scrgbClr r="0" g="0" b="0"/>
+      </a:fillRef>
+      <a:effectRef idx="0">
+        <a:scrgbClr r="0" g="0" b="0"/>
+      </a:effectRef>
+      <a:fontRef idx="minor">
+        <a:schemeClr val="lt1"/>
+      </a:fontRef>
+    </dgm:style>
+  </dgm:styleLbl>
+  <dgm:styleLbl name="node1">
+    <dgm:scene3d>
+      <a:camera prst="orthographicFront"/>
+      <a:lightRig rig="threePt" dir="t"/>
+    </dgm:scene3d>
+    <dgm:sp3d/>
+    <dgm:txPr/>
+    <dgm:style>
+      <a:lnRef idx="2">
+        <a:scrgbClr r="0" g="0" b="0"/>
+      </a:lnRef>
+      <a:fillRef idx="1">
+        <a:scrgbClr r="0" g="0" b="0"/>
+      </a:fillRef>
+      <a:effectRef idx="0">
+        <a:scrgbClr r="0" g="0" b="0"/>
+      </a:effectRef>
+      <a:fontRef idx="minor">
+        <a:schemeClr val="lt1"/>
+      </a:fontRef>
+    </dgm:style>
+  </dgm:styleLbl>
+  <dgm:styleLbl name="node2">
+    <dgm:scene3d>
+      <a:camera prst="orthographicFront"/>
+      <a:lightRig rig="threePt" dir="t"/>
+    </dgm:scene3d>
+    <dgm:sp3d/>
+    <dgm:txPr/>
+    <dgm:style>
+      <a:lnRef idx="2">
+        <a:scrgbClr r="0" g="0" b="0"/>
+      </a:lnRef>
+      <a:fillRef idx="1">
+        <a:scrgbClr r="0" g="0" b="0"/>
+      </a:fillRef>
+      <a:effectRef idx="0">
+        <a:scrgbClr r="0" g="0" b="0"/>
+      </a:effectRef>
+      <a:fontRef idx="minor">
+        <a:schemeClr val="lt1"/>
+      </a:fontRef>
+    </dgm:style>
+  </dgm:styleLbl>
+  <dgm:styleLbl name="node3">
+    <dgm:scene3d>
+      <a:camera prst="orthographicFront"/>
+      <a:lightRig rig="threePt" dir="t"/>
+    </dgm:scene3d>
+    <dgm:sp3d/>
+    <dgm:txPr/>
+    <dgm:style>
+      <a:lnRef idx="2">
+        <a:scrgbClr r="0" g="0" b="0"/>
+      </a:lnRef>
+      <a:fillRef idx="1">
+        <a:scrgbClr r="0" g="0" b="0"/>
+      </a:fillRef>
+      <a:effectRef idx="0">
+        <a:scrgbClr r="0" g="0" b="0"/>
+      </a:effectRef>
+      <a:fontRef idx="minor">
+        <a:schemeClr val="lt1"/>
+      </a:fontRef>
+    </dgm:style>
+  </dgm:styleLbl>
+  <dgm:styleLbl name="node4">
+    <dgm:scene3d>
+      <a:camera prst="orthographicFront"/>
+      <a:lightRig rig="threePt" dir="t"/>
+    </dgm:scene3d>
+    <dgm:sp3d/>
+    <dgm:txPr/>
+    <dgm:style>
+      <a:lnRef idx="2">
+        <a:scrgbClr r="0" g="0" b="0"/>
+      </a:lnRef>
+      <a:fillRef idx="1">
+        <a:scrgbClr r="0" g="0" b="0"/>
+      </a:fillRef>
+      <a:effectRef idx="0">
+        <a:scrgbClr r="0" g="0" b="0"/>
+      </a:effectRef>
+      <a:fontRef idx="minor">
+        <a:schemeClr val="lt1"/>
+      </a:fontRef>
+    </dgm:style>
+  </dgm:styleLbl>
+  <dgm:styleLbl name="fgImgPlace1">
+    <dgm:scene3d>
+      <a:camera prst="orthographicFront"/>
+      <a:lightRig rig="threePt" dir="t"/>
+    </dgm:scene3d>
+    <dgm:sp3d/>
+    <dgm:txPr/>
+    <dgm:style>
+      <a:lnRef idx="2">
+        <a:scrgbClr r="0" g="0" b="0"/>
+      </a:lnRef>
+      <a:fillRef idx="1">
+        <a:scrgbClr r="0" g="0" b="0"/>
+      </a:fillRef>
+      <a:effectRef idx="0">
+        <a:scrgbClr r="0" g="0" b="0"/>
+      </a:effectRef>
+      <a:fontRef idx="minor"/>
+    </dgm:style>
+  </dgm:styleLbl>
+  <dgm:styleLbl name="alignImgPlace1">
+    <dgm:scene3d>
+      <a:camera prst="orthographicFront"/>
+      <a:lightRig rig="threePt" dir="t"/>
+    </dgm:scene3d>
+    <dgm:sp3d/>
+    <dgm:txPr/>
+    <dgm:style>
+      <a:lnRef idx="2">
+        <a:scrgbClr r="0" g="0" b="0"/>
+      </a:lnRef>
+      <a:fillRef idx="1">
+        <a:scrgbClr r="0" g="0" b="0"/>
+      </a:fillRef>
+      <a:effectRef idx="0">
+        <a:scrgbClr r="0" g="0" b="0"/>
+      </a:effectRef>
+      <a:fontRef idx="minor"/>
+    </dgm:style>
+  </dgm:styleLbl>
+  <dgm:styleLbl name="bgImgPlace1">
+    <dgm:scene3d>
+      <a:camera prst="orthographicFront"/>
+      <a:lightRig rig="threePt" dir="t"/>
+    </dgm:scene3d>
+    <dgm:sp3d/>
+    <dgm:txPr/>
+    <dgm:style>
+      <a:lnRef idx="2">
+        <a:scrgbClr r="0" g="0" b="0"/>
+      </a:lnRef>
+      <a:fillRef idx="1">
+        <a:scrgbClr r="0" g="0" b="0"/>
+      </a:fillRef>
+      <a:effectRef idx="0">
+        <a:scrgbClr r="0" g="0" b="0"/>
+      </a:effectRef>
+      <a:fontRef idx="minor"/>
+    </dgm:style>
+  </dgm:styleLbl>
+  <dgm:styleLbl name="sibTrans2D1">
+    <dgm:scene3d>
+      <a:camera prst="orthographicFront"/>
+      <a:lightRig rig="threePt" dir="t"/>
+    </dgm:scene3d>
+    <dgm:sp3d/>
+    <dgm:txPr/>
+    <dgm:style>
+      <a:lnRef idx="0">
+        <a:scrgbClr r="0" g="0" b="0"/>
+      </a:lnRef>
+      <a:fillRef idx="1">
+        <a:scrgbClr r="0" g="0" b="0"/>
+      </a:fillRef>
+      <a:effectRef idx="0">
+        <a:scrgbClr r="0" g="0" b="0"/>
+      </a:effectRef>
+      <a:fontRef idx="minor">
+        <a:schemeClr val="lt1"/>
+      </a:fontRef>
+    </dgm:style>
+  </dgm:styleLbl>
+  <dgm:styleLbl name="fgSibTrans2D1">
+    <dgm:scene3d>
+      <a:camera prst="orthographicFront"/>
+      <a:lightRig rig="threePt" dir="t"/>
+    </dgm:scene3d>
+    <dgm:sp3d/>
+    <dgm:txPr/>
+    <dgm:style>
+      <a:lnRef idx="0">
+        <a:scrgbClr r="0" g="0" b="0"/>
+      </a:lnRef>
+      <a:fillRef idx="1">
+        <a:scrgbClr r="0" g="0" b="0"/>
+      </a:fillRef>
+      <a:effectRef idx="0">
+        <a:scrgbClr r="0" g="0" b="0"/>
+      </a:effectRef>
+      <a:fontRef idx="minor">
+        <a:schemeClr val="lt1"/>
+      </a:fontRef>
+    </dgm:style>
+  </dgm:styleLbl>
+  <dgm:styleLbl name="bgSibTrans2D1">
+    <dgm:scene3d>
+      <a:camera prst="orthographicFront"/>
+      <a:lightRig rig="threePt" dir="t"/>
+    </dgm:scene3d>
+    <dgm:sp3d/>
+    <dgm:txPr/>
+    <dgm:style>
+      <a:lnRef idx="0">
+        <a:scrgbClr r="0" g="0" b="0"/>
+      </a:lnRef>
+      <a:fillRef idx="1">
+        <a:scrgbClr r="0" g="0" b="0"/>
+      </a:fillRef>
+      <a:effectRef idx="0">
+        <a:scrgbClr r="0" g="0" b="0"/>
+      </a:effectRef>
+      <a:fontRef idx="minor">
+        <a:schemeClr val="lt1"/>
+      </a:fontRef>
+    </dgm:style>
+  </dgm:styleLbl>
+  <dgm:styleLbl name="sibTrans1D1">
+    <dgm:scene3d>
+      <a:camera prst="orthographicFront"/>
+      <a:lightRig rig="threePt" dir="t"/>
+    </dgm:scene3d>
+    <dgm:sp3d/>
+    <dgm:txPr/>
+    <dgm:style>
+      <a:lnRef idx="1">
+        <a:scrgbClr r="0" g="0" b="0"/>
+      </a:lnRef>
+      <a:fillRef idx="0">
+        <a:scrgbClr r="0" g="0" b="0"/>
+      </a:fillRef>
+      <a:effectRef idx="0">
+        <a:scrgbClr r="0" g="0" b="0"/>
+      </a:effectRef>
+      <a:fontRef idx="minor"/>
+    </dgm:style>
+  </dgm:styleLbl>
+  <dgm:styleLbl name="callout">
+    <dgm:scene3d>
+      <a:camera prst="orthographicFront"/>
+      <a:lightRig rig="threePt" dir="t"/>
+    </dgm:scene3d>
+    <dgm:sp3d/>
+    <dgm:txPr/>
+    <dgm:style>
+      <a:lnRef idx="2">
+        <a:scrgbClr r="0" g="0" b="0"/>
+      </a:lnRef>
+      <a:fillRef idx="1">
+        <a:scrgbClr r="0" g="0" b="0"/>
+      </a:fillRef>
+      <a:effectRef idx="0">
+        <a:scrgbClr r="0" g="0" b="0"/>
+      </a:effectRef>
+      <a:fontRef idx="minor"/>
+    </dgm:style>
+  </dgm:styleLbl>
+  <dgm:styleLbl name="asst0">
+    <dgm:scene3d>
+      <a:camera prst="orthographicFront"/>
+      <a:lightRig rig="threePt" dir="t"/>
+    </dgm:scene3d>
+    <dgm:sp3d/>
+    <dgm:txPr/>
+    <dgm:style>
+      <a:lnRef idx="2">
+        <a:scrgbClr r="0" g="0" b="0"/>
+      </a:lnRef>
+      <a:fillRef idx="1">
+        <a:scrgbClr r="0" g="0" b="0"/>
+      </a:fillRef>
+      <a:effectRef idx="0">
+        <a:scrgbClr r="0" g="0" b="0"/>
+      </a:effectRef>
+      <a:fontRef idx="minor">
+        <a:schemeClr val="lt1"/>
+      </a:fontRef>
+    </dgm:style>
+  </dgm:styleLbl>
+  <dgm:styleLbl name="asst1">
+    <dgm:scene3d>
+      <a:camera prst="orthographicFront"/>
+      <a:lightRig rig="threePt" dir="t"/>
+    </dgm:scene3d>
+    <dgm:sp3d/>
+    <dgm:txPr/>
+    <dgm:style>
+      <a:lnRef idx="2">
+        <a:scrgbClr r="0" g="0" b="0"/>
+      </a:lnRef>
+      <a:fillRef idx="1">
+        <a:scrgbClr r="0" g="0" b="0"/>
+      </a:fillRef>
+      <a:effectRef idx="0">
+        <a:scrgbClr r="0" g="0" b="0"/>
+      </a:effectRef>
+      <a:fontRef idx="minor">
+        <a:schemeClr val="lt1"/>
+      </a:fontRef>
+    </dgm:style>
+  </dgm:styleLbl>
+  <dgm:styleLbl name="asst2">
+    <dgm:scene3d>
+      <a:camera prst="orthographicFront"/>
+      <a:lightRig rig="threePt" dir="t"/>
+    </dgm:scene3d>
+    <dgm:sp3d/>
+    <dgm:txPr/>
+    <dgm:style>
+      <a:lnRef idx="2">
+        <a:scrgbClr r="0" g="0" b="0"/>
+      </a:lnRef>
+      <a:fillRef idx="1">
+        <a:scrgbClr r="0" g="0" b="0"/>
+      </a:fillRef>
+      <a:effectRef idx="0">
+        <a:scrgbClr r="0" g="0" b="0"/>
+      </a:effectRef>
+      <a:fontRef idx="minor">
+        <a:schemeClr val="lt1"/>
+      </a:fontRef>
+    </dgm:style>
+  </dgm:styleLbl>
+  <dgm:styleLbl name="asst3">
+    <dgm:scene3d>
+      <a:camera prst="orthographicFront"/>
+      <a:lightRig rig="threePt" dir="t"/>
+    </dgm:scene3d>
+    <dgm:sp3d/>
+    <dgm:txPr/>
+    <dgm:style>
+      <a:lnRef idx="2">
+        <a:scrgbClr r="0" g="0" b="0"/>
+      </a:lnRef>
+      <a:fillRef idx="1">
+        <a:scrgbClr r="0" g="0" b="0"/>
+      </a:fillRef>
+      <a:effectRef idx="0">
+        <a:scrgbClr r="0" g="0" b="0"/>
+      </a:effectRef>
+      <a:fontRef idx="minor">
+        <a:schemeClr val="lt1"/>
+      </a:fontRef>
+    </dgm:style>
+  </dgm:styleLbl>
+  <dgm:styleLbl name="asst4">
+    <dgm:scene3d>
+      <a:camera prst="orthographicFront"/>
+      <a:lightRig rig="threePt" dir="t"/>
+    </dgm:scene3d>
+    <dgm:sp3d/>
+    <dgm:txPr/>
+    <dgm:style>
+      <a:lnRef idx="2">
+        <a:scrgbClr r="0" g="0" b="0"/>
+      </a:lnRef>
+      <a:fillRef idx="1">
+        <a:scrgbClr r="0" g="0" b="0"/>
+      </a:fillRef>
+      <a:effectRef idx="0">
+        <a:scrgbClr r="0" g="0" b="0"/>
+      </a:effectRef>
+      <a:fontRef idx="minor">
+        <a:schemeClr val="lt1"/>
+      </a:fontRef>
+    </dgm:style>
+  </dgm:styleLbl>
+  <dgm:styleLbl name="parChTrans2D1">
+    <dgm:scene3d>
+      <a:camera prst="orthographicFront"/>
+      <a:lightRig rig="threePt" dir="t"/>
+    </dgm:scene3d>
+    <dgm:sp3d/>
+    <dgm:txPr/>
+    <dgm:style>
+      <a:lnRef idx="2">
+        <a:scrgbClr r="0" g="0" b="0"/>
+      </a:lnRef>
+      <a:fillRef idx="1">
+        <a:scrgbClr r="0" g="0" b="0"/>
+      </a:fillRef>
+      <a:effectRef idx="0">
+        <a:scrgbClr r="0" g="0" b="0"/>
+      </a:effectRef>
+      <a:fontRef idx="minor">
+        <a:schemeClr val="lt1"/>
+      </a:fontRef>
+    </dgm:style>
+  </dgm:styleLbl>
+  <dgm:styleLbl name="parChTrans2D2">
+    <dgm:scene3d>
+      <a:camera prst="orthographicFront"/>
+      <a:lightRig rig="threePt" dir="t"/>
+    </dgm:scene3d>
+    <dgm:sp3d/>
+    <dgm:txPr/>
+    <dgm:style>
+      <a:lnRef idx="2">
+        <a:scrgbClr r="0" g="0" b="0"/>
+      </a:lnRef>
+      <a:fillRef idx="1">
+        <a:scrgbClr r="0" g="0" b="0"/>
+      </a:fillRef>
+      <a:effectRef idx="0">
+        <a:scrgbClr r="0" g="0" b="0"/>
+      </a:effectRef>
+      <a:fontRef idx="minor">
+        <a:schemeClr val="lt1"/>
+      </a:fontRef>
+    </dgm:style>
+  </dgm:styleLbl>
+  <dgm:styleLbl name="parChTrans2D3">
+    <dgm:scene3d>
+      <a:camera prst="orthographicFront"/>
+      <a:lightRig rig="threePt" dir="t"/>
+    </dgm:scene3d>
+    <dgm:sp3d/>
+    <dgm:txPr/>
+    <dgm:style>
+      <a:lnRef idx="2">
+        <a:scrgbClr r="0" g="0" b="0"/>
+      </a:lnRef>
+      <a:fillRef idx="1">
+        <a:scrgbClr r="0" g="0" b="0"/>
+      </a:fillRef>
+      <a:effectRef idx="0">
+        <a:scrgbClr r="0" g="0" b="0"/>
+      </a:effectRef>
+      <a:fontRef idx="minor">
+        <a:schemeClr val="lt1"/>
+      </a:fontRef>
+    </dgm:style>
+  </dgm:styleLbl>
+  <dgm:styleLbl name="parChTrans2D4">
+    <dgm:scene3d>
+      <a:camera prst="orthographicFront"/>
+      <a:lightRig rig="threePt" dir="t"/>
+    </dgm:scene3d>
+    <dgm:sp3d/>
+    <dgm:txPr/>
+    <dgm:style>
+      <a:lnRef idx="2">
+        <a:scrgbClr r="0" g="0" b="0"/>
+      </a:lnRef>
+      <a:fillRef idx="1">
+        <a:scrgbClr r="0" g="0" b="0"/>
+      </a:fillRef>
+      <a:effectRef idx="0">
+        <a:scrgbClr r="0" g="0" b="0"/>
+      </a:effectRef>
+      <a:fontRef idx="minor">
+        <a:schemeClr val="lt1"/>
+      </a:fontRef>
+    </dgm:style>
+  </dgm:styleLbl>
+  <dgm:styleLbl name="parChTrans1D1">
+    <dgm:scene3d>
+      <a:camera prst="orthographicFront"/>
+      <a:lightRig rig="threePt" dir="t"/>
+    </dgm:scene3d>
+    <dgm:sp3d/>
+    <dgm:txPr/>
+    <dgm:style>
+      <a:lnRef idx="2">
+        <a:scrgbClr r="0" g="0" b="0"/>
+      </a:lnRef>
+      <a:fillRef idx="0">
+        <a:scrgbClr r="0" g="0" b="0"/>
+      </a:fillRef>
+      <a:effectRef idx="0">
+        <a:scrgbClr r="0" g="0" b="0"/>
+      </a:effectRef>
+      <a:fontRef idx="minor"/>
+    </dgm:style>
+  </dgm:styleLbl>
+  <dgm:styleLbl name="parChTrans1D2">
+    <dgm:scene3d>
+      <a:camera prst="orthographicFront"/>
+      <a:lightRig rig="threePt" dir="t"/>
+    </dgm:scene3d>
+    <dgm:sp3d/>
+    <dgm:txPr/>
+    <dgm:style>
+      <a:lnRef idx="2">
+        <a:scrgbClr r="0" g="0" b="0"/>
+      </a:lnRef>
+      <a:fillRef idx="0">
+        <a:scrgbClr r="0" g="0" b="0"/>
+      </a:fillRef>
+      <a:effectRef idx="0">
+        <a:scrgbClr r="0" g="0" b="0"/>
+      </a:effectRef>
+      <a:fontRef idx="minor"/>
+    </dgm:style>
+  </dgm:styleLbl>
+  <dgm:styleLbl name="parChTrans1D3">
+    <dgm:scene3d>
+      <a:camera prst="orthographicFront"/>
+      <a:lightRig rig="threePt" dir="t"/>
+    </dgm:scene3d>
+    <dgm:sp3d/>
+    <dgm:txPr/>
+    <dgm:style>
+      <a:lnRef idx="2">
+        <a:scrgbClr r="0" g="0" b="0"/>
+      </a:lnRef>
+      <a:fillRef idx="0">
+        <a:scrgbClr r="0" g="0" b="0"/>
+      </a:fillRef>
+      <a:effectRef idx="0">
+        <a:scrgbClr r="0" g="0" b="0"/>
+      </a:effectRef>
+      <a:fontRef idx="minor"/>
+    </dgm:style>
+  </dgm:styleLbl>
+  <dgm:styleLbl name="parChTrans1D4">
+    <dgm:scene3d>
+      <a:camera prst="orthographicFront"/>
+      <a:lightRig rig="threePt" dir="t"/>
+    </dgm:scene3d>
+    <dgm:sp3d/>
+    <dgm:txPr/>
+    <dgm:style>
+      <a:lnRef idx="2">
+        <a:scrgbClr r="0" g="0" b="0"/>
+      </a:lnRef>
+      <a:fillRef idx="0">
+        <a:scrgbClr r="0" g="0" b="0"/>
+      </a:fillRef>
+      <a:effectRef idx="0">
+        <a:scrgbClr r="0" g="0" b="0"/>
+      </a:effectRef>
+      <a:fontRef idx="minor"/>
+    </dgm:style>
+  </dgm:styleLbl>
+  <dgm:styleLbl name="fgAcc1">
+    <dgm:scene3d>
+      <a:camera prst="orthographicFront"/>
+      <a:lightRig rig="threePt" dir="t"/>
+    </dgm:scene3d>
+    <dgm:sp3d/>
+    <dgm:txPr/>
+    <dgm:style>
+      <a:lnRef idx="2">
+        <a:scrgbClr r="0" g="0" b="0"/>
+      </a:lnRef>
+      <a:fillRef idx="1">
+        <a:scrgbClr r="0" g="0" b="0"/>
+      </a:fillRef>
+      <a:effectRef idx="0">
+        <a:scrgbClr r="0" g="0" b="0"/>
+      </a:effectRef>
+      <a:fontRef idx="minor"/>
+    </dgm:style>
+  </dgm:styleLbl>
+  <dgm:styleLbl name="conFgAcc1">
+    <dgm:scene3d>
+      <a:camera prst="orthographicFront"/>
+      <a:lightRig rig="threePt" dir="t"/>
+    </dgm:scene3d>
+    <dgm:sp3d/>
+    <dgm:txPr/>
+    <dgm:style>
+      <a:lnRef idx="2">
+        <a:scrgbClr r="0" g="0" b="0"/>
+      </a:lnRef>
+      <a:fillRef idx="1">
+        <a:scrgbClr r="0" g="0" b="0"/>
+      </a:fillRef>
+      <a:effectRef idx="0">
+        <a:scrgbClr r="0" g="0" b="0"/>
+      </a:effectRef>
+      <a:fontRef idx="minor"/>
+    </dgm:style>
+  </dgm:styleLbl>
+  <dgm:styleLbl name="alignAcc1">
+    <dgm:scene3d>
+      <a:camera prst="orthographicFront"/>
+      <a:lightRig rig="threePt" dir="t"/>
+    </dgm:scene3d>
+    <dgm:sp3d/>
+    <dgm:txPr/>
+    <dgm:style>
+      <a:lnRef idx="2">
+        <a:scrgbClr r="0" g="0" b="0"/>
+      </a:lnRef>
+      <a:fillRef idx="1">
+        <a:scrgbClr r="0" g="0" b="0"/>
+      </a:fillRef>
+      <a:effectRef idx="0">
+        <a:scrgbClr r="0" g="0" b="0"/>
+      </a:effectRef>
+      <a:fontRef idx="minor"/>
+    </dgm:style>
+  </dgm:styleLbl>
+  <dgm:styleLbl name="trAlignAcc1">
+    <dgm:scene3d>
+      <a:camera prst="orthographicFront"/>
+      <a:lightRig rig="threePt" dir="t"/>
+    </dgm:scene3d>
+    <dgm:sp3d/>
+    <dgm:txPr/>
+    <dgm:style>
+      <a:lnRef idx="1">
+        <a:scrgbClr r="0" g="0" b="0"/>
+      </a:lnRef>
+      <a:fillRef idx="1">
+        <a:scrgbClr r="0" g="0" b="0"/>
+      </a:fillRef>
+      <a:effectRef idx="0">
+        <a:scrgbClr r="0" g="0" b="0"/>
+      </a:effectRef>
+      <a:fontRef idx="minor"/>
+    </dgm:style>
+  </dgm:styleLbl>
+  <dgm:styleLbl name="bgAcc1">
+    <dgm:scene3d>
+      <a:camera prst="orthographicFront"/>
+      <a:lightRig rig="threePt" dir="t"/>
+    </dgm:scene3d>
+    <dgm:sp3d/>
+    <dgm:txPr/>
+    <dgm:style>
+      <a:lnRef idx="2">
+        <a:scrgbClr r="0" g="0" b="0"/>
+      </a:lnRef>
+      <a:fillRef idx="1">
+        <a:scrgbClr r="0" g="0" b="0"/>
+      </a:fillRef>
+      <a:effectRef idx="0">
+        <a:scrgbClr r="0" g="0" b="0"/>
+      </a:effectRef>
+      <a:fontRef idx="minor"/>
+    </dgm:style>
+  </dgm:styleLbl>
+  <dgm:styleLbl name="solidFgAcc1">
+    <dgm:scene3d>
+      <a:camera prst="orthographicFront"/>
+      <a:lightRig rig="threePt" dir="t"/>
+    </dgm:scene3d>
+    <dgm:sp3d/>
+    <dgm:txPr/>
+    <dgm:style>
+      <a:lnRef idx="2">
+        <a:scrgbClr r="0" g="0" b="0"/>
+      </a:lnRef>
+      <a:fillRef idx="1">
+        <a:scrgbClr r="0" g="0" b="0"/>
+      </a:fillRef>
+      <a:effectRef idx="0">
+        <a:scrgbClr r="0" g="0" b="0"/>
+      </a:effectRef>
+      <a:fontRef idx="minor"/>
+    </dgm:style>
+  </dgm:styleLbl>
+  <dgm:styleLbl name="solidAlignAcc1">
+    <dgm:scene3d>
+      <a:camera prst="orthographicFront"/>
+      <a:lightRig rig="threePt" dir="t"/>
+    </dgm:scene3d>
+    <dgm:sp3d/>
+    <dgm:txPr/>
+    <dgm:style>
+      <a:lnRef idx="2">
+        <a:scrgbClr r="0" g="0" b="0"/>
+      </a:lnRef>
+      <a:fillRef idx="1">
+        <a:scrgbClr r="0" g="0" b="0"/>
+      </a:fillRef>
+      <a:effectRef idx="0">
+        <a:scrgbClr r="0" g="0" b="0"/>
+      </a:effectRef>
+      <a:fontRef idx="minor"/>
+    </dgm:style>
+  </dgm:styleLbl>
+  <dgm:styleLbl name="solidBgAcc1">
+    <dgm:scene3d>
+      <a:camera prst="orthographicFront"/>
+      <a:lightRig rig="threePt" dir="t"/>
+    </dgm:scene3d>
+    <dgm:sp3d/>
+    <dgm:txPr/>
+    <dgm:style>
+      <a:lnRef idx="2">
+        <a:scrgbClr r="0" g="0" b="0"/>
+      </a:lnRef>
+      <a:fillRef idx="1">
+        <a:scrgbClr r="0" g="0" b="0"/>
+      </a:fillRef>
+      <a:effectRef idx="0">
+        <a:scrgbClr r="0" g="0" b="0"/>
+      </a:effectRef>
+      <a:fontRef idx="minor"/>
+    </dgm:style>
+  </dgm:styleLbl>
+  <dgm:styleLbl name="fgAccFollowNode1">
+    <dgm:scene3d>
+      <a:camera prst="orthographicFront"/>
+      <a:lightRig rig="threePt" dir="t"/>
+    </dgm:scene3d>
+    <dgm:sp3d/>
+    <dgm:txPr/>
+    <dgm:style>
+      <a:lnRef idx="2">
+        <a:scrgbClr r="0" g="0" b="0"/>
+      </a:lnRef>
+      <a:fillRef idx="1">
+        <a:scrgbClr r="0" g="0" b="0"/>
+      </a:fillRef>
+      <a:effectRef idx="0">
+        <a:scrgbClr r="0" g="0" b="0"/>
+      </a:effectRef>
+      <a:fontRef idx="minor"/>
+    </dgm:style>
+  </dgm:styleLbl>
+  <dgm:styleLbl name="alignAccFollowNode1">
+    <dgm:scene3d>
+      <a:camera prst="orthographicFront"/>
+      <a:lightRig rig="threePt" dir="t"/>
+    </dgm:scene3d>
+    <dgm:sp3d/>
+    <dgm:txPr/>
+    <dgm:style>
+      <a:lnRef idx="2">
+        <a:scrgbClr r="0" g="0" b="0"/>
+      </a:lnRef>
+      <a:fillRef idx="1">
+        <a:scrgbClr r="0" g="0" b="0"/>
+      </a:fillRef>
+      <a:effectRef idx="0">
+        <a:scrgbClr r="0" g="0" b="0"/>
+      </a:effectRef>
+      <a:fontRef idx="minor"/>
+    </dgm:style>
+  </dgm:styleLbl>
+  <dgm:styleLbl name="bgAccFollowNode1">
+    <dgm:scene3d>
+      <a:camera prst="orthographicFront"/>
+      <a:lightRig rig="threePt" dir="t"/>
+    </dgm:scene3d>
+    <dgm:sp3d/>
+    <dgm:txPr/>
+    <dgm:style>
+      <a:lnRef idx="2">
+        <a:scrgbClr r="0" g="0" b="0"/>
+      </a:lnRef>
+      <a:fillRef idx="1">
+        <a:scrgbClr r="0" g="0" b="0"/>
+      </a:fillRef>
+      <a:effectRef idx="0">
+        <a:scrgbClr r="0" g="0" b="0"/>
+      </a:effectRef>
+      <a:fontRef idx="minor"/>
+    </dgm:style>
+  </dgm:styleLbl>
+  <dgm:styleLbl name="fgAcc0">
+    <dgm:scene3d>
+      <a:camera prst="orthographicFront"/>
+      <a:lightRig rig="threePt" dir="t"/>
+    </dgm:scene3d>
+    <dgm:sp3d/>
+    <dgm:txPr/>
+    <dgm:style>
+      <a:lnRef idx="2">
+        <a:scrgbClr r="0" g="0" b="0"/>
+      </a:lnRef>
+      <a:fillRef idx="1">
+        <a:scrgbClr r="0" g="0" b="0"/>
+      </a:fillRef>
+      <a:effectRef idx="0">
+        <a:scrgbClr r="0" g="0" b="0"/>
+      </a:effectRef>
+      <a:fontRef idx="minor"/>
+    </dgm:style>
+  </dgm:styleLbl>
+  <dgm:styleLbl name="fgAcc2">
+    <dgm:scene3d>
+      <a:camera prst="orthographicFront"/>
+      <a:lightRig rig="threePt" dir="t"/>
+    </dgm:scene3d>
+    <dgm:sp3d/>
+    <dgm:txPr/>
+    <dgm:style>
+      <a:lnRef idx="2">
+        <a:scrgbClr r="0" g="0" b="0"/>
+      </a:lnRef>
+      <a:fillRef idx="1">
+        <a:scrgbClr r="0" g="0" b="0"/>
+      </a:fillRef>
+      <a:effectRef idx="0">
+        <a:scrgbClr r="0" g="0" b="0"/>
+      </a:effectRef>
+      <a:fontRef idx="minor"/>
+    </dgm:style>
+  </dgm:styleLbl>
+  <dgm:styleLbl name="fgAcc3">
+    <dgm:scene3d>
+      <a:camera prst="orthographicFront"/>
+      <a:lightRig rig="threePt" dir="t"/>
+    </dgm:scene3d>
+    <dgm:sp3d/>
+    <dgm:txPr/>
+    <dgm:style>
+      <a:lnRef idx="2">
+        <a:scrgbClr r="0" g="0" b="0"/>
+      </a:lnRef>
+      <a:fillRef idx="1">
+        <a:scrgbClr r="0" g="0" b="0"/>
+      </a:fillRef>
+      <a:effectRef idx="0">
+        <a:scrgbClr r="0" g="0" b="0"/>
+      </a:effectRef>
+      <a:fontRef idx="minor"/>
+    </dgm:style>
+  </dgm:styleLbl>
+  <dgm:styleLbl name="fgAcc4">
+    <dgm:scene3d>
+      <a:camera prst="orthographicFront"/>
+      <a:lightRig rig="threePt" dir="t"/>
+    </dgm:scene3d>
+    <dgm:sp3d/>
+    <dgm:txPr/>
+    <dgm:style>
+      <a:lnRef idx="2">
+        <a:scrgbClr r="0" g="0" b="0"/>
+      </a:lnRef>
+      <a:fillRef idx="1">
+        <a:scrgbClr r="0" g="0" b="0"/>
+      </a:fillRef>
+      <a:effectRef idx="0">
+        <a:scrgbClr r="0" g="0" b="0"/>
+      </a:effectRef>
+      <a:fontRef idx="minor"/>
+    </dgm:style>
+  </dgm:styleLbl>
+  <dgm:styleLbl name="bgShp">
+    <dgm:scene3d>
+      <a:camera prst="orthographicFront"/>
+      <a:lightRig rig="threePt" dir="t"/>
+    </dgm:scene3d>
+    <dgm:sp3d/>
+    <dgm:txPr/>
+    <dgm:style>
+      <a:lnRef idx="0">
+        <a:scrgbClr r="0" g="0" b="0"/>
+      </a:lnRef>
+      <a:fillRef idx="1">
+        <a:scrgbClr r="0" g="0" b="0"/>
+      </a:fillRef>
+      <a:effectRef idx="0">
+        <a:scrgbClr r="0" g="0" b="0"/>
+      </a:effectRef>
+      <a:fontRef idx="minor"/>
+    </dgm:style>
+  </dgm:styleLbl>
+  <dgm:styleLbl name="dkBgShp">
+    <dgm:scene3d>
+      <a:camera prst="orthographicFront"/>
+      <a:lightRig rig="threePt" dir="t"/>
+    </dgm:scene3d>
+    <dgm:sp3d/>
+    <dgm:txPr/>
+    <dgm:style>
+      <a:lnRef idx="0">
+        <a:scrgbClr r="0" g="0" b="0"/>
+      </a:lnRef>
+      <a:fillRef idx="1">
+        <a:scrgbClr r="0" g="0" b="0"/>
+      </a:fillRef>
+      <a:effectRef idx="0">
+        <a:scrgbClr r="0" g="0" b="0"/>
+      </a:effectRef>
+      <a:fontRef idx="minor"/>
+    </dgm:style>
+  </dgm:styleLbl>
+  <dgm:styleLbl name="trBgShp">
+    <dgm:scene3d>
+      <a:camera prst="orthographicFront"/>
+      <a:lightRig rig="threePt" dir="t"/>
+    </dgm:scene3d>
+    <dgm:sp3d/>
+    <dgm:txPr/>
+    <dgm:style>
+      <a:lnRef idx="0">
+        <a:scrgbClr r="0" g="0" b="0"/>
+      </a:lnRef>
+      <a:fillRef idx="1">
+        <a:scrgbClr r="0" g="0" b="0"/>
+      </a:fillRef>
+      <a:effectRef idx="0">
+        <a:scrgbClr r="0" g="0" b="0"/>
+      </a:effectRef>
+      <a:fontRef idx="minor"/>
+    </dgm:style>
+  </dgm:styleLbl>
+  <dgm:styleLbl name="fgShp">
+    <dgm:scene3d>
+      <a:camera prst="orthographicFront"/>
+      <a:lightRig rig="threePt" dir="t"/>
+    </dgm:scene3d>
+    <dgm:sp3d/>
+    <dgm:txPr/>
+    <dgm:style>
+      <a:lnRef idx="2">
+        <a:scrgbClr r="0" g="0" b="0"/>
+      </a:lnRef>
+      <a:fillRef idx="1">
+        <a:scrgbClr r="0" g="0" b="0"/>
+      </a:fillRef>
+      <a:effectRef idx="0">
+        <a:scrgbClr r="0" g="0" b="0"/>
+      </a:effectRef>
+      <a:fontRef idx="minor"/>
+    </dgm:style>
+  </dgm:styleLbl>
+  <dgm:styleLbl name="revTx">
+    <dgm:scene3d>
+      <a:camera prst="orthographicFront"/>
+      <a:lightRig rig="threePt" dir="t"/>
+    </dgm:scene3d>
+    <dgm:sp3d/>
+    <dgm:txPr/>
+    <dgm:style>
+      <a:lnRef idx="0">
+        <a:scrgbClr r="0" g="0" b="0"/>
+      </a:lnRef>
+      <a:fillRef idx="0">
+        <a:scrgbClr r="0" g="0" b="0"/>
+      </a:fillRef>
+      <a:effectRef idx="0">
+        <a:scrgbClr r="0" g="0" b="0"/>
+      </a:effectRef>
+      <a:fontRef idx="minor"/>
+    </dgm:style>
+  </dgm:styleLbl>
+</dgm:styleDef>
 </file>
 
 <file path=ppt/notesMasters/notesMaster1.xml><?xml version="1.0" encoding="utf-8"?>
@@ -758,7 +3724,7 @@
           <a:p>
             <a:fld id="{8B0993E8-77CB-4CE8-8134-9D98A3510F3A}" type="slidenum">
               <a:rPr lang="en-US" smtClean="0"/>
-              <a:t>3</a:t>
+              <a:t>4</a:t>
             </a:fld>
             <a:endParaRPr lang="en-US" dirty="0"/>
           </a:p>
@@ -822,114 +3788,9 @@
           <a:lstStyle/>
           <a:p>
             <a:r>
-              <a:rPr lang="en-US" sz="900" b="0" i="0" u="none" strike="noStrike" kern="1200" dirty="0">
-                <a:solidFill>
-                  <a:schemeClr val="tx1"/>
-                </a:solidFill>
-                <a:effectLst/>
-                <a:latin typeface="+mn-lt"/>
-                <a:ea typeface="+mn-ea"/>
-                <a:cs typeface="+mn-cs"/>
-              </a:rPr>
-              <a:t>Decision trees are built using a heuristic called </a:t>
-            </a:r>
-            <a:r>
-              <a:rPr lang="en-US" sz="900" b="1" i="0" u="none" strike="noStrike" kern="1200" dirty="0">
-                <a:solidFill>
-                  <a:schemeClr val="tx1"/>
-                </a:solidFill>
-                <a:effectLst/>
-                <a:latin typeface="+mn-lt"/>
-                <a:ea typeface="+mn-ea"/>
-                <a:cs typeface="+mn-cs"/>
-              </a:rPr>
-              <a:t>recursive partitioning</a:t>
-            </a:r>
-            <a:r>
-              <a:rPr lang="en-US" sz="900" b="0" i="0" u="none" strike="noStrike" kern="1200" dirty="0">
-                <a:solidFill>
-                  <a:schemeClr val="tx1"/>
-                </a:solidFill>
-                <a:effectLst/>
-                <a:latin typeface="+mn-lt"/>
-                <a:ea typeface="+mn-ea"/>
-                <a:cs typeface="+mn-cs"/>
-              </a:rPr>
-              <a:t>. This approach is also commonly known as </a:t>
-            </a:r>
-            <a:r>
-              <a:rPr lang="en-US" sz="900" b="1" i="0" u="none" strike="noStrike" kern="1200" dirty="0">
-                <a:solidFill>
-                  <a:schemeClr val="tx1"/>
-                </a:solidFill>
-                <a:effectLst/>
-                <a:latin typeface="+mn-lt"/>
-                <a:ea typeface="+mn-ea"/>
-                <a:cs typeface="+mn-cs"/>
-              </a:rPr>
-              <a:t>divide and conquer</a:t>
-            </a:r>
-            <a:r>
-              <a:rPr lang="en-US" sz="900" b="0" i="0" u="none" strike="noStrike" kern="1200" dirty="0">
-                <a:solidFill>
-                  <a:schemeClr val="tx1"/>
-                </a:solidFill>
-                <a:effectLst/>
-                <a:latin typeface="+mn-lt"/>
-                <a:ea typeface="+mn-ea"/>
-                <a:cs typeface="+mn-cs"/>
-              </a:rPr>
-              <a:t> because it splits the data into subsets, which are then split repeatedly into even </a:t>
-            </a:r>
-            <a:r>
-              <a:rPr lang="en-US" sz="900" b="1" i="0" u="none" strike="noStrike" kern="1200" dirty="0">
-                <a:solidFill>
-                  <a:schemeClr val="tx1"/>
-                </a:solidFill>
-                <a:effectLst/>
-                <a:latin typeface="+mn-lt"/>
-                <a:ea typeface="+mn-ea"/>
-                <a:cs typeface="+mn-cs"/>
-              </a:rPr>
-              <a:t>smaller subsets</a:t>
-            </a:r>
-            <a:r>
-              <a:rPr lang="en-US" sz="900" b="0" i="0" u="none" strike="noStrike" kern="1200" dirty="0">
-                <a:solidFill>
-                  <a:schemeClr val="tx1"/>
-                </a:solidFill>
-                <a:effectLst/>
-                <a:latin typeface="+mn-lt"/>
-                <a:ea typeface="+mn-ea"/>
-                <a:cs typeface="+mn-cs"/>
-              </a:rPr>
-              <a:t>, and so on and so forth until the process stops when the algorithm determines the data within the subsets are </a:t>
-            </a:r>
-            <a:r>
-              <a:rPr lang="en-US" sz="900" b="1" i="0" u="none" strike="noStrike" kern="1200" dirty="0">
-                <a:solidFill>
-                  <a:schemeClr val="tx1"/>
-                </a:solidFill>
-                <a:effectLst/>
-                <a:latin typeface="+mn-lt"/>
-                <a:ea typeface="+mn-ea"/>
-                <a:cs typeface="+mn-cs"/>
-              </a:rPr>
-              <a:t>sufficiently homogenous</a:t>
-            </a:r>
-            <a:r>
-              <a:rPr lang="en-US" sz="900" b="0" i="0" u="none" strike="noStrike" kern="1200" dirty="0">
-                <a:solidFill>
-                  <a:schemeClr val="tx1"/>
-                </a:solidFill>
-                <a:effectLst/>
-                <a:latin typeface="+mn-lt"/>
-                <a:ea typeface="+mn-ea"/>
-                <a:cs typeface="+mn-cs"/>
-              </a:rPr>
-              <a:t>, or another stopping criterion has been met.</a:t>
-            </a:r>
-            <a:endParaRPr lang="en-US" dirty="0"/>
+              <a:rPr lang="en-US" dirty="0"/>
+              <a:t>Here we are looking at a classification tree - which is partitioning data values based on height and weight. Given that in this instance, we are looking at categorical data, the method is attempting to split variables based on the the maximum homogeneity. </a:t>
+            </a:r>
           </a:p>
         </p:txBody>
       </p:sp>
@@ -950,7 +3811,7 @@
           <a:p>
             <a:fld id="{8B0993E8-77CB-4CE8-8134-9D98A3510F3A}" type="slidenum">
               <a:rPr lang="en-US" smtClean="0"/>
-              <a:t>4</a:t>
+              <a:t>5</a:t>
             </a:fld>
             <a:endParaRPr lang="en-US" dirty="0"/>
           </a:p>
@@ -1013,7 +3874,10 @@
           <a:bodyPr/>
           <a:lstStyle/>
           <a:p>
-            <a:endParaRPr lang="en-US" dirty="0"/>
+            <a:r>
+              <a:rPr lang="en-US" dirty="0"/>
+              <a:t>For a regression tree, we use a different approach to determining homogeneity of groups, and thus </a:t>
+            </a:r>
           </a:p>
         </p:txBody>
       </p:sp>
@@ -1034,7 +3898,211 @@
           <a:p>
             <a:fld id="{8B0993E8-77CB-4CE8-8134-9D98A3510F3A}" type="slidenum">
               <a:rPr lang="en-US" smtClean="0"/>
-              <a:t>12</a:t>
+              <a:t>6</a:t>
+            </a:fld>
+            <a:endParaRPr lang="en-US" dirty="0"/>
+          </a:p>
+        </p:txBody>
+      </p:sp>
+    </p:spTree>
+    <p:extLst>
+      <p:ext uri="{BB962C8B-B14F-4D97-AF65-F5344CB8AC3E}">
+        <p14:creationId xmlns:p14="http://schemas.microsoft.com/office/powerpoint/2010/main" val="2565562912"/>
+      </p:ext>
+    </p:extLst>
+  </p:cSld>
+  <p:clrMapOvr>
+    <a:masterClrMapping/>
+  </p:clrMapOvr>
+</p:notes>
+</file>
+
+<file path=ppt/notesSlides/notesSlide5.xml><?xml version="1.0" encoding="utf-8"?>
+<p:notes xmlns:a="http://schemas.openxmlformats.org/drawingml/2006/main" xmlns:r="http://schemas.openxmlformats.org/officeDocument/2006/relationships" xmlns:p="http://schemas.openxmlformats.org/presentationml/2006/main">
+  <p:cSld>
+    <p:spTree>
+      <p:nvGrpSpPr>
+        <p:cNvPr id="1" name=""/>
+        <p:cNvGrpSpPr/>
+        <p:nvPr/>
+      </p:nvGrpSpPr>
+      <p:grpSpPr>
+        <a:xfrm>
+          <a:off x="0" y="0"/>
+          <a:ext cx="0" cy="0"/>
+          <a:chOff x="0" y="0"/>
+          <a:chExt cx="0" cy="0"/>
+        </a:xfrm>
+      </p:grpSpPr>
+      <p:sp>
+        <p:nvSpPr>
+          <p:cNvPr id="2" name="Slide Image Placeholder 1"/>
+          <p:cNvSpPr>
+            <a:spLocks noGrp="1" noRot="1" noChangeAspect="1"/>
+          </p:cNvSpPr>
+          <p:nvPr>
+            <p:ph type="sldImg"/>
+          </p:nvPr>
+        </p:nvSpPr>
+        <p:spPr/>
+      </p:sp>
+      <p:sp>
+        <p:nvSpPr>
+          <p:cNvPr id="3" name="Notes Placeholder 2"/>
+          <p:cNvSpPr>
+            <a:spLocks noGrp="1"/>
+          </p:cNvSpPr>
+          <p:nvPr>
+            <p:ph type="body" idx="1"/>
+          </p:nvPr>
+        </p:nvSpPr>
+        <p:spPr/>
+        <p:txBody>
+          <a:bodyPr/>
+          <a:lstStyle/>
+          <a:p>
+            <a:r>
+              <a:rPr lang="en-US" sz="900" b="0" i="0" u="none" strike="noStrike" kern="1200" dirty="0">
+                <a:solidFill>
+                  <a:schemeClr val="tx1"/>
+                </a:solidFill>
+                <a:effectLst/>
+                <a:latin typeface="+mn-lt"/>
+                <a:ea typeface="+mn-ea"/>
+                <a:cs typeface="+mn-cs"/>
+              </a:rPr>
+              <a:t>In </a:t>
+            </a:r>
+            <a:r>
+              <a:rPr lang="en-US" sz="900" b="1" i="0" u="none" strike="noStrike" kern="1200" dirty="0">
+                <a:solidFill>
+                  <a:schemeClr val="tx1"/>
+                </a:solidFill>
+                <a:effectLst/>
+                <a:latin typeface="+mn-lt"/>
+                <a:ea typeface="+mn-ea"/>
+                <a:cs typeface="+mn-cs"/>
+              </a:rPr>
+              <a:t>pruning</a:t>
+            </a:r>
+            <a:r>
+              <a:rPr lang="en-US" sz="900" b="0" i="0" u="none" strike="noStrike" kern="1200" dirty="0">
+                <a:solidFill>
+                  <a:schemeClr val="tx1"/>
+                </a:solidFill>
+                <a:effectLst/>
+                <a:latin typeface="+mn-lt"/>
+                <a:ea typeface="+mn-ea"/>
+                <a:cs typeface="+mn-cs"/>
+              </a:rPr>
+              <a:t>, you trim off the branches of the tree, i.e., remove the decision nodes starting from the leaf node such that the overall accuracy is not disturbed. This is done by segregating the actual training set into two sets: training data set, D and validation data set, V. Prepare the decision tree using the segregated training data set, D. Then continue trimming the tree accordingly to optimize the accuracy of the validation data set, V.</a:t>
+            </a:r>
+            <a:endParaRPr lang="en-US" dirty="0"/>
+          </a:p>
+        </p:txBody>
+      </p:sp>
+      <p:sp>
+        <p:nvSpPr>
+          <p:cNvPr id="4" name="Slide Number Placeholder 3"/>
+          <p:cNvSpPr>
+            <a:spLocks noGrp="1"/>
+          </p:cNvSpPr>
+          <p:nvPr>
+            <p:ph type="sldNum" sz="quarter" idx="5"/>
+          </p:nvPr>
+        </p:nvSpPr>
+        <p:spPr/>
+        <p:txBody>
+          <a:bodyPr/>
+          <a:lstStyle/>
+          <a:p>
+            <a:fld id="{8B0993E8-77CB-4CE8-8134-9D98A3510F3A}" type="slidenum">
+              <a:rPr lang="en-US" smtClean="0"/>
+              <a:t>10</a:t>
+            </a:fld>
+            <a:endParaRPr lang="en-US" dirty="0"/>
+          </a:p>
+        </p:txBody>
+      </p:sp>
+    </p:spTree>
+    <p:extLst>
+      <p:ext uri="{BB962C8B-B14F-4D97-AF65-F5344CB8AC3E}">
+        <p14:creationId xmlns:p14="http://schemas.microsoft.com/office/powerpoint/2010/main" val="3260458545"/>
+      </p:ext>
+    </p:extLst>
+  </p:cSld>
+  <p:clrMapOvr>
+    <a:masterClrMapping/>
+  </p:clrMapOvr>
+</p:notes>
+</file>
+
+<file path=ppt/notesSlides/notesSlide6.xml><?xml version="1.0" encoding="utf-8"?>
+<p:notes xmlns:a="http://schemas.openxmlformats.org/drawingml/2006/main" xmlns:r="http://schemas.openxmlformats.org/officeDocument/2006/relationships" xmlns:p="http://schemas.openxmlformats.org/presentationml/2006/main">
+  <p:cSld>
+    <p:spTree>
+      <p:nvGrpSpPr>
+        <p:cNvPr id="1" name=""/>
+        <p:cNvGrpSpPr/>
+        <p:nvPr/>
+      </p:nvGrpSpPr>
+      <p:grpSpPr>
+        <a:xfrm>
+          <a:off x="0" y="0"/>
+          <a:ext cx="0" cy="0"/>
+          <a:chOff x="0" y="0"/>
+          <a:chExt cx="0" cy="0"/>
+        </a:xfrm>
+      </p:grpSpPr>
+      <p:sp>
+        <p:nvSpPr>
+          <p:cNvPr id="2" name="Slide Image Placeholder 1"/>
+          <p:cNvSpPr>
+            <a:spLocks noGrp="1" noRot="1" noChangeAspect="1"/>
+          </p:cNvSpPr>
+          <p:nvPr>
+            <p:ph type="sldImg"/>
+          </p:nvPr>
+        </p:nvSpPr>
+        <p:spPr/>
+      </p:sp>
+      <p:sp>
+        <p:nvSpPr>
+          <p:cNvPr id="3" name="Notes Placeholder 2"/>
+          <p:cNvSpPr>
+            <a:spLocks noGrp="1"/>
+          </p:cNvSpPr>
+          <p:nvPr>
+            <p:ph type="body" idx="1"/>
+          </p:nvPr>
+        </p:nvSpPr>
+        <p:spPr/>
+        <p:txBody>
+          <a:bodyPr/>
+          <a:lstStyle/>
+          <a:p>
+            <a:endParaRPr lang="en-US" dirty="0"/>
+          </a:p>
+        </p:txBody>
+      </p:sp>
+      <p:sp>
+        <p:nvSpPr>
+          <p:cNvPr id="4" name="Slide Number Placeholder 3"/>
+          <p:cNvSpPr>
+            <a:spLocks noGrp="1"/>
+          </p:cNvSpPr>
+          <p:nvPr>
+            <p:ph type="sldNum" sz="quarter" idx="5"/>
+          </p:nvPr>
+        </p:nvSpPr>
+        <p:spPr/>
+        <p:txBody>
+          <a:bodyPr/>
+          <a:lstStyle/>
+          <a:p>
+            <a:fld id="{8B0993E8-77CB-4CE8-8134-9D98A3510F3A}" type="slidenum">
+              <a:rPr lang="en-US" smtClean="0"/>
+              <a:t>13</a:t>
             </a:fld>
             <a:endParaRPr lang="en-US" dirty="0"/>
           </a:p>
@@ -3005,6 +6073,204 @@
           <p:cNvPr id="2" name="Title 1">
             <a:extLst>
               <a:ext uri="{FF2B5EF4-FFF2-40B4-BE49-F238E27FC236}">
+                <a16:creationId xmlns:a16="http://schemas.microsoft.com/office/drawing/2014/main" id="{7FDE734B-E47B-964A-92A4-EF541E844791}"/>
+              </a:ext>
+            </a:extLst>
+          </p:cNvPr>
+          <p:cNvSpPr>
+            <a:spLocks noGrp="1"/>
+          </p:cNvSpPr>
+          <p:nvPr>
+            <p:ph type="title"/>
+          </p:nvPr>
+        </p:nvSpPr>
+        <p:spPr/>
+        <p:txBody>
+          <a:bodyPr/>
+          <a:lstStyle/>
+          <a:p>
+            <a:r>
+              <a:rPr lang="en-US" dirty="0"/>
+              <a:t>Steps to a decision tree</a:t>
+            </a:r>
+          </a:p>
+        </p:txBody>
+      </p:sp>
+      <p:sp>
+        <p:nvSpPr>
+          <p:cNvPr id="4" name="Text Placeholder 3">
+            <a:extLst>
+              <a:ext uri="{FF2B5EF4-FFF2-40B4-BE49-F238E27FC236}">
+                <a16:creationId xmlns:a16="http://schemas.microsoft.com/office/drawing/2014/main" id="{2BC7337C-F897-234B-B358-DF84288610CE}"/>
+              </a:ext>
+            </a:extLst>
+          </p:cNvPr>
+          <p:cNvSpPr>
+            <a:spLocks noGrp="1"/>
+          </p:cNvSpPr>
+          <p:nvPr>
+            <p:ph type="body" sz="quarter" idx="11"/>
+          </p:nvPr>
+        </p:nvSpPr>
+        <p:spPr>
+          <a:xfrm>
+            <a:off x="733958" y="1284929"/>
+            <a:ext cx="7676083" cy="2288381"/>
+          </a:xfrm>
+        </p:spPr>
+        <p:txBody>
+          <a:bodyPr/>
+          <a:lstStyle/>
+          <a:p>
+            <a:pPr marL="285750" indent="-285750">
+              <a:buFont typeface="Arial" panose="020B0604020202020204" pitchFamily="34" charset="0"/>
+              <a:buChar char="•"/>
+            </a:pPr>
+            <a:r>
+              <a:rPr lang="en-US" dirty="0"/>
+              <a:t>we start at the tree root and split the data on the feature that results in the </a:t>
+            </a:r>
+            <a:r>
+              <a:rPr lang="en-US" b="1" dirty="0"/>
+              <a:t>smallest GINI </a:t>
+            </a:r>
+            <a:r>
+              <a:rPr lang="en-US" dirty="0"/>
+              <a:t>or the </a:t>
+            </a:r>
+            <a:r>
+              <a:rPr lang="en-US" b="1" dirty="0"/>
+              <a:t>largest</a:t>
+            </a:r>
+            <a:r>
+              <a:rPr lang="en-US" dirty="0"/>
+              <a:t> </a:t>
+            </a:r>
+            <a:r>
+              <a:rPr lang="en-US" b="1" dirty="0"/>
+              <a:t>information gain (</a:t>
+            </a:r>
+            <a:r>
+              <a:rPr lang="en-US" dirty="0"/>
+              <a:t>reduction in uncertainty towards the final decision).</a:t>
+            </a:r>
+          </a:p>
+          <a:p>
+            <a:pPr marL="285750" indent="-285750">
+              <a:buFont typeface="Arial" panose="020B0604020202020204" pitchFamily="34" charset="0"/>
+              <a:buChar char="•"/>
+            </a:pPr>
+            <a:r>
+              <a:rPr lang="en-US" dirty="0"/>
+              <a:t>we can then repeat this splitting procedure at each child node </a:t>
+            </a:r>
+            <a:r>
+              <a:rPr lang="en-US" b="1" dirty="0"/>
+              <a:t>until the leaves are pure</a:t>
+            </a:r>
+            <a:r>
+              <a:rPr lang="en-US" dirty="0"/>
+              <a:t>. This means that the samples at each leaf node all belong to the same class.</a:t>
+            </a:r>
+          </a:p>
+          <a:p>
+            <a:pPr marL="285750" indent="-285750">
+              <a:buFont typeface="Arial" panose="020B0604020202020204" pitchFamily="34" charset="0"/>
+              <a:buChar char="•"/>
+            </a:pPr>
+            <a:r>
+              <a:rPr lang="en-US" dirty="0"/>
+              <a:t>In practice, we may set a </a:t>
+            </a:r>
+            <a:r>
+              <a:rPr lang="en-US" b="1" dirty="0"/>
+              <a:t>limit on the depth of the tree to prevent overfitting</a:t>
+            </a:r>
+            <a:r>
+              <a:rPr lang="en-US" dirty="0"/>
+              <a:t>. We compromise on purity here somewhat as the final leaves may still have some impurity.</a:t>
+            </a:r>
+          </a:p>
+          <a:p>
+            <a:br>
+              <a:rPr lang="en-US" dirty="0"/>
+            </a:br>
+            <a:endParaRPr lang="en-US" dirty="0"/>
+          </a:p>
+          <a:p>
+            <a:endParaRPr lang="en-US" dirty="0"/>
+          </a:p>
+          <a:p>
+            <a:endParaRPr lang="en-US" dirty="0"/>
+          </a:p>
+        </p:txBody>
+      </p:sp>
+      <p:sp>
+        <p:nvSpPr>
+          <p:cNvPr id="5" name="Text Placeholder 2">
+            <a:extLst>
+              <a:ext uri="{FF2B5EF4-FFF2-40B4-BE49-F238E27FC236}">
+                <a16:creationId xmlns:a16="http://schemas.microsoft.com/office/drawing/2014/main" id="{8BE7089C-C548-884A-BC67-D8D4B04CBBB7}"/>
+              </a:ext>
+            </a:extLst>
+          </p:cNvPr>
+          <p:cNvSpPr>
+            <a:spLocks noGrp="1"/>
+          </p:cNvSpPr>
+          <p:nvPr>
+            <p:ph type="body" sz="quarter" idx="10"/>
+          </p:nvPr>
+        </p:nvSpPr>
+        <p:spPr/>
+        <p:txBody>
+          <a:bodyPr/>
+          <a:lstStyle/>
+          <a:p>
+            <a:r>
+              <a:rPr lang="en-US" dirty="0"/>
+              <a:t>1. Random Forest Modeling</a:t>
+            </a:r>
+          </a:p>
+          <a:p>
+            <a:endParaRPr lang="en-US" dirty="0"/>
+          </a:p>
+        </p:txBody>
+      </p:sp>
+    </p:spTree>
+    <p:extLst>
+      <p:ext uri="{BB962C8B-B14F-4D97-AF65-F5344CB8AC3E}">
+        <p14:creationId xmlns:p14="http://schemas.microsoft.com/office/powerpoint/2010/main" val="3832995919"/>
+      </p:ext>
+    </p:extLst>
+  </p:cSld>
+  <p:clrMapOvr>
+    <a:masterClrMapping/>
+  </p:clrMapOvr>
+</p:sld>
+</file>
+
+<file path=ppt/slides/slide11.xml><?xml version="1.0" encoding="utf-8"?>
+<p:sld xmlns:a="http://schemas.openxmlformats.org/drawingml/2006/main" xmlns:r="http://schemas.openxmlformats.org/officeDocument/2006/relationships" xmlns:p="http://schemas.openxmlformats.org/presentationml/2006/main">
+  <p:cSld>
+    <p:spTree>
+      <p:nvGrpSpPr>
+        <p:cNvPr id="1" name=""/>
+        <p:cNvGrpSpPr/>
+        <p:nvPr/>
+      </p:nvGrpSpPr>
+      <p:grpSpPr>
+        <a:xfrm>
+          <a:off x="0" y="0"/>
+          <a:ext cx="0" cy="0"/>
+          <a:chOff x="0" y="0"/>
+          <a:chExt cx="0" cy="0"/>
+        </a:xfrm>
+      </p:grpSpPr>
+      <p:sp>
+        <p:nvSpPr>
+          <p:cNvPr id="2" name="Title 1">
+            <a:extLst>
+              <a:ext uri="{FF2B5EF4-FFF2-40B4-BE49-F238E27FC236}">
                 <a16:creationId xmlns:a16="http://schemas.microsoft.com/office/drawing/2014/main" id="{E6D1A8F1-C859-294D-ABC2-899B8467D1DD}"/>
               </a:ext>
             </a:extLst>
@@ -3108,7 +6374,7 @@
 </p:sld>
 </file>
 
-<file path=ppt/slides/slide11.xml><?xml version="1.0" encoding="utf-8"?>
+<file path=ppt/slides/slide12.xml><?xml version="1.0" encoding="utf-8"?>
 <p:sld xmlns:a="http://schemas.openxmlformats.org/drawingml/2006/main" xmlns:r="http://schemas.openxmlformats.org/officeDocument/2006/relationships" xmlns:p="http://schemas.openxmlformats.org/presentationml/2006/main">
   <p:cSld>
     <p:spTree>
@@ -3355,7 +6621,7 @@
 </p:sld>
 </file>
 
-<file path=ppt/slides/slide12.xml><?xml version="1.0" encoding="utf-8"?>
+<file path=ppt/slides/slide13.xml><?xml version="1.0" encoding="utf-8"?>
 <p:sld xmlns:a="http://schemas.openxmlformats.org/drawingml/2006/main" xmlns:r="http://schemas.openxmlformats.org/officeDocument/2006/relationships" xmlns:p="http://schemas.openxmlformats.org/presentationml/2006/main">
   <p:cSld>
     <p:spTree>
@@ -3565,7 +6831,7 @@
 </p:sld>
 </file>
 
-<file path=ppt/slides/slide13.xml><?xml version="1.0" encoding="utf-8"?>
+<file path=ppt/slides/slide14.xml><?xml version="1.0" encoding="utf-8"?>
 <p:sld xmlns:a="http://schemas.openxmlformats.org/drawingml/2006/main" xmlns:r="http://schemas.openxmlformats.org/officeDocument/2006/relationships" xmlns:p="http://schemas.openxmlformats.org/presentationml/2006/main">
   <p:cSld>
     <p:spTree>
@@ -3605,7 +6871,7 @@
           <a:p>
             <a:r>
               <a:rPr lang="en-US" dirty="0"/>
-              <a:t>Advantages to RF</a:t>
+              <a:t>Advantages to Random forest</a:t>
             </a:r>
           </a:p>
         </p:txBody>
@@ -3868,8 +7134,8 @@
         </p:nvSpPr>
         <p:spPr>
           <a:xfrm>
-            <a:off x="740253" y="1839649"/>
-            <a:ext cx="4402931" cy="2288381"/>
+            <a:off x="740254" y="1839649"/>
+            <a:ext cx="3696280" cy="2288381"/>
           </a:xfrm>
         </p:spPr>
         <p:txBody>
@@ -3885,8 +7151,67 @@
               <a:t>Random Forest</a:t>
             </a:r>
           </a:p>
+          <a:p>
+            <a:pPr marL="285750" indent="-285750">
+              <a:buFont typeface="Wingdings" pitchFamily="2" charset="2"/>
+              <a:buChar char="§"/>
+            </a:pPr>
+            <a:endParaRPr lang="en-US" dirty="0"/>
+          </a:p>
+          <a:p>
+            <a:pPr marL="285750" indent="-285750">
+              <a:buFont typeface="Wingdings" pitchFamily="2" charset="2"/>
+              <a:buChar char="§"/>
+            </a:pPr>
+            <a:r>
+              <a:rPr lang="en-US" dirty="0">
+                <a:hlinkClick r:id="rId2"/>
+              </a:rPr>
+              <a:t>http://staff.pubhealth.ku.dk/~tag/Teaching/share/material/Breiman-two-cultures.pdf</a:t>
+            </a:r>
+            <a:r>
+              <a:rPr lang="en-US" dirty="0"/>
+              <a:t> </a:t>
+            </a:r>
+          </a:p>
         </p:txBody>
       </p:sp>
+      <p:pic>
+        <p:nvPicPr>
+          <p:cNvPr id="6" name="Picture 5" descr="Text&#10;&#10;Description automatically generated">
+            <a:extLst>
+              <a:ext uri="{FF2B5EF4-FFF2-40B4-BE49-F238E27FC236}">
+                <a16:creationId xmlns:a16="http://schemas.microsoft.com/office/drawing/2014/main" id="{BA9CA399-DCE4-A145-8822-962CD9F16DF8}"/>
+              </a:ext>
+            </a:extLst>
+          </p:cNvPr>
+          <p:cNvPicPr>
+            <a:picLocks noChangeAspect="1"/>
+          </p:cNvPicPr>
+          <p:nvPr/>
+        </p:nvPicPr>
+        <p:blipFill>
+          <a:blip r:embed="rId3">
+            <a:extLst>
+              <a:ext uri="{28A0092B-C50C-407E-A947-70E740481C1C}">
+                <a14:useLocalDpi xmlns:a14="http://schemas.microsoft.com/office/drawing/2010/main" val="0"/>
+              </a:ext>
+            </a:extLst>
+          </a:blip>
+          <a:stretch>
+            <a:fillRect/>
+          </a:stretch>
+        </p:blipFill>
+        <p:spPr>
+          <a:xfrm>
+            <a:off x="4645518" y="1693333"/>
+            <a:ext cx="4320682" cy="2219800"/>
+          </a:xfrm>
+          <a:prstGeom prst="rect">
+            <a:avLst/>
+          </a:prstGeom>
+        </p:spPr>
+      </p:pic>
     </p:spTree>
     <p:extLst>
       <p:ext uri="{BB962C8B-B14F-4D97-AF65-F5344CB8AC3E}">
@@ -3901,6 +7226,189 @@
 </file>
 
 <file path=ppt/slides/slide3.xml><?xml version="1.0" encoding="utf-8"?>
+<p:sld xmlns:a="http://schemas.openxmlformats.org/drawingml/2006/main" xmlns:r="http://schemas.openxmlformats.org/officeDocument/2006/relationships" xmlns:p="http://schemas.openxmlformats.org/presentationml/2006/main">
+  <p:cSld>
+    <p:spTree>
+      <p:nvGrpSpPr>
+        <p:cNvPr id="1" name=""/>
+        <p:cNvGrpSpPr/>
+        <p:nvPr/>
+      </p:nvGrpSpPr>
+      <p:grpSpPr>
+        <a:xfrm>
+          <a:off x="0" y="0"/>
+          <a:ext cx="0" cy="0"/>
+          <a:chOff x="0" y="0"/>
+          <a:chExt cx="0" cy="0"/>
+        </a:xfrm>
+      </p:grpSpPr>
+      <p:sp>
+        <p:nvSpPr>
+          <p:cNvPr id="2" name="Title 1">
+            <a:extLst>
+              <a:ext uri="{FF2B5EF4-FFF2-40B4-BE49-F238E27FC236}">
+                <a16:creationId xmlns:a16="http://schemas.microsoft.com/office/drawing/2014/main" id="{B782BBB0-8531-B642-8FE6-33809971CA1A}"/>
+              </a:ext>
+            </a:extLst>
+          </p:cNvPr>
+          <p:cNvSpPr>
+            <a:spLocks noGrp="1"/>
+          </p:cNvSpPr>
+          <p:nvPr>
+            <p:ph type="title"/>
+          </p:nvPr>
+        </p:nvSpPr>
+        <p:spPr/>
+        <p:txBody>
+          <a:bodyPr/>
+          <a:lstStyle/>
+          <a:p>
+            <a:r>
+              <a:rPr lang="en-US" dirty="0"/>
+              <a:t>TERMS</a:t>
+            </a:r>
+          </a:p>
+        </p:txBody>
+      </p:sp>
+      <p:sp>
+        <p:nvSpPr>
+          <p:cNvPr id="3" name="Text Placeholder 2">
+            <a:extLst>
+              <a:ext uri="{FF2B5EF4-FFF2-40B4-BE49-F238E27FC236}">
+                <a16:creationId xmlns:a16="http://schemas.microsoft.com/office/drawing/2014/main" id="{42BA3C53-E845-4F46-B143-4EFD82EE1626}"/>
+              </a:ext>
+            </a:extLst>
+          </p:cNvPr>
+          <p:cNvSpPr>
+            <a:spLocks noGrp="1"/>
+          </p:cNvSpPr>
+          <p:nvPr>
+            <p:ph type="body" sz="quarter" idx="10"/>
+          </p:nvPr>
+        </p:nvSpPr>
+        <p:spPr/>
+        <p:txBody>
+          <a:bodyPr/>
+          <a:lstStyle/>
+          <a:p>
+            <a:r>
+              <a:rPr lang="en-US" dirty="0"/>
+              <a:t>1. Random Forest Modeling</a:t>
+            </a:r>
+          </a:p>
+          <a:p>
+            <a:endParaRPr lang="en-US" dirty="0"/>
+          </a:p>
+        </p:txBody>
+      </p:sp>
+      <p:sp>
+        <p:nvSpPr>
+          <p:cNvPr id="4" name="Text Placeholder 3">
+            <a:extLst>
+              <a:ext uri="{FF2B5EF4-FFF2-40B4-BE49-F238E27FC236}">
+                <a16:creationId xmlns:a16="http://schemas.microsoft.com/office/drawing/2014/main" id="{2B4BF051-2705-484E-A7E3-46BF3B1C2441}"/>
+              </a:ext>
+            </a:extLst>
+          </p:cNvPr>
+          <p:cNvSpPr>
+            <a:spLocks noGrp="1"/>
+          </p:cNvSpPr>
+          <p:nvPr>
+            <p:ph type="body" sz="quarter" idx="11"/>
+          </p:nvPr>
+        </p:nvSpPr>
+        <p:spPr/>
+        <p:txBody>
+          <a:bodyPr/>
+          <a:lstStyle/>
+          <a:p>
+            <a:pPr marL="285750" indent="-285750">
+              <a:buFont typeface="Arial" panose="020B0604020202020204" pitchFamily="34" charset="0"/>
+              <a:buChar char="•"/>
+            </a:pPr>
+            <a:r>
+              <a:rPr lang="en-US" dirty="0"/>
+              <a:t>Train – validation – test models</a:t>
+            </a:r>
+          </a:p>
+          <a:p>
+            <a:pPr marL="285750" indent="-285750">
+              <a:buFont typeface="Arial" panose="020B0604020202020204" pitchFamily="34" charset="0"/>
+              <a:buChar char="•"/>
+            </a:pPr>
+            <a:r>
+              <a:rPr lang="en-US" dirty="0"/>
+              <a:t>Cross validation</a:t>
+            </a:r>
+          </a:p>
+          <a:p>
+            <a:pPr marL="285750" indent="-285750">
+              <a:buFont typeface="Arial" panose="020B0604020202020204" pitchFamily="34" charset="0"/>
+              <a:buChar char="•"/>
+            </a:pPr>
+            <a:r>
+              <a:rPr lang="en-US" dirty="0" err="1"/>
+              <a:t>Ensembling</a:t>
+            </a:r>
+            <a:endParaRPr lang="en-US" dirty="0"/>
+          </a:p>
+          <a:p>
+            <a:pPr marL="285750" indent="-285750">
+              <a:buFont typeface="Arial" panose="020B0604020202020204" pitchFamily="34" charset="0"/>
+              <a:buChar char="•"/>
+            </a:pPr>
+            <a:r>
+              <a:rPr lang="en-US" dirty="0"/>
+              <a:t>Bootstrap aggregation (“bagging”)</a:t>
+            </a:r>
+          </a:p>
+          <a:p>
+            <a:endParaRPr lang="en-US" dirty="0"/>
+          </a:p>
+        </p:txBody>
+      </p:sp>
+      <p:graphicFrame>
+        <p:nvGraphicFramePr>
+          <p:cNvPr id="5" name="Diagram 4">
+            <a:extLst>
+              <a:ext uri="{FF2B5EF4-FFF2-40B4-BE49-F238E27FC236}">
+                <a16:creationId xmlns:a16="http://schemas.microsoft.com/office/drawing/2014/main" id="{98E435F4-F4D2-5B46-9EF3-EF32E94E8300}"/>
+              </a:ext>
+            </a:extLst>
+          </p:cNvPr>
+          <p:cNvGraphicFramePr/>
+          <p:nvPr>
+            <p:extLst>
+              <p:ext uri="{D42A27DB-BD31-4B8C-83A1-F6EECF244321}">
+                <p14:modId xmlns:p14="http://schemas.microsoft.com/office/powerpoint/2010/main" val="3639685595"/>
+              </p:ext>
+            </p:extLst>
+          </p:nvPr>
+        </p:nvGraphicFramePr>
+        <p:xfrm>
+          <a:off x="4953000" y="939800"/>
+          <a:ext cx="3293533" cy="2410883"/>
+        </p:xfrm>
+        <a:graphic>
+          <a:graphicData uri="http://schemas.openxmlformats.org/drawingml/2006/diagram">
+            <dgm:relIds xmlns:dgm="http://schemas.openxmlformats.org/drawingml/2006/diagram" xmlns:r="http://schemas.openxmlformats.org/officeDocument/2006/relationships" r:dm="rId2" r:lo="rId3" r:qs="rId4" r:cs="rId5"/>
+          </a:graphicData>
+        </a:graphic>
+      </p:graphicFrame>
+    </p:spTree>
+    <p:extLst>
+      <p:ext uri="{BB962C8B-B14F-4D97-AF65-F5344CB8AC3E}">
+        <p14:creationId xmlns:p14="http://schemas.microsoft.com/office/powerpoint/2010/main" val="1775089517"/>
+      </p:ext>
+    </p:extLst>
+  </p:cSld>
+  <p:clrMapOvr>
+    <a:masterClrMapping/>
+  </p:clrMapOvr>
+</p:sld>
+</file>
+
+<file path=ppt/slides/slide4.xml><?xml version="1.0" encoding="utf-8"?>
 <p:sld xmlns:a="http://schemas.openxmlformats.org/drawingml/2006/main" xmlns:r="http://schemas.openxmlformats.org/officeDocument/2006/relationships" xmlns:p="http://schemas.openxmlformats.org/presentationml/2006/main">
   <p:cSld>
     <p:spTree>
@@ -4107,7 +7615,7 @@
 </p:sld>
 </file>
 
-<file path=ppt/slides/slide4.xml><?xml version="1.0" encoding="utf-8"?>
+<file path=ppt/slides/slide5.xml><?xml version="1.0" encoding="utf-8"?>
 <p:sld xmlns:a="http://schemas.openxmlformats.org/drawingml/2006/main" xmlns:r="http://schemas.openxmlformats.org/officeDocument/2006/relationships" xmlns:p="http://schemas.openxmlformats.org/presentationml/2006/main">
   <p:cSld>
     <p:spTree>
@@ -4348,7 +7856,7 @@
 </p:sld>
 </file>
 
-<file path=ppt/slides/slide5.xml><?xml version="1.0" encoding="utf-8"?>
+<file path=ppt/slides/slide6.xml><?xml version="1.0" encoding="utf-8"?>
 <p:sld xmlns:a="http://schemas.openxmlformats.org/drawingml/2006/main" xmlns:r="http://schemas.openxmlformats.org/officeDocument/2006/relationships" xmlns:p="http://schemas.openxmlformats.org/presentationml/2006/main">
   <p:cSld>
     <p:spTree>
@@ -4439,7 +7947,7 @@
           <p:nvPr/>
         </p:nvPicPr>
         <p:blipFill>
-          <a:blip r:embed="rId2">
+          <a:blip r:embed="rId3">
             <a:extLst>
               <a:ext uri="{28A0092B-C50C-407E-A947-70E740481C1C}">
                 <a14:useLocalDpi xmlns:a14="http://schemas.microsoft.com/office/drawing/2010/main" val="0"/>
@@ -4572,7 +8080,7 @@
 </p:sld>
 </file>
 
-<file path=ppt/slides/slide6.xml><?xml version="1.0" encoding="utf-8"?>
+<file path=ppt/slides/slide7.xml><?xml version="1.0" encoding="utf-8"?>
 <p:sld xmlns:a="http://schemas.openxmlformats.org/drawingml/2006/main" xmlns:r="http://schemas.openxmlformats.org/officeDocument/2006/relationships" xmlns:p="http://schemas.openxmlformats.org/presentationml/2006/main">
   <p:cSld>
     <p:spTree>
@@ -4753,7 +8261,7 @@
 </p:sld>
 </file>
 
-<file path=ppt/slides/slide7.xml><?xml version="1.0" encoding="utf-8"?>
+<file path=ppt/slides/slide8.xml><?xml version="1.0" encoding="utf-8"?>
 <p:sld xmlns:a="http://schemas.openxmlformats.org/drawingml/2006/main" xmlns:r="http://schemas.openxmlformats.org/officeDocument/2006/relationships" xmlns:p="http://schemas.openxmlformats.org/presentationml/2006/main">
   <p:cSld>
     <p:spTree>
@@ -4969,7 +8477,7 @@
 </p:sld>
 </file>
 
-<file path=ppt/slides/slide8.xml><?xml version="1.0" encoding="utf-8"?>
+<file path=ppt/slides/slide9.xml><?xml version="1.0" encoding="utf-8"?>
 <p:sld xmlns:a="http://schemas.openxmlformats.org/drawingml/2006/main" xmlns:r="http://schemas.openxmlformats.org/officeDocument/2006/relationships" xmlns:p="http://schemas.openxmlformats.org/presentationml/2006/main">
   <p:cSld>
     <p:spTree>
@@ -5157,204 +8665,6 @@
     <p:extLst>
       <p:ext uri="{BB962C8B-B14F-4D97-AF65-F5344CB8AC3E}">
         <p14:creationId xmlns:p14="http://schemas.microsoft.com/office/powerpoint/2010/main" val="3896990799"/>
-      </p:ext>
-    </p:extLst>
-  </p:cSld>
-  <p:clrMapOvr>
-    <a:masterClrMapping/>
-  </p:clrMapOvr>
-</p:sld>
-</file>
-
-<file path=ppt/slides/slide9.xml><?xml version="1.0" encoding="utf-8"?>
-<p:sld xmlns:a="http://schemas.openxmlformats.org/drawingml/2006/main" xmlns:r="http://schemas.openxmlformats.org/officeDocument/2006/relationships" xmlns:p="http://schemas.openxmlformats.org/presentationml/2006/main">
-  <p:cSld>
-    <p:spTree>
-      <p:nvGrpSpPr>
-        <p:cNvPr id="1" name=""/>
-        <p:cNvGrpSpPr/>
-        <p:nvPr/>
-      </p:nvGrpSpPr>
-      <p:grpSpPr>
-        <a:xfrm>
-          <a:off x="0" y="0"/>
-          <a:ext cx="0" cy="0"/>
-          <a:chOff x="0" y="0"/>
-          <a:chExt cx="0" cy="0"/>
-        </a:xfrm>
-      </p:grpSpPr>
-      <p:sp>
-        <p:nvSpPr>
-          <p:cNvPr id="2" name="Title 1">
-            <a:extLst>
-              <a:ext uri="{FF2B5EF4-FFF2-40B4-BE49-F238E27FC236}">
-                <a16:creationId xmlns:a16="http://schemas.microsoft.com/office/drawing/2014/main" id="{7FDE734B-E47B-964A-92A4-EF541E844791}"/>
-              </a:ext>
-            </a:extLst>
-          </p:cNvPr>
-          <p:cNvSpPr>
-            <a:spLocks noGrp="1"/>
-          </p:cNvSpPr>
-          <p:nvPr>
-            <p:ph type="title"/>
-          </p:nvPr>
-        </p:nvSpPr>
-        <p:spPr/>
-        <p:txBody>
-          <a:bodyPr/>
-          <a:lstStyle/>
-          <a:p>
-            <a:r>
-              <a:rPr lang="en-US" dirty="0"/>
-              <a:t>Steps to a decision tree</a:t>
-            </a:r>
-          </a:p>
-        </p:txBody>
-      </p:sp>
-      <p:sp>
-        <p:nvSpPr>
-          <p:cNvPr id="4" name="Text Placeholder 3">
-            <a:extLst>
-              <a:ext uri="{FF2B5EF4-FFF2-40B4-BE49-F238E27FC236}">
-                <a16:creationId xmlns:a16="http://schemas.microsoft.com/office/drawing/2014/main" id="{2BC7337C-F897-234B-B358-DF84288610CE}"/>
-              </a:ext>
-            </a:extLst>
-          </p:cNvPr>
-          <p:cNvSpPr>
-            <a:spLocks noGrp="1"/>
-          </p:cNvSpPr>
-          <p:nvPr>
-            <p:ph type="body" sz="quarter" idx="11"/>
-          </p:nvPr>
-        </p:nvSpPr>
-        <p:spPr>
-          <a:xfrm>
-            <a:off x="733958" y="1284929"/>
-            <a:ext cx="7676083" cy="2288381"/>
-          </a:xfrm>
-        </p:spPr>
-        <p:txBody>
-          <a:bodyPr/>
-          <a:lstStyle/>
-          <a:p>
-            <a:pPr marL="285750" indent="-285750">
-              <a:buFont typeface="Arial" panose="020B0604020202020204" pitchFamily="34" charset="0"/>
-              <a:buChar char="•"/>
-            </a:pPr>
-            <a:r>
-              <a:rPr lang="en-US" dirty="0"/>
-              <a:t>we start at the tree root and split the data on the feature that results in the </a:t>
-            </a:r>
-            <a:r>
-              <a:rPr lang="en-US" b="1" dirty="0"/>
-              <a:t>smallest GINI </a:t>
-            </a:r>
-            <a:r>
-              <a:rPr lang="en-US" dirty="0"/>
-              <a:t>or the </a:t>
-            </a:r>
-            <a:r>
-              <a:rPr lang="en-US" b="1" dirty="0"/>
-              <a:t>largest</a:t>
-            </a:r>
-            <a:r>
-              <a:rPr lang="en-US" dirty="0"/>
-              <a:t> </a:t>
-            </a:r>
-            <a:r>
-              <a:rPr lang="en-US" b="1" dirty="0"/>
-              <a:t>information gain (</a:t>
-            </a:r>
-            <a:r>
-              <a:rPr lang="en-US" dirty="0"/>
-              <a:t>reduction in uncertainty towards the final decision).</a:t>
-            </a:r>
-          </a:p>
-          <a:p>
-            <a:pPr marL="285750" indent="-285750">
-              <a:buFont typeface="Arial" panose="020B0604020202020204" pitchFamily="34" charset="0"/>
-              <a:buChar char="•"/>
-            </a:pPr>
-            <a:r>
-              <a:rPr lang="en-US" dirty="0"/>
-              <a:t>we can then repeat this splitting procedure at each child node </a:t>
-            </a:r>
-            <a:r>
-              <a:rPr lang="en-US" b="1" dirty="0"/>
-              <a:t>until the leaves are pure</a:t>
-            </a:r>
-            <a:r>
-              <a:rPr lang="en-US" dirty="0"/>
-              <a:t>. This means that the samples at each leaf node all belong to the same class.</a:t>
-            </a:r>
-          </a:p>
-          <a:p>
-            <a:pPr marL="285750" indent="-285750">
-              <a:buFont typeface="Arial" panose="020B0604020202020204" pitchFamily="34" charset="0"/>
-              <a:buChar char="•"/>
-            </a:pPr>
-            <a:r>
-              <a:rPr lang="en-US" dirty="0"/>
-              <a:t>In practice, we may set a </a:t>
-            </a:r>
-            <a:r>
-              <a:rPr lang="en-US" b="1" dirty="0"/>
-              <a:t>limit on the depth of the tree to prevent overfitting</a:t>
-            </a:r>
-            <a:r>
-              <a:rPr lang="en-US" dirty="0"/>
-              <a:t>. We compromise on purity here somewhat as the final leaves may still have some impurity.</a:t>
-            </a:r>
-          </a:p>
-          <a:p>
-            <a:br>
-              <a:rPr lang="en-US" dirty="0"/>
-            </a:br>
-            <a:endParaRPr lang="en-US" dirty="0"/>
-          </a:p>
-          <a:p>
-            <a:endParaRPr lang="en-US" dirty="0"/>
-          </a:p>
-          <a:p>
-            <a:endParaRPr lang="en-US" dirty="0"/>
-          </a:p>
-        </p:txBody>
-      </p:sp>
-      <p:sp>
-        <p:nvSpPr>
-          <p:cNvPr id="5" name="Text Placeholder 2">
-            <a:extLst>
-              <a:ext uri="{FF2B5EF4-FFF2-40B4-BE49-F238E27FC236}">
-                <a16:creationId xmlns:a16="http://schemas.microsoft.com/office/drawing/2014/main" id="{8BE7089C-C548-884A-BC67-D8D4B04CBBB7}"/>
-              </a:ext>
-            </a:extLst>
-          </p:cNvPr>
-          <p:cNvSpPr>
-            <a:spLocks noGrp="1"/>
-          </p:cNvSpPr>
-          <p:nvPr>
-            <p:ph type="body" sz="quarter" idx="10"/>
-          </p:nvPr>
-        </p:nvSpPr>
-        <p:spPr/>
-        <p:txBody>
-          <a:bodyPr/>
-          <a:lstStyle/>
-          <a:p>
-            <a:r>
-              <a:rPr lang="en-US" dirty="0"/>
-              <a:t>1. Random Forest Modeling</a:t>
-            </a:r>
-          </a:p>
-          <a:p>
-            <a:endParaRPr lang="en-US" dirty="0"/>
-          </a:p>
-        </p:txBody>
-      </p:sp>
-    </p:spTree>
-    <p:extLst>
-      <p:ext uri="{BB962C8B-B14F-4D97-AF65-F5344CB8AC3E}">
-        <p14:creationId xmlns:p14="http://schemas.microsoft.com/office/powerpoint/2010/main" val="3832995919"/>
       </p:ext>
     </p:extLst>
   </p:cSld>

</xml_diff>

<commit_message>
updated presentation and RFE
</commit_message>
<xml_diff>
--- a/doc/BCB_Intro_Advanced_Analysis_2_2021.pptx
+++ b/doc/BCB_Intro_Advanced_Analysis_2_2021.pptx
@@ -6,7 +6,7 @@
     <p:sldMasterId id="2147483654" r:id="rId2"/>
   </p:sldMasterIdLst>
   <p:notesMasterIdLst>
-    <p:notesMasterId r:id="rId17"/>
+    <p:notesMasterId r:id="rId19"/>
   </p:notesMasterIdLst>
   <p:sldIdLst>
     <p:sldId id="335" r:id="rId3"/>
@@ -23,6 +23,8 @@
     <p:sldId id="461" r:id="rId14"/>
     <p:sldId id="451" r:id="rId15"/>
     <p:sldId id="452" r:id="rId16"/>
+    <p:sldId id="464" r:id="rId17"/>
+    <p:sldId id="465" r:id="rId18"/>
   </p:sldIdLst>
   <p:sldSz cx="9144000" cy="5143500" type="screen16x9"/>
   <p:notesSz cx="6858000" cy="9144000"/>
@@ -7038,6 +7040,301 @@
 </p:sld>
 </file>
 
+<file path=ppt/slides/slide15.xml><?xml version="1.0" encoding="utf-8"?>
+<p:sld xmlns:a="http://schemas.openxmlformats.org/drawingml/2006/main" xmlns:r="http://schemas.openxmlformats.org/officeDocument/2006/relationships" xmlns:p="http://schemas.openxmlformats.org/presentationml/2006/main">
+  <p:cSld>
+    <p:spTree>
+      <p:nvGrpSpPr>
+        <p:cNvPr id="1" name=""/>
+        <p:cNvGrpSpPr/>
+        <p:nvPr/>
+      </p:nvGrpSpPr>
+      <p:grpSpPr>
+        <a:xfrm>
+          <a:off x="0" y="0"/>
+          <a:ext cx="0" cy="0"/>
+          <a:chOff x="0" y="0"/>
+          <a:chExt cx="0" cy="0"/>
+        </a:xfrm>
+      </p:grpSpPr>
+      <p:sp>
+        <p:nvSpPr>
+          <p:cNvPr id="2" name="Title 1">
+            <a:extLst>
+              <a:ext uri="{FF2B5EF4-FFF2-40B4-BE49-F238E27FC236}">
+                <a16:creationId xmlns:a16="http://schemas.microsoft.com/office/drawing/2014/main" id="{358B9951-5463-3449-9CE1-253EEC58ABF8}"/>
+              </a:ext>
+            </a:extLst>
+          </p:cNvPr>
+          <p:cNvSpPr>
+            <a:spLocks noGrp="1"/>
+          </p:cNvSpPr>
+          <p:nvPr>
+            <p:ph type="title"/>
+          </p:nvPr>
+        </p:nvSpPr>
+        <p:spPr/>
+        <p:txBody>
+          <a:bodyPr/>
+          <a:lstStyle/>
+          <a:p>
+            <a:r>
+              <a:rPr lang="en-US" dirty="0"/>
+              <a:t>Geo Weighted RF</a:t>
+            </a:r>
+          </a:p>
+        </p:txBody>
+      </p:sp>
+      <p:sp>
+        <p:nvSpPr>
+          <p:cNvPr id="3" name="Text Placeholder 2">
+            <a:extLst>
+              <a:ext uri="{FF2B5EF4-FFF2-40B4-BE49-F238E27FC236}">
+                <a16:creationId xmlns:a16="http://schemas.microsoft.com/office/drawing/2014/main" id="{954F32F7-592D-BE41-BE2C-0AD33934B593}"/>
+              </a:ext>
+            </a:extLst>
+          </p:cNvPr>
+          <p:cNvSpPr>
+            <a:spLocks noGrp="1"/>
+          </p:cNvSpPr>
+          <p:nvPr>
+            <p:ph type="body" sz="quarter" idx="10"/>
+          </p:nvPr>
+        </p:nvSpPr>
+        <p:spPr/>
+        <p:txBody>
+          <a:bodyPr/>
+          <a:lstStyle/>
+          <a:p>
+            <a:r>
+              <a:rPr lang="en-US" dirty="0"/>
+              <a:t>1. Random Forest Modeling</a:t>
+            </a:r>
+          </a:p>
+          <a:p>
+            <a:endParaRPr lang="en-US" dirty="0"/>
+          </a:p>
+        </p:txBody>
+      </p:sp>
+      <p:sp>
+        <p:nvSpPr>
+          <p:cNvPr id="4" name="Text Placeholder 3">
+            <a:extLst>
+              <a:ext uri="{FF2B5EF4-FFF2-40B4-BE49-F238E27FC236}">
+                <a16:creationId xmlns:a16="http://schemas.microsoft.com/office/drawing/2014/main" id="{65142E38-B43E-2545-925D-95127435D87F}"/>
+              </a:ext>
+            </a:extLst>
+          </p:cNvPr>
+          <p:cNvSpPr>
+            <a:spLocks noGrp="1"/>
+          </p:cNvSpPr>
+          <p:nvPr>
+            <p:ph type="body" sz="quarter" idx="11"/>
+          </p:nvPr>
+        </p:nvSpPr>
+        <p:spPr>
+          <a:xfrm>
+            <a:off x="1066800" y="1339135"/>
+            <a:ext cx="7823200" cy="2288381"/>
+          </a:xfrm>
+        </p:spPr>
+        <p:txBody>
+          <a:bodyPr/>
+          <a:lstStyle/>
+          <a:p>
+            <a:pPr marL="285750" indent="-285750">
+              <a:buFont typeface="Arial" panose="020B0604020202020204" pitchFamily="34" charset="0"/>
+              <a:buChar char="•"/>
+            </a:pPr>
+            <a:endParaRPr lang="en-US" sz="1600" dirty="0"/>
+          </a:p>
+          <a:p>
+            <a:pPr marL="285750" indent="-285750">
+              <a:buFont typeface="Arial" panose="020B0604020202020204" pitchFamily="34" charset="0"/>
+              <a:buChar char="•"/>
+            </a:pPr>
+            <a:r>
+              <a:rPr lang="en-US" sz="1600" dirty="0"/>
+              <a:t>Geographical Random Forest (GRF) is a spatial analysis method using a local version of the Random Forest Regression Model. </a:t>
+            </a:r>
+          </a:p>
+          <a:p>
+            <a:pPr marL="285750" indent="-285750">
+              <a:buFont typeface="Arial" panose="020B0604020202020204" pitchFamily="34" charset="0"/>
+              <a:buChar char="•"/>
+            </a:pPr>
+            <a:r>
+              <a:rPr lang="en-US" sz="1600" dirty="0"/>
+              <a:t>It allows for the investigation of the existence of spatial non-stationarity, in the relationship between a dependent and a set of independent variables. The latter is possible by fitting a sub-model for each observation in space, taking into account the </a:t>
+            </a:r>
+            <a:r>
+              <a:rPr lang="en-US" sz="1600" dirty="0" err="1"/>
+              <a:t>neighbouring</a:t>
+            </a:r>
+            <a:r>
+              <a:rPr lang="en-US" sz="1600" dirty="0"/>
+              <a:t> observations. This technique adopts the idea of the Geographically Weighted Regression, </a:t>
+            </a:r>
+            <a:r>
+              <a:rPr lang="en-US" sz="1600" dirty="0" err="1"/>
+              <a:t>Kalogirou</a:t>
+            </a:r>
+            <a:r>
+              <a:rPr lang="en-US" sz="1600" dirty="0"/>
+              <a:t> (2003). </a:t>
+            </a:r>
+          </a:p>
+        </p:txBody>
+      </p:sp>
+    </p:spTree>
+    <p:extLst>
+      <p:ext uri="{BB962C8B-B14F-4D97-AF65-F5344CB8AC3E}">
+        <p14:creationId xmlns:p14="http://schemas.microsoft.com/office/powerpoint/2010/main" val="1558522117"/>
+      </p:ext>
+    </p:extLst>
+  </p:cSld>
+  <p:clrMapOvr>
+    <a:masterClrMapping/>
+  </p:clrMapOvr>
+</p:sld>
+</file>
+
+<file path=ppt/slides/slide16.xml><?xml version="1.0" encoding="utf-8"?>
+<p:sld xmlns:a="http://schemas.openxmlformats.org/drawingml/2006/main" xmlns:r="http://schemas.openxmlformats.org/officeDocument/2006/relationships" xmlns:p="http://schemas.openxmlformats.org/presentationml/2006/main">
+  <p:cSld>
+    <p:spTree>
+      <p:nvGrpSpPr>
+        <p:cNvPr id="1" name=""/>
+        <p:cNvGrpSpPr/>
+        <p:nvPr/>
+      </p:nvGrpSpPr>
+      <p:grpSpPr>
+        <a:xfrm>
+          <a:off x="0" y="0"/>
+          <a:ext cx="0" cy="0"/>
+          <a:chOff x="0" y="0"/>
+          <a:chExt cx="0" cy="0"/>
+        </a:xfrm>
+      </p:grpSpPr>
+      <p:sp>
+        <p:nvSpPr>
+          <p:cNvPr id="2" name="Title 1">
+            <a:extLst>
+              <a:ext uri="{FF2B5EF4-FFF2-40B4-BE49-F238E27FC236}">
+                <a16:creationId xmlns:a16="http://schemas.microsoft.com/office/drawing/2014/main" id="{1D861BBD-2217-3647-8AF8-771DB916DA4D}"/>
+              </a:ext>
+            </a:extLst>
+          </p:cNvPr>
+          <p:cNvSpPr>
+            <a:spLocks noGrp="1"/>
+          </p:cNvSpPr>
+          <p:nvPr>
+            <p:ph type="title"/>
+          </p:nvPr>
+        </p:nvSpPr>
+        <p:spPr/>
+        <p:txBody>
+          <a:bodyPr/>
+          <a:lstStyle/>
+          <a:p>
+            <a:r>
+              <a:rPr lang="en-US" dirty="0"/>
+              <a:t>GEO Weighted RF</a:t>
+            </a:r>
+          </a:p>
+        </p:txBody>
+      </p:sp>
+      <p:sp>
+        <p:nvSpPr>
+          <p:cNvPr id="3" name="Text Placeholder 2">
+            <a:extLst>
+              <a:ext uri="{FF2B5EF4-FFF2-40B4-BE49-F238E27FC236}">
+                <a16:creationId xmlns:a16="http://schemas.microsoft.com/office/drawing/2014/main" id="{C295BDE5-4A79-2E46-A1F0-BD99D9D65825}"/>
+              </a:ext>
+            </a:extLst>
+          </p:cNvPr>
+          <p:cNvSpPr>
+            <a:spLocks noGrp="1"/>
+          </p:cNvSpPr>
+          <p:nvPr>
+            <p:ph type="body" sz="quarter" idx="10"/>
+          </p:nvPr>
+        </p:nvSpPr>
+        <p:spPr/>
+        <p:txBody>
+          <a:bodyPr/>
+          <a:lstStyle/>
+          <a:p>
+            <a:r>
+              <a:rPr lang="en-US" dirty="0"/>
+              <a:t>1. Random Forest Modeling</a:t>
+            </a:r>
+          </a:p>
+          <a:p>
+            <a:endParaRPr lang="en-US" dirty="0"/>
+          </a:p>
+        </p:txBody>
+      </p:sp>
+      <p:sp>
+        <p:nvSpPr>
+          <p:cNvPr id="4" name="Text Placeholder 3">
+            <a:extLst>
+              <a:ext uri="{FF2B5EF4-FFF2-40B4-BE49-F238E27FC236}">
+                <a16:creationId xmlns:a16="http://schemas.microsoft.com/office/drawing/2014/main" id="{4DF22F27-A7E7-2F47-9D92-719BFAD58D45}"/>
+              </a:ext>
+            </a:extLst>
+          </p:cNvPr>
+          <p:cNvSpPr>
+            <a:spLocks noGrp="1"/>
+          </p:cNvSpPr>
+          <p:nvPr>
+            <p:ph type="body" sz="quarter" idx="11"/>
+          </p:nvPr>
+        </p:nvSpPr>
+        <p:spPr>
+          <a:xfrm>
+            <a:off x="1066799" y="1339135"/>
+            <a:ext cx="7636933" cy="2288381"/>
+          </a:xfrm>
+        </p:spPr>
+        <p:txBody>
+          <a:bodyPr/>
+          <a:lstStyle/>
+          <a:p>
+            <a:pPr marL="285750" indent="-285750">
+              <a:buFont typeface="Arial" panose="020B0604020202020204" pitchFamily="34" charset="0"/>
+              <a:buChar char="•"/>
+            </a:pPr>
+            <a:r>
+              <a:rPr lang="en-US" sz="1600" dirty="0"/>
+              <a:t>The main difference between a tradition (linear) GWR and GRF is that we can model non-stationarity coupled with a flexible non-linear model which is very hard to overfit due to its bootstrapping nature, thus relaxing the assumptions of traditional Gaussian statistics. </a:t>
+            </a:r>
+          </a:p>
+          <a:p>
+            <a:pPr marL="285750" indent="-285750">
+              <a:buFont typeface="Arial" panose="020B0604020202020204" pitchFamily="34" charset="0"/>
+              <a:buChar char="•"/>
+            </a:pPr>
+            <a:r>
+              <a:rPr lang="en-US" sz="1600" dirty="0"/>
+              <a:t>Essentially it was designed to be a bridge between machine learning and geographical models, combining inferential and explanatory power. Additionally, it is suited for datasets with numerous predictors, due to the robust nature of the random forest algorithm in high dimensionality. (Fotheringham et al. 2003)</a:t>
+            </a:r>
+          </a:p>
+        </p:txBody>
+      </p:sp>
+    </p:spTree>
+    <p:extLst>
+      <p:ext uri="{BB962C8B-B14F-4D97-AF65-F5344CB8AC3E}">
+        <p14:creationId xmlns:p14="http://schemas.microsoft.com/office/powerpoint/2010/main" val="2824823011"/>
+      </p:ext>
+    </p:extLst>
+  </p:cSld>
+  <p:clrMapOvr>
+    <a:masterClrMapping/>
+  </p:clrMapOvr>
+</p:sld>
+</file>
+
 <file path=ppt/slides/slide2.xml><?xml version="1.0" encoding="utf-8"?>
 <p:sld xmlns:a="http://schemas.openxmlformats.org/drawingml/2006/main" xmlns:r="http://schemas.openxmlformats.org/officeDocument/2006/relationships" xmlns:p="http://schemas.openxmlformats.org/presentationml/2006/main">
   <p:cSld>

</xml_diff>